<commit_message>
#866 새기능 신규 높음 2017.05.19 클래스 디자인 초안 작성 - Entity Class /Boundary Class / Control Class
</commit_message>
<xml_diff>
--- a/doc/3_ 설계서/Class Design.pptx
+++ b/doc/3_ 설계서/Class Design.pptx
@@ -5,15 +5,26 @@
     <p:sldMasterId id="2147483655" r:id="rId1"/>
   </p:sldMasterIdLst>
   <p:notesMasterIdLst>
-    <p:notesMasterId r:id="rId5"/>
+    <p:notesMasterId r:id="rId16"/>
   </p:notesMasterIdLst>
   <p:handoutMasterIdLst>
-    <p:handoutMasterId r:id="rId6"/>
+    <p:handoutMasterId r:id="rId17"/>
   </p:handoutMasterIdLst>
   <p:sldIdLst>
     <p:sldId id="256" r:id="rId2"/>
     <p:sldId id="257" r:id="rId3"/>
     <p:sldId id="258" r:id="rId4"/>
+    <p:sldId id="259" r:id="rId5"/>
+    <p:sldId id="260" r:id="rId6"/>
+    <p:sldId id="261" r:id="rId7"/>
+    <p:sldId id="262" r:id="rId8"/>
+    <p:sldId id="263" r:id="rId9"/>
+    <p:sldId id="264" r:id="rId10"/>
+    <p:sldId id="265" r:id="rId11"/>
+    <p:sldId id="266" r:id="rId12"/>
+    <p:sldId id="267" r:id="rId13"/>
+    <p:sldId id="268" r:id="rId14"/>
+    <p:sldId id="269" r:id="rId15"/>
   </p:sldIdLst>
   <p:sldSz cx="9144000" cy="6858000" type="screen4x3"/>
   <p:notesSz cx="6797675" cy="9928225"/>
@@ -142,7 +153,46 @@
       </a:defRPr>
     </a:lvl9pPr>
   </p:defaultTextStyle>
+  <p:extLst>
+    <p:ext uri="{EFAFB233-063F-42B5-8137-9DF3F51BA10A}">
+      <p15:sldGuideLst xmlns:p15="http://schemas.microsoft.com/office/powerpoint/2012/main">
+        <p15:guide id="1" orient="horz">
+          <p15:clr>
+            <a:srgbClr val="A4A3A4"/>
+          </p15:clr>
+        </p15:guide>
+        <p15:guide id="2" pos="2880">
+          <p15:clr>
+            <a:srgbClr val="A4A3A4"/>
+          </p15:clr>
+        </p15:guide>
+        <p15:guide id="3" pos="6">
+          <p15:clr>
+            <a:srgbClr val="A4A3A4"/>
+          </p15:clr>
+        </p15:guide>
+      </p15:sldGuideLst>
+    </p:ext>
+    <p:ext uri="{2D200454-40CA-4A62-9FC3-DE9A4176ACB9}">
+      <p15:notesGuideLst xmlns:p15="http://schemas.microsoft.com/office/powerpoint/2012/main">
+        <p15:guide id="1" orient="horz" pos="3126">
+          <p15:clr>
+            <a:srgbClr val="A4A3A4"/>
+          </p15:clr>
+        </p15:guide>
+        <p15:guide id="2" pos="2140">
+          <p15:clr>
+            <a:srgbClr val="A4A3A4"/>
+          </p15:clr>
+        </p15:guide>
+      </p15:notesGuideLst>
+    </p:ext>
+  </p:extLst>
 </p:presentation>
+</file>
+
+<file path=ppt/revisionInfo.xml><?xml version="1.0" encoding="utf-8"?>
+<p1510:revInfo xmlns:a="http://schemas.openxmlformats.org/drawingml/2006/main" xmlns:r="http://schemas.openxmlformats.org/officeDocument/2006/relationships" xmlns:p1510="http://schemas.microsoft.com/office/powerpoint/2015/10/main"/>
 </file>
 
 <file path=ppt/handoutMasters/handoutMaster1.xml><?xml version="1.0" encoding="utf-8"?>
@@ -554,35 +604,35 @@
           <a:p>
             <a:pPr lvl="0"/>
             <a:r>
-              <a:rPr lang="en-GB" altLang="ko-KR" smtClean="0"/>
+              <a:rPr lang="en-GB" altLang="ko-KR"/>
               <a:t>Click to edit Master text styles</a:t>
             </a:r>
           </a:p>
           <a:p>
             <a:pPr lvl="1"/>
             <a:r>
-              <a:rPr lang="en-GB" altLang="ko-KR" smtClean="0"/>
+              <a:rPr lang="en-GB" altLang="ko-KR"/>
               <a:t>Second level</a:t>
             </a:r>
           </a:p>
           <a:p>
             <a:pPr lvl="2"/>
             <a:r>
-              <a:rPr lang="en-GB" altLang="ko-KR" smtClean="0"/>
+              <a:rPr lang="en-GB" altLang="ko-KR"/>
               <a:t>Third level</a:t>
             </a:r>
           </a:p>
           <a:p>
             <a:pPr lvl="3"/>
             <a:r>
-              <a:rPr lang="en-GB" altLang="ko-KR" smtClean="0"/>
+              <a:rPr lang="en-GB" altLang="ko-KR"/>
               <a:t>Fourth level</a:t>
             </a:r>
           </a:p>
           <a:p>
             <a:pPr lvl="4"/>
             <a:r>
-              <a:rPr lang="en-GB" altLang="ko-KR" smtClean="0"/>
+              <a:rPr lang="en-GB" altLang="ko-KR"/>
               <a:t>Fifth level</a:t>
             </a:r>
           </a:p>
@@ -973,7 +1023,7 @@
           </a:bodyPr>
           <a:lstStyle/>
           <a:p>
-            <a:endParaRPr lang="en-US" altLang="ko-KR" sz="2400" b="1" dirty="0" smtClean="0">
+            <a:endParaRPr lang="en-US" altLang="ko-KR" sz="2400" b="1" dirty="0">
               <a:latin typeface="HY헤드라인M" pitchFamily="18" charset="-127"/>
               <a:ea typeface="HY헤드라인M" pitchFamily="18" charset="-127"/>
             </a:endParaRPr>
@@ -1027,18 +1077,13 @@
             </a:lvl1pPr>
           </a:lstStyle>
           <a:p>
-            <a:r>
-              <a:rPr lang="en-US" altLang="ko-KR" dirty="0" smtClean="0"/>
-              <a:t/>
-            </a:r>
             <a:br>
-              <a:rPr lang="en-US" altLang="ko-KR" dirty="0" smtClean="0"/>
+              <a:rPr lang="en-US" altLang="ko-KR" dirty="0"/>
             </a:br>
             <a:r>
-              <a:rPr lang="ko-KR" altLang="en-US" dirty="0" smtClean="0"/>
+              <a:rPr lang="ko-KR" altLang="en-US" dirty="0"/>
               <a:t>마스터 제목 스타일 편집</a:t>
             </a:r>
-            <a:endParaRPr lang="ko-KR" altLang="en-US" dirty="0"/>
           </a:p>
         </p:txBody>
       </p:sp>
@@ -1090,10 +1135,34 @@
             <a:tbl>
               <a:tblPr/>
               <a:tblGrid>
-                <a:gridCol w="1022523"/>
-                <a:gridCol w="3439486"/>
-                <a:gridCol w="947956"/>
-                <a:gridCol w="3523377"/>
+                <a:gridCol w="1022523">
+                  <a:extLst>
+                    <a:ext uri="{9D8B030D-6E8A-4147-A177-3AD203B41FA5}">
+                      <a16:colId xmlns:a16="http://schemas.microsoft.com/office/drawing/2014/main" val="20000"/>
+                    </a:ext>
+                  </a:extLst>
+                </a:gridCol>
+                <a:gridCol w="3439486">
+                  <a:extLst>
+                    <a:ext uri="{9D8B030D-6E8A-4147-A177-3AD203B41FA5}">
+                      <a16:colId xmlns:a16="http://schemas.microsoft.com/office/drawing/2014/main" val="20001"/>
+                    </a:ext>
+                  </a:extLst>
+                </a:gridCol>
+                <a:gridCol w="947956">
+                  <a:extLst>
+                    <a:ext uri="{9D8B030D-6E8A-4147-A177-3AD203B41FA5}">
+                      <a16:colId xmlns:a16="http://schemas.microsoft.com/office/drawing/2014/main" val="20002"/>
+                    </a:ext>
+                  </a:extLst>
+                </a:gridCol>
+                <a:gridCol w="3523377">
+                  <a:extLst>
+                    <a:ext uri="{9D8B030D-6E8A-4147-A177-3AD203B41FA5}">
+                      <a16:colId xmlns:a16="http://schemas.microsoft.com/office/drawing/2014/main" val="20003"/>
+                    </a:ext>
+                  </a:extLst>
+                </a:gridCol>
               </a:tblGrid>
               <a:tr h="299619">
                 <a:tc rowSpan="2">
@@ -1118,7 +1187,7 @@
                         <a:tabLst/>
                       </a:pPr>
                       <a:r>
-                        <a:rPr kumimoji="1" lang="ko-KR" altLang="en-US" sz="900" b="0" i="0" u="none" strike="noStrike" cap="none" normalizeH="0" baseline="0" dirty="0" smtClean="0">
+                        <a:rPr kumimoji="1" lang="ko-KR" altLang="en-US" sz="900" b="0" i="0" u="none" strike="noStrike" cap="none" normalizeH="0" baseline="0" dirty="0">
                           <a:ln>
                             <a:noFill/>
                           </a:ln>
@@ -1131,7 +1200,7 @@
                         </a:rPr>
                         <a:t>프로젝트 명</a:t>
                       </a:r>
-                      <a:endParaRPr kumimoji="1" lang="ko-KR" altLang="ko-KR" sz="900" b="0" i="0" u="none" strike="noStrike" cap="none" normalizeH="0" baseline="0" dirty="0" smtClean="0">
+                      <a:endParaRPr kumimoji="1" lang="ko-KR" altLang="ko-KR" sz="900" b="0" i="0" u="none" strike="noStrike" cap="none" normalizeH="0" baseline="0" dirty="0">
                         <a:ln>
                           <a:noFill/>
                         </a:ln>
@@ -1213,7 +1282,7 @@
                         <a:buNone/>
                         <a:tabLst/>
                       </a:pPr>
-                      <a:endParaRPr kumimoji="1" lang="ko-KR" altLang="ko-KR" sz="900" b="0" i="0" u="none" strike="noStrike" cap="none" normalizeH="0" baseline="0" dirty="0" smtClean="0">
+                      <a:endParaRPr kumimoji="1" lang="ko-KR" altLang="ko-KR" sz="900" b="0" i="0" u="none" strike="noStrike" cap="none" normalizeH="0" baseline="0" dirty="0">
                         <a:ln>
                           <a:noFill/>
                         </a:ln>
@@ -1294,7 +1363,7 @@
                         <a:tabLst/>
                       </a:pPr>
                       <a:r>
-                        <a:rPr kumimoji="1" lang="ko-KR" altLang="en-US" sz="900" b="0" i="0" u="none" strike="noStrike" cap="none" normalizeH="0" baseline="0" dirty="0" smtClean="0">
+                        <a:rPr kumimoji="1" lang="ko-KR" altLang="en-US" sz="900" b="0" i="0" u="none" strike="noStrike" cap="none" normalizeH="0" baseline="0" dirty="0">
                           <a:ln>
                             <a:noFill/>
                           </a:ln>
@@ -1307,7 +1376,7 @@
                         </a:rPr>
                         <a:t>문서 명</a:t>
                       </a:r>
-                      <a:endParaRPr kumimoji="1" lang="ko-KR" altLang="ko-KR" sz="900" b="0" i="0" u="none" strike="noStrike" cap="none" normalizeH="0" baseline="0" dirty="0" smtClean="0">
+                      <a:endParaRPr kumimoji="1" lang="ko-KR" altLang="ko-KR" sz="900" b="0" i="0" u="none" strike="noStrike" cap="none" normalizeH="0" baseline="0" dirty="0">
                         <a:ln>
                           <a:noFill/>
                         </a:ln>
@@ -1390,7 +1459,7 @@
                         <a:tabLst/>
                       </a:pPr>
                       <a:r>
-                        <a:rPr kumimoji="1" lang="en-US" altLang="ko-KR" sz="900" b="0" i="0" u="none" strike="noStrike" cap="none" normalizeH="0" baseline="0" dirty="0" smtClean="0">
+                        <a:rPr kumimoji="1" lang="en-US" altLang="ko-KR" sz="900" b="0" i="0" u="none" strike="noStrike" cap="none" normalizeH="0" baseline="0" dirty="0">
                           <a:ln>
                             <a:noFill/>
                           </a:ln>
@@ -1404,7 +1473,7 @@
                         <a:t>Class </a:t>
                       </a:r>
                       <a:r>
-                        <a:rPr kumimoji="1" lang="ko-KR" altLang="en-US" sz="900" b="0" i="0" u="none" strike="noStrike" cap="none" normalizeH="0" baseline="0" dirty="0" smtClean="0">
+                        <a:rPr kumimoji="1" lang="ko-KR" altLang="en-US" sz="900" b="0" i="0" u="none" strike="noStrike" cap="none" normalizeH="0" baseline="0" dirty="0">
                           <a:ln>
                             <a:noFill/>
                           </a:ln>
@@ -1417,7 +1486,7 @@
                         </a:rPr>
                         <a:t>설계서</a:t>
                       </a:r>
-                      <a:endParaRPr kumimoji="1" lang="ko-KR" sz="900" b="0" i="0" u="none" strike="noStrike" cap="none" normalizeH="0" baseline="0" dirty="0" smtClean="0">
+                      <a:endParaRPr kumimoji="1" lang="ko-KR" sz="900" b="0" i="0" u="none" strike="noStrike" cap="none" normalizeH="0" baseline="0" dirty="0">
                         <a:ln>
                           <a:noFill/>
                         </a:ln>
@@ -1476,6 +1545,11 @@
                     <a:noFill/>
                   </a:tcPr>
                 </a:tc>
+                <a:extLst>
+                  <a:ext uri="{0D108BD9-81ED-4DB2-BD59-A6C34878D82A}">
+                    <a16:rowId xmlns:a16="http://schemas.microsoft.com/office/drawing/2014/main" val="10000"/>
+                  </a:ext>
+                </a:extLst>
               </a:tr>
               <a:tr h="297106">
                 <a:tc vMerge="1">
@@ -1499,7 +1573,7 @@
                         <a:buNone/>
                         <a:tabLst/>
                       </a:pPr>
-                      <a:endParaRPr kumimoji="1" lang="ko-KR" sz="900" b="0" i="0" u="none" strike="noStrike" cap="none" normalizeH="0" baseline="0" dirty="0" smtClean="0">
+                      <a:endParaRPr kumimoji="1" lang="ko-KR" sz="900" b="0" i="0" u="none" strike="noStrike" cap="none" normalizeH="0" baseline="0" dirty="0">
                         <a:ln>
                           <a:noFill/>
                         </a:ln>
@@ -1581,7 +1655,7 @@
                         <a:buNone/>
                         <a:tabLst/>
                       </a:pPr>
-                      <a:endParaRPr kumimoji="1" lang="ko-KR" altLang="ko-KR" sz="900" b="0" i="0" u="none" strike="noStrike" cap="none" normalizeH="0" baseline="0" dirty="0" smtClean="0">
+                      <a:endParaRPr kumimoji="1" lang="ko-KR" altLang="ko-KR" sz="900" b="0" i="0" u="none" strike="noStrike" cap="none" normalizeH="0" baseline="0" dirty="0">
                         <a:ln>
                           <a:noFill/>
                         </a:ln>
@@ -1662,7 +1736,7 @@
                         <a:tabLst/>
                       </a:pPr>
                       <a:r>
-                        <a:rPr kumimoji="1" lang="ko-KR" altLang="en-US" sz="900" b="0" i="0" u="none" strike="noStrike" cap="none" normalizeH="0" baseline="0" dirty="0" smtClean="0">
+                        <a:rPr kumimoji="1" lang="ko-KR" altLang="en-US" sz="900" b="0" i="0" u="none" strike="noStrike" cap="none" normalizeH="0" baseline="0" dirty="0">
                           <a:ln>
                             <a:noFill/>
                           </a:ln>
@@ -1675,7 +1749,7 @@
                         </a:rPr>
                         <a:t>버전</a:t>
                       </a:r>
-                      <a:endParaRPr kumimoji="1" lang="ko-KR" altLang="ko-KR" sz="900" b="0" i="0" u="none" strike="noStrike" cap="none" normalizeH="0" baseline="0" dirty="0" smtClean="0">
+                      <a:endParaRPr kumimoji="1" lang="ko-KR" altLang="ko-KR" sz="900" b="0" i="0" u="none" strike="noStrike" cap="none" normalizeH="0" baseline="0" dirty="0">
                         <a:ln>
                           <a:noFill/>
                         </a:ln>
@@ -1758,7 +1832,7 @@
                         <a:tabLst/>
                       </a:pPr>
                       <a:r>
-                        <a:rPr kumimoji="1" lang="en-US" altLang="ko-KR" sz="900" b="0" i="0" u="none" strike="noStrike" cap="none" normalizeH="0" baseline="0" dirty="0" smtClean="0">
+                        <a:rPr kumimoji="1" lang="en-US" altLang="ko-KR" sz="900" b="0" i="0" u="none" strike="noStrike" cap="none" normalizeH="0" baseline="0" dirty="0">
                           <a:ln>
                             <a:noFill/>
                           </a:ln>
@@ -1771,7 +1845,7 @@
                         </a:rPr>
                         <a:t>V X.X</a:t>
                       </a:r>
-                      <a:endParaRPr kumimoji="1" lang="ko-KR" altLang="ko-KR" sz="900" b="0" i="0" u="none" strike="noStrike" cap="none" normalizeH="0" baseline="0" dirty="0" smtClean="0">
+                      <a:endParaRPr kumimoji="1" lang="ko-KR" altLang="ko-KR" sz="900" b="0" i="0" u="none" strike="noStrike" cap="none" normalizeH="0" baseline="0" dirty="0">
                         <a:ln>
                           <a:noFill/>
                         </a:ln>
@@ -1830,6 +1904,11 @@
                     <a:noFill/>
                   </a:tcPr>
                 </a:tc>
+                <a:extLst>
+                  <a:ext uri="{0D108BD9-81ED-4DB2-BD59-A6C34878D82A}">
+                    <a16:rowId xmlns:a16="http://schemas.microsoft.com/office/drawing/2014/main" val="10001"/>
+                  </a:ext>
+                </a:extLst>
               </a:tr>
             </a:tbl>
           </a:graphicData>
@@ -1882,7 +1961,7 @@
           <a:p>
             <a:pPr algn="r"/>
             <a:r>
-              <a:rPr lang="ko-KR" altLang="en-US" dirty="0" smtClean="0"/>
+              <a:rPr lang="ko-KR" altLang="en-US" dirty="0"/>
               <a:t>팀 명</a:t>
             </a:r>
             <a:endParaRPr lang="en-US" altLang="ko-KR" dirty="0"/>
@@ -1939,7 +2018,7 @@
               <a:buNone/>
               <a:tabLst/>
             </a:pPr>
-            <a:endParaRPr kumimoji="0" lang="ko-KR" altLang="en-US" sz="1400" b="0" i="0" u="none" strike="noStrike" cap="none" normalizeH="0" baseline="0" smtClean="0">
+            <a:endParaRPr kumimoji="0" lang="ko-KR" altLang="en-US" sz="1400" b="0" i="0" u="none" strike="noStrike" cap="none" normalizeH="0" baseline="0">
               <a:ln>
                 <a:noFill/>
               </a:ln>
@@ -2008,7 +2087,7 @@
           </a:lstStyle>
           <a:p>
             <a:r>
-              <a:rPr lang="ko-KR" altLang="en-US" smtClean="0"/>
+              <a:rPr lang="ko-KR" altLang="en-US"/>
               <a:t>마스터 제목 스타일 편집</a:t>
             </a:r>
             <a:endParaRPr lang="ko-KR" altLang="en-US" dirty="0"/>
@@ -2058,35 +2137,35 @@
           <a:p>
             <a:pPr lvl="0"/>
             <a:r>
-              <a:rPr lang="ko-KR" altLang="en-US" smtClean="0"/>
+              <a:rPr lang="ko-KR" altLang="en-US"/>
               <a:t>마스터 텍스트 스타일을 편집합니다</a:t>
             </a:r>
           </a:p>
           <a:p>
             <a:pPr lvl="1"/>
             <a:r>
-              <a:rPr lang="ko-KR" altLang="en-US" smtClean="0"/>
+              <a:rPr lang="ko-KR" altLang="en-US"/>
               <a:t>둘째 수준</a:t>
             </a:r>
           </a:p>
           <a:p>
             <a:pPr lvl="2"/>
             <a:r>
-              <a:rPr lang="ko-KR" altLang="en-US" smtClean="0"/>
+              <a:rPr lang="ko-KR" altLang="en-US"/>
               <a:t>셋째 수준</a:t>
             </a:r>
           </a:p>
           <a:p>
             <a:pPr lvl="3"/>
             <a:r>
-              <a:rPr lang="ko-KR" altLang="en-US" smtClean="0"/>
+              <a:rPr lang="ko-KR" altLang="en-US"/>
               <a:t>넷째 수준</a:t>
             </a:r>
           </a:p>
           <a:p>
             <a:pPr lvl="4"/>
             <a:r>
-              <a:rPr lang="ko-KR" altLang="en-US" smtClean="0"/>
+              <a:rPr lang="ko-KR" altLang="en-US"/>
               <a:t>다섯째 수준</a:t>
             </a:r>
             <a:endParaRPr lang="ko-KR" altLang="en-US" dirty="0"/>
@@ -2210,7 +2289,7 @@
           <a:p>
             <a:pPr algn="r"/>
             <a:r>
-              <a:rPr lang="ko-KR" altLang="en-US" dirty="0" smtClean="0"/>
+              <a:rPr lang="ko-KR" altLang="en-US" dirty="0"/>
               <a:t>팀 명</a:t>
             </a:r>
             <a:endParaRPr lang="en-US" altLang="ko-KR" dirty="0"/>
@@ -2415,7 +2494,7 @@
           <a:p>
             <a:pPr algn="r"/>
             <a:r>
-              <a:rPr lang="ko-KR" altLang="en-US" dirty="0" smtClean="0"/>
+              <a:rPr lang="ko-KR" altLang="en-US" dirty="0"/>
               <a:t>팀 명</a:t>
             </a:r>
             <a:endParaRPr lang="en-US" altLang="ko-KR" dirty="0"/>
@@ -2961,22 +3040,17 @@
           <a:bodyPr/>
           <a:lstStyle/>
           <a:p>
-            <a:r>
-              <a:rPr lang="en-US" altLang="ko-KR" dirty="0" smtClean="0"/>
-              <a:t/>
-            </a:r>
             <a:br>
-              <a:rPr lang="en-US" altLang="ko-KR" dirty="0" smtClean="0"/>
+              <a:rPr lang="en-US" altLang="ko-KR" dirty="0"/>
             </a:br>
             <a:r>
-              <a:rPr lang="en-US" altLang="ko-KR" dirty="0" smtClean="0"/>
+              <a:rPr lang="en-US" altLang="ko-KR" dirty="0"/>
               <a:t>Class </a:t>
             </a:r>
             <a:r>
-              <a:rPr lang="ko-KR" altLang="en-US" dirty="0" smtClean="0"/>
+              <a:rPr lang="ko-KR" altLang="en-US" dirty="0"/>
               <a:t>설계서</a:t>
             </a:r>
-            <a:endParaRPr lang="ko-KR" altLang="en-US" dirty="0"/>
           </a:p>
         </p:txBody>
       </p:sp>
@@ -2988,8 +3062,8 @@
         </p:nvSpPr>
         <p:spPr>
           <a:xfrm>
-            <a:off x="7751445" y="4372844"/>
-            <a:ext cx="768159" cy="400110"/>
+            <a:off x="7253605" y="4372844"/>
+            <a:ext cx="1581780" cy="400110"/>
           </a:xfrm>
           <a:prstGeom prst="rect">
             <a:avLst/>
@@ -3003,14 +3077,1270 @@
           <a:lstStyle/>
           <a:p>
             <a:r>
-              <a:rPr lang="ko-KR" altLang="en-US" sz="2000" dirty="0" smtClean="0"/>
-              <a:t>팀 명</a:t>
+              <a:rPr lang="en-US" altLang="ko-KR" sz="2000" dirty="0" err="1"/>
+              <a:t>TenoutofTen</a:t>
             </a:r>
             <a:endParaRPr lang="ko-KR" altLang="en-US" sz="2000" dirty="0"/>
           </a:p>
         </p:txBody>
       </p:sp>
     </p:spTree>
+  </p:cSld>
+  <p:clrMapOvr>
+    <a:masterClrMapping/>
+  </p:clrMapOvr>
+</p:sld>
+</file>
+
+<file path=ppt/slides/slide10.xml><?xml version="1.0" encoding="utf-8"?>
+<p:sld xmlns:a="http://schemas.openxmlformats.org/drawingml/2006/main" xmlns:r="http://schemas.openxmlformats.org/officeDocument/2006/relationships" xmlns:p="http://schemas.openxmlformats.org/presentationml/2006/main">
+  <p:cSld>
+    <p:spTree>
+      <p:nvGrpSpPr>
+        <p:cNvPr id="1" name=""/>
+        <p:cNvGrpSpPr/>
+        <p:nvPr/>
+      </p:nvGrpSpPr>
+      <p:grpSpPr>
+        <a:xfrm>
+          <a:off x="0" y="0"/>
+          <a:ext cx="0" cy="0"/>
+          <a:chOff x="0" y="0"/>
+          <a:chExt cx="0" cy="0"/>
+        </a:xfrm>
+      </p:grpSpPr>
+      <p:sp>
+        <p:nvSpPr>
+          <p:cNvPr id="2" name="제목 1"/>
+          <p:cNvSpPr>
+            <a:spLocks noGrp="1"/>
+          </p:cNvSpPr>
+          <p:nvPr>
+            <p:ph type="ctrTitle"/>
+          </p:nvPr>
+        </p:nvSpPr>
+        <p:spPr/>
+        <p:txBody>
+          <a:bodyPr/>
+          <a:lstStyle/>
+          <a:p>
+            <a:pPr algn="ctr"/>
+            <a:r>
+              <a:rPr lang="en-US" altLang="ko-KR" sz="4500" dirty="0"/>
+              <a:t>Control Class</a:t>
+            </a:r>
+            <a:endParaRPr lang="ko-KR" altLang="en-US" sz="4500" dirty="0"/>
+          </a:p>
+        </p:txBody>
+      </p:sp>
+    </p:spTree>
+    <p:extLst>
+      <p:ext uri="{BB962C8B-B14F-4D97-AF65-F5344CB8AC3E}">
+        <p14:creationId xmlns:p14="http://schemas.microsoft.com/office/powerpoint/2010/main" val="2616846915"/>
+      </p:ext>
+    </p:extLst>
+  </p:cSld>
+  <p:clrMapOvr>
+    <a:masterClrMapping/>
+  </p:clrMapOvr>
+</p:sld>
+</file>
+
+<file path=ppt/slides/slide11.xml><?xml version="1.0" encoding="utf-8"?>
+<p:sld xmlns:a="http://schemas.openxmlformats.org/drawingml/2006/main" xmlns:r="http://schemas.openxmlformats.org/officeDocument/2006/relationships" xmlns:p="http://schemas.openxmlformats.org/presentationml/2006/main">
+  <p:cSld>
+    <p:spTree>
+      <p:nvGrpSpPr>
+        <p:cNvPr id="1" name=""/>
+        <p:cNvGrpSpPr/>
+        <p:nvPr/>
+      </p:nvGrpSpPr>
+      <p:grpSpPr>
+        <a:xfrm>
+          <a:off x="0" y="0"/>
+          <a:ext cx="0" cy="0"/>
+          <a:chOff x="0" y="0"/>
+          <a:chExt cx="0" cy="0"/>
+        </a:xfrm>
+      </p:grpSpPr>
+      <p:sp>
+        <p:nvSpPr>
+          <p:cNvPr id="2" name="제목 1"/>
+          <p:cNvSpPr>
+            <a:spLocks noGrp="1"/>
+          </p:cNvSpPr>
+          <p:nvPr>
+            <p:ph type="title"/>
+          </p:nvPr>
+        </p:nvSpPr>
+        <p:spPr>
+          <a:xfrm>
+            <a:off x="352425" y="220211"/>
+            <a:ext cx="8327552" cy="625950"/>
+          </a:xfrm>
+        </p:spPr>
+        <p:txBody>
+          <a:bodyPr/>
+          <a:lstStyle/>
+          <a:p>
+            <a:r>
+              <a:rPr lang="en-US" altLang="ko-KR" sz="2500" dirty="0"/>
+              <a:t>Control Class</a:t>
+            </a:r>
+            <a:endParaRPr lang="ko-KR" altLang="en-US" sz="2500" dirty="0"/>
+          </a:p>
+        </p:txBody>
+      </p:sp>
+      <p:sp>
+        <p:nvSpPr>
+          <p:cNvPr id="4" name="바닥글 개체 틀 3"/>
+          <p:cNvSpPr>
+            <a:spLocks noGrp="1"/>
+          </p:cNvSpPr>
+          <p:nvPr>
+            <p:ph type="ftr" sz="quarter" idx="3"/>
+          </p:nvPr>
+        </p:nvSpPr>
+        <p:spPr/>
+        <p:txBody>
+          <a:bodyPr/>
+          <a:lstStyle/>
+          <a:p>
+            <a:pPr algn="r"/>
+            <a:r>
+              <a:rPr lang="ko-KR" altLang="en-US"/>
+              <a:t>팀 명</a:t>
+            </a:r>
+            <a:endParaRPr lang="en-US" altLang="ko-KR" dirty="0"/>
+          </a:p>
+        </p:txBody>
+      </p:sp>
+      <p:graphicFrame>
+        <p:nvGraphicFramePr>
+          <p:cNvPr id="5" name="표 4"/>
+          <p:cNvGraphicFramePr>
+            <a:graphicFrameLocks noGrp="1"/>
+          </p:cNvGraphicFramePr>
+          <p:nvPr/>
+        </p:nvGraphicFramePr>
+        <p:xfrm>
+          <a:off x="352425" y="1228296"/>
+          <a:ext cx="8327551" cy="4967787"/>
+        </p:xfrm>
+        <a:graphic>
+          <a:graphicData uri="http://schemas.openxmlformats.org/drawingml/2006/table">
+            <a:tbl>
+              <a:tblPr firstRow="1" bandRow="1">
+                <a:tableStyleId>{17292A2E-F333-43FB-9621-5CBBE7FDCDCB}</a:tableStyleId>
+              </a:tblPr>
+              <a:tblGrid>
+                <a:gridCol w="8327551">
+                  <a:extLst>
+                    <a:ext uri="{9D8B030D-6E8A-4147-A177-3AD203B41FA5}">
+                      <a16:colId xmlns:a16="http://schemas.microsoft.com/office/drawing/2014/main" val="20000"/>
+                    </a:ext>
+                  </a:extLst>
+                </a:gridCol>
+              </a:tblGrid>
+              <a:tr h="875279">
+                <a:tc>
+                  <a:txBody>
+                    <a:bodyPr/>
+                    <a:lstStyle/>
+                    <a:p>
+                      <a:r>
+                        <a:rPr lang="en-US" altLang="ko-KR" sz="4000" dirty="0" err="1"/>
+                        <a:t>LoginSystem</a:t>
+                      </a:r>
+                      <a:endParaRPr lang="ko-KR" altLang="en-US" sz="4000" dirty="0"/>
+                    </a:p>
+                  </a:txBody>
+                  <a:tcPr/>
+                </a:tc>
+                <a:extLst>
+                  <a:ext uri="{0D108BD9-81ED-4DB2-BD59-A6C34878D82A}">
+                    <a16:rowId xmlns:a16="http://schemas.microsoft.com/office/drawing/2014/main" val="10000"/>
+                  </a:ext>
+                </a:extLst>
+              </a:tr>
+              <a:tr h="2046254">
+                <a:tc>
+                  <a:txBody>
+                    <a:bodyPr/>
+                    <a:lstStyle/>
+                    <a:p>
+                      <a:r>
+                        <a:rPr lang="en-US" altLang="ko-KR" dirty="0"/>
+                        <a:t>-</a:t>
+                      </a:r>
+                      <a:r>
+                        <a:rPr lang="en-US" altLang="ko-KR" dirty="0" err="1"/>
+                        <a:t>loginedStudent</a:t>
+                      </a:r>
+                      <a:r>
+                        <a:rPr lang="en-US" altLang="ko-KR" dirty="0"/>
+                        <a:t> : Student</a:t>
+                      </a:r>
+                    </a:p>
+                    <a:p>
+                      <a:r>
+                        <a:rPr lang="en-US" altLang="ko-KR" dirty="0"/>
+                        <a:t>-</a:t>
+                      </a:r>
+                      <a:r>
+                        <a:rPr lang="en-US" altLang="ko-KR" dirty="0" err="1"/>
+                        <a:t>loginUI</a:t>
+                      </a:r>
+                      <a:r>
+                        <a:rPr lang="en-US" altLang="ko-KR" baseline="0" dirty="0"/>
+                        <a:t> :</a:t>
+                      </a:r>
+                      <a:r>
+                        <a:rPr lang="en-US" altLang="ko-KR" baseline="0" dirty="0" err="1"/>
+                        <a:t>LoginUI</a:t>
+                      </a:r>
+                      <a:endParaRPr lang="en-US" altLang="ko-KR" baseline="0" dirty="0"/>
+                    </a:p>
+                    <a:p>
+                      <a:r>
+                        <a:rPr lang="en-US" altLang="ko-KR" baseline="0" dirty="0"/>
+                        <a:t>-</a:t>
+                      </a:r>
+                      <a:r>
+                        <a:rPr lang="en-US" altLang="ko-KR" baseline="0" dirty="0" err="1"/>
+                        <a:t>mainUI</a:t>
+                      </a:r>
+                      <a:r>
+                        <a:rPr lang="en-US" altLang="ko-KR" baseline="0" dirty="0"/>
+                        <a:t> : </a:t>
+                      </a:r>
+                      <a:r>
+                        <a:rPr lang="en-US" altLang="ko-KR" baseline="0" dirty="0" err="1"/>
+                        <a:t>MainUI</a:t>
+                      </a:r>
+                      <a:endParaRPr lang="en-US" altLang="ko-KR" baseline="0" dirty="0"/>
+                    </a:p>
+                    <a:p>
+                      <a:r>
+                        <a:rPr lang="en-US" altLang="ko-KR" baseline="0" dirty="0"/>
+                        <a:t>-</a:t>
+                      </a:r>
+                      <a:r>
+                        <a:rPr lang="en-US" altLang="ko-KR" baseline="0" dirty="0" err="1"/>
+                        <a:t>registeredStudent</a:t>
+                      </a:r>
+                      <a:r>
+                        <a:rPr lang="en-US" altLang="ko-KR" baseline="0" dirty="0"/>
+                        <a:t> : </a:t>
+                      </a:r>
+                      <a:r>
+                        <a:rPr lang="en-US" altLang="ko-KR" baseline="0" dirty="0" err="1"/>
+                        <a:t>StudentList</a:t>
+                      </a:r>
+                      <a:endParaRPr lang="ko-KR" altLang="en-US" dirty="0"/>
+                    </a:p>
+                  </a:txBody>
+                  <a:tcPr/>
+                </a:tc>
+                <a:extLst>
+                  <a:ext uri="{0D108BD9-81ED-4DB2-BD59-A6C34878D82A}">
+                    <a16:rowId xmlns:a16="http://schemas.microsoft.com/office/drawing/2014/main" val="10001"/>
+                  </a:ext>
+                </a:extLst>
+              </a:tr>
+              <a:tr h="2046254">
+                <a:tc>
+                  <a:txBody>
+                    <a:bodyPr/>
+                    <a:lstStyle/>
+                    <a:p>
+                      <a:r>
+                        <a:rPr lang="en-US" altLang="ko-KR" dirty="0"/>
+                        <a:t>+</a:t>
+                      </a:r>
+                      <a:r>
+                        <a:rPr lang="en-US" altLang="ko-KR" dirty="0" err="1"/>
+                        <a:t>LoginSystem</a:t>
+                      </a:r>
+                      <a:r>
+                        <a:rPr lang="en-US" altLang="ko-KR" baseline="0" dirty="0"/>
+                        <a:t> ( login UI : Login UI )</a:t>
+                      </a:r>
+                    </a:p>
+                    <a:p>
+                      <a:r>
+                        <a:rPr lang="en-US" altLang="ko-KR" baseline="0" dirty="0"/>
+                        <a:t>+</a:t>
+                      </a:r>
+                      <a:r>
+                        <a:rPr lang="en-US" altLang="ko-KR" baseline="0" dirty="0" err="1"/>
+                        <a:t>isLogin</a:t>
+                      </a:r>
+                      <a:r>
+                        <a:rPr lang="en-US" altLang="ko-KR" baseline="0" dirty="0"/>
+                        <a:t> ( id : String , </a:t>
+                      </a:r>
+                      <a:r>
+                        <a:rPr lang="en-US" altLang="ko-KR" baseline="0" dirty="0" err="1"/>
+                        <a:t>pwd</a:t>
+                      </a:r>
+                      <a:r>
+                        <a:rPr lang="en-US" altLang="ko-KR" baseline="0" dirty="0"/>
+                        <a:t> : String )</a:t>
+                      </a:r>
+                    </a:p>
+                    <a:p>
+                      <a:r>
+                        <a:rPr lang="en-US" altLang="ko-KR" baseline="0" dirty="0"/>
+                        <a:t>+login ( </a:t>
+                      </a:r>
+                      <a:r>
+                        <a:rPr lang="en-US" altLang="ko-KR" baseline="0" dirty="0" err="1"/>
+                        <a:t>loginedStudent</a:t>
+                      </a:r>
+                      <a:r>
+                        <a:rPr lang="en-US" altLang="ko-KR" baseline="0" dirty="0"/>
+                        <a:t> : </a:t>
+                      </a:r>
+                      <a:r>
+                        <a:rPr lang="en-US" altLang="ko-KR" baseline="0" dirty="0" err="1"/>
+                        <a:t>Strudent</a:t>
+                      </a:r>
+                      <a:r>
+                        <a:rPr lang="en-US" altLang="ko-KR" baseline="0" dirty="0"/>
+                        <a:t> )</a:t>
+                      </a:r>
+                    </a:p>
+                    <a:p>
+                      <a:r>
+                        <a:rPr lang="en-US" altLang="ko-KR" baseline="0" dirty="0"/>
+                        <a:t>+logout()</a:t>
+                      </a:r>
+                    </a:p>
+                    <a:p>
+                      <a:r>
+                        <a:rPr lang="en-US" altLang="ko-KR" baseline="0" dirty="0"/>
+                        <a:t>+</a:t>
+                      </a:r>
+                      <a:r>
+                        <a:rPr lang="en-US" altLang="ko-KR" baseline="0" dirty="0" err="1"/>
+                        <a:t>getLoginedStudent</a:t>
+                      </a:r>
+                      <a:r>
+                        <a:rPr lang="en-US" altLang="ko-KR" baseline="0" dirty="0"/>
+                        <a:t> : Student</a:t>
+                      </a:r>
+                    </a:p>
+                  </a:txBody>
+                  <a:tcPr/>
+                </a:tc>
+                <a:extLst>
+                  <a:ext uri="{0D108BD9-81ED-4DB2-BD59-A6C34878D82A}">
+                    <a16:rowId xmlns:a16="http://schemas.microsoft.com/office/drawing/2014/main" val="10002"/>
+                  </a:ext>
+                </a:extLst>
+              </a:tr>
+            </a:tbl>
+          </a:graphicData>
+        </a:graphic>
+      </p:graphicFrame>
+    </p:spTree>
+    <p:extLst>
+      <p:ext uri="{BB962C8B-B14F-4D97-AF65-F5344CB8AC3E}">
+        <p14:creationId xmlns:p14="http://schemas.microsoft.com/office/powerpoint/2010/main" val="2134069634"/>
+      </p:ext>
+    </p:extLst>
+  </p:cSld>
+  <p:clrMapOvr>
+    <a:masterClrMapping/>
+  </p:clrMapOvr>
+</p:sld>
+</file>
+
+<file path=ppt/slides/slide12.xml><?xml version="1.0" encoding="utf-8"?>
+<p:sld xmlns:a="http://schemas.openxmlformats.org/drawingml/2006/main" xmlns:r="http://schemas.openxmlformats.org/officeDocument/2006/relationships" xmlns:p="http://schemas.openxmlformats.org/presentationml/2006/main">
+  <p:cSld>
+    <p:spTree>
+      <p:nvGrpSpPr>
+        <p:cNvPr id="1" name=""/>
+        <p:cNvGrpSpPr/>
+        <p:nvPr/>
+      </p:nvGrpSpPr>
+      <p:grpSpPr>
+        <a:xfrm>
+          <a:off x="0" y="0"/>
+          <a:ext cx="0" cy="0"/>
+          <a:chOff x="0" y="0"/>
+          <a:chExt cx="0" cy="0"/>
+        </a:xfrm>
+      </p:grpSpPr>
+      <p:sp>
+        <p:nvSpPr>
+          <p:cNvPr id="2" name="제목 1"/>
+          <p:cNvSpPr>
+            <a:spLocks noGrp="1"/>
+          </p:cNvSpPr>
+          <p:nvPr>
+            <p:ph type="title"/>
+          </p:nvPr>
+        </p:nvSpPr>
+        <p:spPr>
+          <a:xfrm>
+            <a:off x="352425" y="220211"/>
+            <a:ext cx="8327552" cy="625950"/>
+          </a:xfrm>
+        </p:spPr>
+        <p:txBody>
+          <a:bodyPr/>
+          <a:lstStyle/>
+          <a:p>
+            <a:r>
+              <a:rPr lang="en-US" altLang="ko-KR" sz="2500" dirty="0"/>
+              <a:t>Control Class</a:t>
+            </a:r>
+            <a:endParaRPr lang="ko-KR" altLang="en-US" sz="2500" dirty="0"/>
+          </a:p>
+        </p:txBody>
+      </p:sp>
+      <p:sp>
+        <p:nvSpPr>
+          <p:cNvPr id="4" name="바닥글 개체 틀 3"/>
+          <p:cNvSpPr>
+            <a:spLocks noGrp="1"/>
+          </p:cNvSpPr>
+          <p:nvPr>
+            <p:ph type="ftr" sz="quarter" idx="3"/>
+          </p:nvPr>
+        </p:nvSpPr>
+        <p:spPr/>
+        <p:txBody>
+          <a:bodyPr/>
+          <a:lstStyle/>
+          <a:p>
+            <a:pPr algn="r"/>
+            <a:r>
+              <a:rPr lang="ko-KR" altLang="en-US"/>
+              <a:t>팀 명</a:t>
+            </a:r>
+            <a:endParaRPr lang="en-US" altLang="ko-KR" dirty="0"/>
+          </a:p>
+        </p:txBody>
+      </p:sp>
+      <p:graphicFrame>
+        <p:nvGraphicFramePr>
+          <p:cNvPr id="5" name="표 4"/>
+          <p:cNvGraphicFramePr>
+            <a:graphicFrameLocks noGrp="1"/>
+          </p:cNvGraphicFramePr>
+          <p:nvPr/>
+        </p:nvGraphicFramePr>
+        <p:xfrm>
+          <a:off x="352425" y="1228296"/>
+          <a:ext cx="8327551" cy="4967787"/>
+        </p:xfrm>
+        <a:graphic>
+          <a:graphicData uri="http://schemas.openxmlformats.org/drawingml/2006/table">
+            <a:tbl>
+              <a:tblPr firstRow="1" bandRow="1">
+                <a:tableStyleId>{17292A2E-F333-43FB-9621-5CBBE7FDCDCB}</a:tableStyleId>
+              </a:tblPr>
+              <a:tblGrid>
+                <a:gridCol w="8327551">
+                  <a:extLst>
+                    <a:ext uri="{9D8B030D-6E8A-4147-A177-3AD203B41FA5}">
+                      <a16:colId xmlns:a16="http://schemas.microsoft.com/office/drawing/2014/main" val="20000"/>
+                    </a:ext>
+                  </a:extLst>
+                </a:gridCol>
+              </a:tblGrid>
+              <a:tr h="875279">
+                <a:tc>
+                  <a:txBody>
+                    <a:bodyPr/>
+                    <a:lstStyle/>
+                    <a:p>
+                      <a:r>
+                        <a:rPr lang="en-US" altLang="ko-KR" sz="4000" dirty="0" err="1"/>
+                        <a:t>Show</a:t>
+                      </a:r>
+                      <a:r>
+                        <a:rPr lang="en-US" altLang="ko-KR" sz="4000" baseline="0" dirty="0" err="1"/>
+                        <a:t>CourseSystem</a:t>
+                      </a:r>
+                      <a:endParaRPr lang="ko-KR" altLang="en-US" sz="4000" dirty="0"/>
+                    </a:p>
+                  </a:txBody>
+                  <a:tcPr/>
+                </a:tc>
+                <a:extLst>
+                  <a:ext uri="{0D108BD9-81ED-4DB2-BD59-A6C34878D82A}">
+                    <a16:rowId xmlns:a16="http://schemas.microsoft.com/office/drawing/2014/main" val="10000"/>
+                  </a:ext>
+                </a:extLst>
+              </a:tr>
+              <a:tr h="2046254">
+                <a:tc>
+                  <a:txBody>
+                    <a:bodyPr/>
+                    <a:lstStyle/>
+                    <a:p>
+                      <a:r>
+                        <a:rPr lang="en-US" altLang="ko-KR" dirty="0"/>
+                        <a:t>- </a:t>
+                      </a:r>
+                      <a:r>
+                        <a:rPr lang="en-US" altLang="ko-KR" dirty="0" err="1"/>
+                        <a:t>CourseList</a:t>
+                      </a:r>
+                      <a:r>
+                        <a:rPr lang="en-US" altLang="ko-KR" baseline="0" dirty="0"/>
+                        <a:t> : </a:t>
+                      </a:r>
+                      <a:r>
+                        <a:rPr lang="en-US" altLang="ko-KR" baseline="0" dirty="0" err="1"/>
+                        <a:t>CourseList</a:t>
+                      </a:r>
+                      <a:endParaRPr lang="ko-KR" altLang="en-US" dirty="0"/>
+                    </a:p>
+                  </a:txBody>
+                  <a:tcPr/>
+                </a:tc>
+                <a:extLst>
+                  <a:ext uri="{0D108BD9-81ED-4DB2-BD59-A6C34878D82A}">
+                    <a16:rowId xmlns:a16="http://schemas.microsoft.com/office/drawing/2014/main" val="10001"/>
+                  </a:ext>
+                </a:extLst>
+              </a:tr>
+              <a:tr h="2046254">
+                <a:tc>
+                  <a:txBody>
+                    <a:bodyPr/>
+                    <a:lstStyle/>
+                    <a:p>
+                      <a:r>
+                        <a:rPr lang="en-US" altLang="ko-KR" baseline="0" dirty="0"/>
+                        <a:t>+</a:t>
+                      </a:r>
+                      <a:r>
+                        <a:rPr lang="en-US" altLang="ko-KR" baseline="0" dirty="0" err="1"/>
+                        <a:t>ShowCourseSystem</a:t>
+                      </a:r>
+                      <a:r>
+                        <a:rPr lang="en-US" altLang="ko-KR" baseline="0" dirty="0"/>
+                        <a:t>()</a:t>
+                      </a:r>
+                    </a:p>
+                    <a:p>
+                      <a:r>
+                        <a:rPr lang="en-US" altLang="ko-KR" baseline="0" dirty="0"/>
+                        <a:t>+ </a:t>
+                      </a:r>
+                      <a:r>
+                        <a:rPr lang="en-US" altLang="ko-KR" baseline="0" dirty="0" err="1"/>
+                        <a:t>getCourseContesnts</a:t>
+                      </a:r>
+                      <a:r>
+                        <a:rPr lang="en-US" altLang="ko-KR" baseline="0" dirty="0"/>
+                        <a:t>() : String[][]</a:t>
+                      </a:r>
+                    </a:p>
+                    <a:p>
+                      <a:r>
+                        <a:rPr lang="en-US" altLang="ko-KR" baseline="0" dirty="0"/>
+                        <a:t>+ </a:t>
+                      </a:r>
+                      <a:r>
+                        <a:rPr lang="en-US" altLang="ko-KR" baseline="0" dirty="0" err="1"/>
+                        <a:t>getCourseList</a:t>
+                      </a:r>
+                      <a:r>
+                        <a:rPr lang="en-US" altLang="ko-KR" baseline="0" dirty="0"/>
+                        <a:t>() : </a:t>
+                      </a:r>
+                      <a:r>
+                        <a:rPr lang="en-US" altLang="ko-KR" baseline="0" dirty="0" err="1"/>
+                        <a:t>CourseList</a:t>
+                      </a:r>
+                      <a:endParaRPr lang="en-US" altLang="ko-KR" baseline="0" dirty="0"/>
+                    </a:p>
+                  </a:txBody>
+                  <a:tcPr/>
+                </a:tc>
+                <a:extLst>
+                  <a:ext uri="{0D108BD9-81ED-4DB2-BD59-A6C34878D82A}">
+                    <a16:rowId xmlns:a16="http://schemas.microsoft.com/office/drawing/2014/main" val="10002"/>
+                  </a:ext>
+                </a:extLst>
+              </a:tr>
+            </a:tbl>
+          </a:graphicData>
+        </a:graphic>
+      </p:graphicFrame>
+    </p:spTree>
+    <p:extLst>
+      <p:ext uri="{BB962C8B-B14F-4D97-AF65-F5344CB8AC3E}">
+        <p14:creationId xmlns:p14="http://schemas.microsoft.com/office/powerpoint/2010/main" val="1712016017"/>
+      </p:ext>
+    </p:extLst>
+  </p:cSld>
+  <p:clrMapOvr>
+    <a:masterClrMapping/>
+  </p:clrMapOvr>
+</p:sld>
+</file>
+
+<file path=ppt/slides/slide13.xml><?xml version="1.0" encoding="utf-8"?>
+<p:sld xmlns:a="http://schemas.openxmlformats.org/drawingml/2006/main" xmlns:r="http://schemas.openxmlformats.org/officeDocument/2006/relationships" xmlns:p="http://schemas.openxmlformats.org/presentationml/2006/main">
+  <p:cSld>
+    <p:spTree>
+      <p:nvGrpSpPr>
+        <p:cNvPr id="1" name=""/>
+        <p:cNvGrpSpPr/>
+        <p:nvPr/>
+      </p:nvGrpSpPr>
+      <p:grpSpPr>
+        <a:xfrm>
+          <a:off x="0" y="0"/>
+          <a:ext cx="0" cy="0"/>
+          <a:chOff x="0" y="0"/>
+          <a:chExt cx="0" cy="0"/>
+        </a:xfrm>
+      </p:grpSpPr>
+      <p:sp>
+        <p:nvSpPr>
+          <p:cNvPr id="2" name="제목 1"/>
+          <p:cNvSpPr>
+            <a:spLocks noGrp="1"/>
+          </p:cNvSpPr>
+          <p:nvPr>
+            <p:ph type="title"/>
+          </p:nvPr>
+        </p:nvSpPr>
+        <p:spPr>
+          <a:xfrm>
+            <a:off x="352425" y="220211"/>
+            <a:ext cx="8327552" cy="625950"/>
+          </a:xfrm>
+        </p:spPr>
+        <p:txBody>
+          <a:bodyPr/>
+          <a:lstStyle/>
+          <a:p>
+            <a:r>
+              <a:rPr lang="en-US" altLang="ko-KR" sz="2500" dirty="0"/>
+              <a:t>Control Class</a:t>
+            </a:r>
+            <a:endParaRPr lang="ko-KR" altLang="en-US" sz="2500" dirty="0"/>
+          </a:p>
+        </p:txBody>
+      </p:sp>
+      <p:sp>
+        <p:nvSpPr>
+          <p:cNvPr id="4" name="바닥글 개체 틀 3"/>
+          <p:cNvSpPr>
+            <a:spLocks noGrp="1"/>
+          </p:cNvSpPr>
+          <p:nvPr>
+            <p:ph type="ftr" sz="quarter" idx="3"/>
+          </p:nvPr>
+        </p:nvSpPr>
+        <p:spPr/>
+        <p:txBody>
+          <a:bodyPr/>
+          <a:lstStyle/>
+          <a:p>
+            <a:pPr algn="r"/>
+            <a:r>
+              <a:rPr lang="ko-KR" altLang="en-US"/>
+              <a:t>팀 명</a:t>
+            </a:r>
+            <a:endParaRPr lang="en-US" altLang="ko-KR" dirty="0"/>
+          </a:p>
+        </p:txBody>
+      </p:sp>
+      <p:graphicFrame>
+        <p:nvGraphicFramePr>
+          <p:cNvPr id="5" name="표 4"/>
+          <p:cNvGraphicFramePr>
+            <a:graphicFrameLocks noGrp="1"/>
+          </p:cNvGraphicFramePr>
+          <p:nvPr/>
+        </p:nvGraphicFramePr>
+        <p:xfrm>
+          <a:off x="352425" y="1228296"/>
+          <a:ext cx="8327551" cy="4967787"/>
+        </p:xfrm>
+        <a:graphic>
+          <a:graphicData uri="http://schemas.openxmlformats.org/drawingml/2006/table">
+            <a:tbl>
+              <a:tblPr firstRow="1" bandRow="1">
+                <a:tableStyleId>{17292A2E-F333-43FB-9621-5CBBE7FDCDCB}</a:tableStyleId>
+              </a:tblPr>
+              <a:tblGrid>
+                <a:gridCol w="8327551">
+                  <a:extLst>
+                    <a:ext uri="{9D8B030D-6E8A-4147-A177-3AD203B41FA5}">
+                      <a16:colId xmlns:a16="http://schemas.microsoft.com/office/drawing/2014/main" val="20000"/>
+                    </a:ext>
+                  </a:extLst>
+                </a:gridCol>
+              </a:tblGrid>
+              <a:tr h="875279">
+                <a:tc>
+                  <a:txBody>
+                    <a:bodyPr/>
+                    <a:lstStyle/>
+                    <a:p>
+                      <a:r>
+                        <a:rPr lang="en-US" altLang="ko-KR" sz="4000" dirty="0" err="1"/>
+                        <a:t>CourseManageSystem</a:t>
+                      </a:r>
+                      <a:endParaRPr lang="ko-KR" altLang="en-US" sz="4000" dirty="0"/>
+                    </a:p>
+                  </a:txBody>
+                  <a:tcPr/>
+                </a:tc>
+                <a:extLst>
+                  <a:ext uri="{0D108BD9-81ED-4DB2-BD59-A6C34878D82A}">
+                    <a16:rowId xmlns:a16="http://schemas.microsoft.com/office/drawing/2014/main" val="10000"/>
+                  </a:ext>
+                </a:extLst>
+              </a:tr>
+              <a:tr h="2046254">
+                <a:tc>
+                  <a:txBody>
+                    <a:bodyPr/>
+                    <a:lstStyle/>
+                    <a:p>
+                      <a:r>
+                        <a:rPr lang="en-US" altLang="ko-KR" dirty="0"/>
+                        <a:t>- </a:t>
+                      </a:r>
+                      <a:r>
+                        <a:rPr lang="en-US" altLang="ko-KR" dirty="0" err="1"/>
+                        <a:t>CourseList</a:t>
+                      </a:r>
+                      <a:r>
+                        <a:rPr lang="en-US" altLang="ko-KR" baseline="0" dirty="0"/>
+                        <a:t> : </a:t>
+                      </a:r>
+                      <a:r>
+                        <a:rPr lang="en-US" altLang="ko-KR" baseline="0" dirty="0" err="1"/>
+                        <a:t>CourseList</a:t>
+                      </a:r>
+                      <a:endParaRPr lang="ko-KR" altLang="en-US" dirty="0"/>
+                    </a:p>
+                  </a:txBody>
+                  <a:tcPr/>
+                </a:tc>
+                <a:extLst>
+                  <a:ext uri="{0D108BD9-81ED-4DB2-BD59-A6C34878D82A}">
+                    <a16:rowId xmlns:a16="http://schemas.microsoft.com/office/drawing/2014/main" val="10001"/>
+                  </a:ext>
+                </a:extLst>
+              </a:tr>
+              <a:tr h="2046254">
+                <a:tc>
+                  <a:txBody>
+                    <a:bodyPr/>
+                    <a:lstStyle/>
+                    <a:p>
+                      <a:pPr marL="0" marR="0" indent="0" algn="l" defTabSz="914400" rtl="0" eaLnBrk="1" fontAlgn="auto" latinLnBrk="1" hangingPunct="1">
+                        <a:lnSpc>
+                          <a:spcPct val="100000"/>
+                        </a:lnSpc>
+                        <a:spcBef>
+                          <a:spcPts val="0"/>
+                        </a:spcBef>
+                        <a:spcAft>
+                          <a:spcPts val="0"/>
+                        </a:spcAft>
+                        <a:buClrTx/>
+                        <a:buSzTx/>
+                        <a:buFontTx/>
+                        <a:buNone/>
+                        <a:tabLst/>
+                        <a:defRPr/>
+                      </a:pPr>
+                      <a:r>
+                        <a:rPr lang="en-US" altLang="ko-KR" baseline="0" dirty="0"/>
+                        <a:t>+</a:t>
+                      </a:r>
+                      <a:r>
+                        <a:rPr lang="en-US" altLang="ko-KR" sz="1800" dirty="0" err="1"/>
+                        <a:t>CourseManageSystem</a:t>
+                      </a:r>
+                      <a:r>
+                        <a:rPr lang="en-US" altLang="ko-KR" sz="1800" dirty="0"/>
+                        <a:t>()</a:t>
+                      </a:r>
+                      <a:endParaRPr lang="ko-KR" altLang="en-US" sz="1800" dirty="0"/>
+                    </a:p>
+                    <a:p>
+                      <a:r>
+                        <a:rPr lang="en-US" altLang="ko-KR" baseline="0" dirty="0"/>
+                        <a:t>+</a:t>
+                      </a:r>
+                      <a:r>
+                        <a:rPr lang="en-US" altLang="ko-KR" baseline="0" dirty="0" err="1"/>
+                        <a:t>AddCourseSystem</a:t>
+                      </a:r>
+                      <a:r>
+                        <a:rPr lang="en-US" altLang="ko-KR" baseline="0" dirty="0"/>
+                        <a:t>()</a:t>
+                      </a:r>
+                    </a:p>
+                    <a:p>
+                      <a:pPr marL="0" marR="0" indent="0" algn="l" defTabSz="914400" rtl="0" eaLnBrk="1" fontAlgn="auto" latinLnBrk="1" hangingPunct="1">
+                        <a:lnSpc>
+                          <a:spcPct val="100000"/>
+                        </a:lnSpc>
+                        <a:spcBef>
+                          <a:spcPts val="0"/>
+                        </a:spcBef>
+                        <a:spcAft>
+                          <a:spcPts val="0"/>
+                        </a:spcAft>
+                        <a:buClrTx/>
+                        <a:buSzTx/>
+                        <a:buFontTx/>
+                        <a:buNone/>
+                        <a:tabLst/>
+                        <a:defRPr/>
+                      </a:pPr>
+                      <a:r>
+                        <a:rPr lang="en-US" altLang="ko-KR" baseline="0" dirty="0"/>
+                        <a:t>+</a:t>
+                      </a:r>
+                      <a:r>
+                        <a:rPr lang="en-US" altLang="ko-KR" sz="1800" dirty="0" err="1"/>
+                        <a:t>Edit</a:t>
+                      </a:r>
+                      <a:r>
+                        <a:rPr lang="en-US" altLang="ko-KR" baseline="0" dirty="0" err="1"/>
+                        <a:t>CourseSystem</a:t>
+                      </a:r>
+                      <a:r>
+                        <a:rPr lang="en-US" altLang="ko-KR" baseline="0" dirty="0"/>
+                        <a:t>()</a:t>
+                      </a:r>
+                    </a:p>
+                    <a:p>
+                      <a:pPr marL="0" marR="0" indent="0" algn="l" defTabSz="914400" rtl="0" eaLnBrk="1" fontAlgn="auto" latinLnBrk="1" hangingPunct="1">
+                        <a:lnSpc>
+                          <a:spcPct val="100000"/>
+                        </a:lnSpc>
+                        <a:spcBef>
+                          <a:spcPts val="0"/>
+                        </a:spcBef>
+                        <a:spcAft>
+                          <a:spcPts val="0"/>
+                        </a:spcAft>
+                        <a:buClrTx/>
+                        <a:buSzTx/>
+                        <a:buFontTx/>
+                        <a:buNone/>
+                        <a:tabLst/>
+                        <a:defRPr/>
+                      </a:pPr>
+                      <a:r>
+                        <a:rPr lang="en-US" altLang="ko-KR" baseline="0" dirty="0"/>
+                        <a:t>+</a:t>
+                      </a:r>
+                      <a:r>
+                        <a:rPr lang="en-US" altLang="ko-KR" sz="1800" baseline="0" dirty="0" err="1"/>
+                        <a:t>Delete</a:t>
+                      </a:r>
+                      <a:r>
+                        <a:rPr lang="en-US" altLang="ko-KR" baseline="0" dirty="0" err="1"/>
+                        <a:t>CourseSystem</a:t>
+                      </a:r>
+                      <a:r>
+                        <a:rPr lang="en-US" altLang="ko-KR" baseline="0" dirty="0"/>
+                        <a:t>()</a:t>
+                      </a:r>
+                    </a:p>
+                    <a:p>
+                      <a:r>
+                        <a:rPr lang="en-US" altLang="ko-KR" baseline="0" dirty="0"/>
+                        <a:t>+ </a:t>
+                      </a:r>
+                      <a:r>
+                        <a:rPr lang="en-US" altLang="ko-KR" baseline="0" dirty="0" err="1"/>
+                        <a:t>getCourseContesnts</a:t>
+                      </a:r>
+                      <a:r>
+                        <a:rPr lang="en-US" altLang="ko-KR" baseline="0" dirty="0"/>
+                        <a:t>() : String[][]</a:t>
+                      </a:r>
+                    </a:p>
+                    <a:p>
+                      <a:r>
+                        <a:rPr lang="en-US" altLang="ko-KR" baseline="0" dirty="0"/>
+                        <a:t>+ </a:t>
+                      </a:r>
+                      <a:r>
+                        <a:rPr lang="en-US" altLang="ko-KR" baseline="0" dirty="0" err="1"/>
+                        <a:t>getCourseList</a:t>
+                      </a:r>
+                      <a:r>
+                        <a:rPr lang="en-US" altLang="ko-KR" baseline="0" dirty="0"/>
+                        <a:t>() : </a:t>
+                      </a:r>
+                      <a:r>
+                        <a:rPr lang="en-US" altLang="ko-KR" baseline="0" dirty="0" err="1"/>
+                        <a:t>CourseList</a:t>
+                      </a:r>
+                      <a:endParaRPr lang="en-US" altLang="ko-KR" baseline="0" dirty="0"/>
+                    </a:p>
+                  </a:txBody>
+                  <a:tcPr/>
+                </a:tc>
+                <a:extLst>
+                  <a:ext uri="{0D108BD9-81ED-4DB2-BD59-A6C34878D82A}">
+                    <a16:rowId xmlns:a16="http://schemas.microsoft.com/office/drawing/2014/main" val="10002"/>
+                  </a:ext>
+                </a:extLst>
+              </a:tr>
+            </a:tbl>
+          </a:graphicData>
+        </a:graphic>
+      </p:graphicFrame>
+    </p:spTree>
+    <p:extLst>
+      <p:ext uri="{BB962C8B-B14F-4D97-AF65-F5344CB8AC3E}">
+        <p14:creationId xmlns:p14="http://schemas.microsoft.com/office/powerpoint/2010/main" val="4113967170"/>
+      </p:ext>
+    </p:extLst>
+  </p:cSld>
+  <p:clrMapOvr>
+    <a:masterClrMapping/>
+  </p:clrMapOvr>
+</p:sld>
+</file>
+
+<file path=ppt/slides/slide14.xml><?xml version="1.0" encoding="utf-8"?>
+<p:sld xmlns:a="http://schemas.openxmlformats.org/drawingml/2006/main" xmlns:r="http://schemas.openxmlformats.org/officeDocument/2006/relationships" xmlns:p="http://schemas.openxmlformats.org/presentationml/2006/main">
+  <p:cSld>
+    <p:spTree>
+      <p:nvGrpSpPr>
+        <p:cNvPr id="1" name=""/>
+        <p:cNvGrpSpPr/>
+        <p:nvPr/>
+      </p:nvGrpSpPr>
+      <p:grpSpPr>
+        <a:xfrm>
+          <a:off x="0" y="0"/>
+          <a:ext cx="0" cy="0"/>
+          <a:chOff x="0" y="0"/>
+          <a:chExt cx="0" cy="0"/>
+        </a:xfrm>
+      </p:grpSpPr>
+      <p:sp>
+        <p:nvSpPr>
+          <p:cNvPr id="2" name="제목 1"/>
+          <p:cNvSpPr>
+            <a:spLocks noGrp="1"/>
+          </p:cNvSpPr>
+          <p:nvPr>
+            <p:ph type="title"/>
+          </p:nvPr>
+        </p:nvSpPr>
+        <p:spPr>
+          <a:xfrm>
+            <a:off x="352425" y="220211"/>
+            <a:ext cx="8327552" cy="625950"/>
+          </a:xfrm>
+        </p:spPr>
+        <p:txBody>
+          <a:bodyPr/>
+          <a:lstStyle/>
+          <a:p>
+            <a:r>
+              <a:rPr lang="en-US" altLang="ko-KR" sz="2500" dirty="0"/>
+              <a:t>Control Class</a:t>
+            </a:r>
+            <a:endParaRPr lang="ko-KR" altLang="en-US" sz="2500" dirty="0"/>
+          </a:p>
+        </p:txBody>
+      </p:sp>
+      <p:sp>
+        <p:nvSpPr>
+          <p:cNvPr id="4" name="바닥글 개체 틀 3"/>
+          <p:cNvSpPr>
+            <a:spLocks noGrp="1"/>
+          </p:cNvSpPr>
+          <p:nvPr>
+            <p:ph type="ftr" sz="quarter" idx="3"/>
+          </p:nvPr>
+        </p:nvSpPr>
+        <p:spPr/>
+        <p:txBody>
+          <a:bodyPr/>
+          <a:lstStyle/>
+          <a:p>
+            <a:pPr algn="r"/>
+            <a:r>
+              <a:rPr lang="ko-KR" altLang="en-US"/>
+              <a:t>팀 명</a:t>
+            </a:r>
+            <a:endParaRPr lang="en-US" altLang="ko-KR" dirty="0"/>
+          </a:p>
+        </p:txBody>
+      </p:sp>
+      <p:graphicFrame>
+        <p:nvGraphicFramePr>
+          <p:cNvPr id="5" name="표 4"/>
+          <p:cNvGraphicFramePr>
+            <a:graphicFrameLocks noGrp="1"/>
+          </p:cNvGraphicFramePr>
+          <p:nvPr/>
+        </p:nvGraphicFramePr>
+        <p:xfrm>
+          <a:off x="352425" y="1228296"/>
+          <a:ext cx="8327551" cy="4967787"/>
+        </p:xfrm>
+        <a:graphic>
+          <a:graphicData uri="http://schemas.openxmlformats.org/drawingml/2006/table">
+            <a:tbl>
+              <a:tblPr firstRow="1" bandRow="1">
+                <a:tableStyleId>{17292A2E-F333-43FB-9621-5CBBE7FDCDCB}</a:tableStyleId>
+              </a:tblPr>
+              <a:tblGrid>
+                <a:gridCol w="8327551">
+                  <a:extLst>
+                    <a:ext uri="{9D8B030D-6E8A-4147-A177-3AD203B41FA5}">
+                      <a16:colId xmlns:a16="http://schemas.microsoft.com/office/drawing/2014/main" val="20000"/>
+                    </a:ext>
+                  </a:extLst>
+                </a:gridCol>
+              </a:tblGrid>
+              <a:tr h="875279">
+                <a:tc>
+                  <a:txBody>
+                    <a:bodyPr/>
+                    <a:lstStyle/>
+                    <a:p>
+                      <a:r>
+                        <a:rPr lang="en-US" altLang="ko-KR" sz="4000" dirty="0" err="1"/>
+                        <a:t>TaskManageSystem</a:t>
+                      </a:r>
+                      <a:endParaRPr lang="ko-KR" altLang="en-US" sz="4000" dirty="0"/>
+                    </a:p>
+                  </a:txBody>
+                  <a:tcPr/>
+                </a:tc>
+                <a:extLst>
+                  <a:ext uri="{0D108BD9-81ED-4DB2-BD59-A6C34878D82A}">
+                    <a16:rowId xmlns:a16="http://schemas.microsoft.com/office/drawing/2014/main" val="10000"/>
+                  </a:ext>
+                </a:extLst>
+              </a:tr>
+              <a:tr h="2046254">
+                <a:tc>
+                  <a:txBody>
+                    <a:bodyPr/>
+                    <a:lstStyle/>
+                    <a:p>
+                      <a:r>
+                        <a:rPr lang="en-US" altLang="ko-KR" dirty="0"/>
+                        <a:t>- </a:t>
+                      </a:r>
+                      <a:r>
+                        <a:rPr lang="en-US" altLang="ko-KR" dirty="0" err="1"/>
+                        <a:t>CourseList</a:t>
+                      </a:r>
+                      <a:r>
+                        <a:rPr lang="en-US" altLang="ko-KR" baseline="0" dirty="0"/>
+                        <a:t> : </a:t>
+                      </a:r>
+                      <a:r>
+                        <a:rPr lang="en-US" altLang="ko-KR" baseline="0" dirty="0" err="1"/>
+                        <a:t>CourseList</a:t>
+                      </a:r>
+                      <a:endParaRPr lang="ko-KR" altLang="en-US" dirty="0"/>
+                    </a:p>
+                  </a:txBody>
+                  <a:tcPr/>
+                </a:tc>
+                <a:extLst>
+                  <a:ext uri="{0D108BD9-81ED-4DB2-BD59-A6C34878D82A}">
+                    <a16:rowId xmlns:a16="http://schemas.microsoft.com/office/drawing/2014/main" val="10001"/>
+                  </a:ext>
+                </a:extLst>
+              </a:tr>
+              <a:tr h="2046254">
+                <a:tc>
+                  <a:txBody>
+                    <a:bodyPr/>
+                    <a:lstStyle/>
+                    <a:p>
+                      <a:pPr marL="0" marR="0" indent="0" algn="l" defTabSz="914400" rtl="0" eaLnBrk="1" fontAlgn="auto" latinLnBrk="1" hangingPunct="1">
+                        <a:lnSpc>
+                          <a:spcPct val="100000"/>
+                        </a:lnSpc>
+                        <a:spcBef>
+                          <a:spcPts val="0"/>
+                        </a:spcBef>
+                        <a:spcAft>
+                          <a:spcPts val="0"/>
+                        </a:spcAft>
+                        <a:buClrTx/>
+                        <a:buSzTx/>
+                        <a:buFontTx/>
+                        <a:buNone/>
+                        <a:tabLst/>
+                        <a:defRPr/>
+                      </a:pPr>
+                      <a:r>
+                        <a:rPr lang="en-US" altLang="ko-KR" baseline="0" dirty="0"/>
+                        <a:t>+</a:t>
+                      </a:r>
+                      <a:r>
+                        <a:rPr lang="en-US" altLang="ko-KR" sz="1800" dirty="0" err="1"/>
+                        <a:t>TaskManageSystem</a:t>
+                      </a:r>
+                      <a:r>
+                        <a:rPr lang="en-US" altLang="ko-KR" baseline="0" dirty="0"/>
+                        <a:t>()</a:t>
+                      </a:r>
+                    </a:p>
+                    <a:p>
+                      <a:r>
+                        <a:rPr lang="en-US" altLang="ko-KR" baseline="0" dirty="0"/>
+                        <a:t>+</a:t>
+                      </a:r>
+                      <a:r>
+                        <a:rPr lang="en-US" altLang="ko-KR" baseline="0" dirty="0" err="1"/>
+                        <a:t>AddTaskSystem</a:t>
+                      </a:r>
+                      <a:r>
+                        <a:rPr lang="en-US" altLang="ko-KR" baseline="0" dirty="0"/>
+                        <a:t>()</a:t>
+                      </a:r>
+                    </a:p>
+                    <a:p>
+                      <a:pPr marL="0" marR="0" indent="0" algn="l" defTabSz="914400" rtl="0" eaLnBrk="1" fontAlgn="auto" latinLnBrk="1" hangingPunct="1">
+                        <a:lnSpc>
+                          <a:spcPct val="100000"/>
+                        </a:lnSpc>
+                        <a:spcBef>
+                          <a:spcPts val="0"/>
+                        </a:spcBef>
+                        <a:spcAft>
+                          <a:spcPts val="0"/>
+                        </a:spcAft>
+                        <a:buClrTx/>
+                        <a:buSzTx/>
+                        <a:buFontTx/>
+                        <a:buNone/>
+                        <a:tabLst/>
+                        <a:defRPr/>
+                      </a:pPr>
+                      <a:r>
+                        <a:rPr lang="en-US" altLang="ko-KR" baseline="0" dirty="0"/>
+                        <a:t>+</a:t>
+                      </a:r>
+                      <a:r>
+                        <a:rPr lang="en-US" altLang="ko-KR" sz="1800" dirty="0" err="1"/>
+                        <a:t>Edit</a:t>
+                      </a:r>
+                      <a:r>
+                        <a:rPr lang="en-US" altLang="ko-KR" baseline="0" dirty="0" err="1"/>
+                        <a:t>TaskSystem</a:t>
+                      </a:r>
+                      <a:r>
+                        <a:rPr lang="en-US" altLang="ko-KR" baseline="0" dirty="0"/>
+                        <a:t>()</a:t>
+                      </a:r>
+                    </a:p>
+                    <a:p>
+                      <a:pPr marL="0" marR="0" indent="0" algn="l" defTabSz="914400" rtl="0" eaLnBrk="1" fontAlgn="auto" latinLnBrk="1" hangingPunct="1">
+                        <a:lnSpc>
+                          <a:spcPct val="100000"/>
+                        </a:lnSpc>
+                        <a:spcBef>
+                          <a:spcPts val="0"/>
+                        </a:spcBef>
+                        <a:spcAft>
+                          <a:spcPts val="0"/>
+                        </a:spcAft>
+                        <a:buClrTx/>
+                        <a:buSzTx/>
+                        <a:buFontTx/>
+                        <a:buNone/>
+                        <a:tabLst/>
+                        <a:defRPr/>
+                      </a:pPr>
+                      <a:r>
+                        <a:rPr lang="en-US" altLang="ko-KR" baseline="0" dirty="0"/>
+                        <a:t>+</a:t>
+                      </a:r>
+                      <a:r>
+                        <a:rPr lang="en-US" altLang="ko-KR" sz="1800" baseline="0" dirty="0" err="1"/>
+                        <a:t>Delete</a:t>
+                      </a:r>
+                      <a:r>
+                        <a:rPr lang="en-US" altLang="ko-KR" baseline="0" dirty="0" err="1"/>
+                        <a:t>TaskSystem</a:t>
+                      </a:r>
+                      <a:r>
+                        <a:rPr lang="en-US" altLang="ko-KR" baseline="0" dirty="0"/>
+                        <a:t>()</a:t>
+                      </a:r>
+                    </a:p>
+                    <a:p>
+                      <a:r>
+                        <a:rPr lang="en-US" altLang="ko-KR" baseline="0" dirty="0"/>
+                        <a:t>+ </a:t>
+                      </a:r>
+                      <a:r>
+                        <a:rPr lang="en-US" altLang="ko-KR" baseline="0" dirty="0" err="1"/>
+                        <a:t>getTaskContesnts</a:t>
+                      </a:r>
+                      <a:r>
+                        <a:rPr lang="en-US" altLang="ko-KR" baseline="0" dirty="0"/>
+                        <a:t>() : String[][]</a:t>
+                      </a:r>
+                    </a:p>
+                    <a:p>
+                      <a:r>
+                        <a:rPr lang="en-US" altLang="ko-KR" baseline="0" dirty="0"/>
+                        <a:t>+ </a:t>
+                      </a:r>
+                      <a:r>
+                        <a:rPr lang="en-US" altLang="ko-KR" baseline="0" dirty="0" err="1"/>
+                        <a:t>getTaskList</a:t>
+                      </a:r>
+                      <a:r>
+                        <a:rPr lang="en-US" altLang="ko-KR" baseline="0" dirty="0"/>
+                        <a:t>() : </a:t>
+                      </a:r>
+                      <a:r>
+                        <a:rPr lang="en-US" altLang="ko-KR" baseline="0" dirty="0" err="1"/>
+                        <a:t>TaskList</a:t>
+                      </a:r>
+                      <a:endParaRPr lang="en-US" altLang="ko-KR" baseline="0" dirty="0"/>
+                    </a:p>
+                  </a:txBody>
+                  <a:tcPr/>
+                </a:tc>
+                <a:extLst>
+                  <a:ext uri="{0D108BD9-81ED-4DB2-BD59-A6C34878D82A}">
+                    <a16:rowId xmlns:a16="http://schemas.microsoft.com/office/drawing/2014/main" val="10002"/>
+                  </a:ext>
+                </a:extLst>
+              </a:tr>
+            </a:tbl>
+          </a:graphicData>
+        </a:graphic>
+      </p:graphicFrame>
+    </p:spTree>
+    <p:extLst>
+      <p:ext uri="{BB962C8B-B14F-4D97-AF65-F5344CB8AC3E}">
+        <p14:creationId xmlns:p14="http://schemas.microsoft.com/office/powerpoint/2010/main" val="3856391460"/>
+      </p:ext>
+    </p:extLst>
   </p:cSld>
   <p:clrMapOvr>
     <a:masterClrMapping/>
@@ -3051,10 +4381,9 @@
           <a:lstStyle/>
           <a:p>
             <a:r>
-              <a:rPr lang="ko-KR" altLang="en-US" dirty="0" smtClean="0"/>
+              <a:rPr lang="ko-KR" altLang="en-US" dirty="0"/>
               <a:t>변경 이력</a:t>
             </a:r>
-            <a:endParaRPr lang="ko-KR" altLang="en-US" dirty="0"/>
           </a:p>
         </p:txBody>
       </p:sp>
@@ -3075,7 +4404,7 @@
           <a:p>
             <a:pPr algn="r"/>
             <a:r>
-              <a:rPr lang="ko-KR" altLang="en-US" dirty="0" smtClean="0"/>
+              <a:rPr lang="ko-KR" altLang="en-US" dirty="0"/>
               <a:t>팀 명</a:t>
             </a:r>
             <a:endParaRPr lang="en-US" altLang="ko-KR" dirty="0"/>
@@ -3092,7 +4421,7 @@
             <p:ph idx="1"/>
             <p:extLst>
               <p:ext uri="{D42A27DB-BD31-4B8C-83A1-F6EECF244321}">
-                <p14:modId xmlns:p14="http://schemas.microsoft.com/office/powerpoint/2010/main" val="3721839066"/>
+                <p14:modId xmlns:p14="http://schemas.microsoft.com/office/powerpoint/2010/main" val="1427293545"/>
               </p:ext>
             </p:extLst>
           </p:nvPr>
@@ -3108,10 +4437,34 @@
                 <a:tableStyleId>{5940675A-B579-460E-94D1-54222C63F5DA}</a:tableStyleId>
               </a:tblPr>
               <a:tblGrid>
-                <a:gridCol w="2145506"/>
-                <a:gridCol w="2145506"/>
-                <a:gridCol w="2145506"/>
-                <a:gridCol w="2145506"/>
+                <a:gridCol w="2145506">
+                  <a:extLst>
+                    <a:ext uri="{9D8B030D-6E8A-4147-A177-3AD203B41FA5}">
+                      <a16:colId xmlns:a16="http://schemas.microsoft.com/office/drawing/2014/main" val="20000"/>
+                    </a:ext>
+                  </a:extLst>
+                </a:gridCol>
+                <a:gridCol w="2145506">
+                  <a:extLst>
+                    <a:ext uri="{9D8B030D-6E8A-4147-A177-3AD203B41FA5}">
+                      <a16:colId xmlns:a16="http://schemas.microsoft.com/office/drawing/2014/main" val="20001"/>
+                    </a:ext>
+                  </a:extLst>
+                </a:gridCol>
+                <a:gridCol w="2145506">
+                  <a:extLst>
+                    <a:ext uri="{9D8B030D-6E8A-4147-A177-3AD203B41FA5}">
+                      <a16:colId xmlns:a16="http://schemas.microsoft.com/office/drawing/2014/main" val="20002"/>
+                    </a:ext>
+                  </a:extLst>
+                </a:gridCol>
+                <a:gridCol w="2145506">
+                  <a:extLst>
+                    <a:ext uri="{9D8B030D-6E8A-4147-A177-3AD203B41FA5}">
+                      <a16:colId xmlns:a16="http://schemas.microsoft.com/office/drawing/2014/main" val="20003"/>
+                    </a:ext>
+                  </a:extLst>
+                </a:gridCol>
               </a:tblGrid>
               <a:tr h="370840">
                 <a:tc>
@@ -3121,7 +4474,7 @@
                     <a:p>
                       <a:pPr algn="ctr" latinLnBrk="1"/>
                       <a:r>
-                        <a:rPr lang="ko-KR" altLang="en-US" sz="1200" b="1" dirty="0" smtClean="0">
+                        <a:rPr lang="ko-KR" altLang="en-US" sz="1200" b="1" dirty="0">
                           <a:latin typeface="맑은 고딕" pitchFamily="50" charset="-127"/>
                           <a:ea typeface="맑은 고딕" pitchFamily="50" charset="-127"/>
                         </a:rPr>
@@ -3151,7 +4504,7 @@
                     <a:p>
                       <a:pPr algn="ctr" latinLnBrk="1"/>
                       <a:r>
-                        <a:rPr lang="ko-KR" altLang="en-US" sz="1200" b="1" dirty="0" smtClean="0">
+                        <a:rPr lang="ko-KR" altLang="en-US" sz="1200" b="1" dirty="0">
                           <a:latin typeface="맑은 고딕" pitchFamily="50" charset="-127"/>
                           <a:ea typeface="맑은 고딕" pitchFamily="50" charset="-127"/>
                         </a:rPr>
@@ -3181,7 +4534,7 @@
                     <a:p>
                       <a:pPr algn="ctr" latinLnBrk="1"/>
                       <a:r>
-                        <a:rPr lang="ko-KR" altLang="en-US" sz="1200" b="1" dirty="0" smtClean="0">
+                        <a:rPr lang="ko-KR" altLang="en-US" sz="1200" b="1" dirty="0">
                           <a:latin typeface="맑은 고딕" pitchFamily="50" charset="-127"/>
                           <a:ea typeface="맑은 고딕" pitchFamily="50" charset="-127"/>
                         </a:rPr>
@@ -3211,7 +4564,7 @@
                     <a:p>
                       <a:pPr algn="ctr" latinLnBrk="1"/>
                       <a:r>
-                        <a:rPr lang="ko-KR" altLang="en-US" sz="1200" b="1" dirty="0" smtClean="0">
+                        <a:rPr lang="ko-KR" altLang="en-US" sz="1200" b="1" dirty="0">
                           <a:latin typeface="맑은 고딕" pitchFamily="50" charset="-127"/>
                           <a:ea typeface="맑은 고딕" pitchFamily="50" charset="-127"/>
                         </a:rPr>
@@ -3234,6 +4587,11 @@
                     </a:solidFill>
                   </a:tcPr>
                 </a:tc>
+                <a:extLst>
+                  <a:ext uri="{0D108BD9-81ED-4DB2-BD59-A6C34878D82A}">
+                    <a16:rowId xmlns:a16="http://schemas.microsoft.com/office/drawing/2014/main" val="10000"/>
+                  </a:ext>
+                </a:extLst>
               </a:tr>
               <a:tr h="370840">
                 <a:tc>
@@ -3242,6 +4600,16 @@
                     <a:lstStyle/>
                     <a:p>
                       <a:pPr algn="ctr" latinLnBrk="1"/>
+                      <a:r>
+                        <a:rPr lang="en-US" altLang="ko-KR" sz="1200" b="0" dirty="0">
+                          <a:solidFill>
+                            <a:schemeClr val="tx1"/>
+                          </a:solidFill>
+                          <a:latin typeface="맑은 고딕" pitchFamily="50" charset="-127"/>
+                          <a:ea typeface="맑은 고딕" pitchFamily="50" charset="-127"/>
+                        </a:rPr>
+                        <a:t>2017.05.19</a:t>
+                      </a:r>
                       <a:endParaRPr lang="ko-KR" altLang="en-US" sz="1200" b="0" dirty="0">
                         <a:solidFill>
                           <a:schemeClr val="tx1"/>
@@ -3263,6 +4631,16 @@
                     <a:lstStyle/>
                     <a:p>
                       <a:pPr algn="ctr" latinLnBrk="1"/>
+                      <a:r>
+                        <a:rPr lang="en-US" altLang="ko-KR" sz="1200" b="0" dirty="0">
+                          <a:solidFill>
+                            <a:schemeClr val="tx1"/>
+                          </a:solidFill>
+                          <a:latin typeface="맑은 고딕" pitchFamily="50" charset="-127"/>
+                          <a:ea typeface="맑은 고딕" pitchFamily="50" charset="-127"/>
+                        </a:rPr>
+                        <a:t>V1.0.0</a:t>
+                      </a:r>
                       <a:endParaRPr lang="ko-KR" altLang="en-US" sz="1200" b="0" dirty="0">
                         <a:solidFill>
                           <a:schemeClr val="tx1"/>
@@ -3284,13 +4662,46 @@
                     <a:lstStyle/>
                     <a:p>
                       <a:pPr latinLnBrk="1"/>
-                      <a:endParaRPr lang="ko-KR" altLang="en-US" sz="1200" b="0" dirty="0">
-                        <a:solidFill>
-                          <a:schemeClr val="tx1"/>
-                        </a:solidFill>
-                        <a:latin typeface="맑은 고딕" pitchFamily="50" charset="-127"/>
-                        <a:ea typeface="맑은 고딕" pitchFamily="50" charset="-127"/>
-                      </a:endParaRPr>
+                      <a:r>
+                        <a:rPr lang="en-US" altLang="ko-KR" sz="1200" b="0" dirty="0">
+                          <a:solidFill>
+                            <a:schemeClr val="tx1"/>
+                          </a:solidFill>
+                          <a:latin typeface="맑은 고딕" pitchFamily="50" charset="-127"/>
+                          <a:ea typeface="맑은 고딕" pitchFamily="50" charset="-127"/>
+                        </a:rPr>
+                        <a:t>Entity</a:t>
+                      </a:r>
+                      <a:r>
+                        <a:rPr lang="ko-KR" altLang="en-US" sz="1200" b="0" dirty="0">
+                          <a:solidFill>
+                            <a:schemeClr val="tx1"/>
+                          </a:solidFill>
+                          <a:latin typeface="맑은 고딕" pitchFamily="50" charset="-127"/>
+                          <a:ea typeface="맑은 고딕" pitchFamily="50" charset="-127"/>
+                        </a:rPr>
+                        <a:t> </a:t>
+                      </a:r>
+                      <a:r>
+                        <a:rPr lang="en-US" altLang="ko-KR" sz="1200" b="0" dirty="0">
+                          <a:solidFill>
+                            <a:schemeClr val="tx1"/>
+                          </a:solidFill>
+                          <a:latin typeface="맑은 고딕" pitchFamily="50" charset="-127"/>
+                          <a:ea typeface="맑은 고딕" pitchFamily="50" charset="-127"/>
+                        </a:rPr>
+                        <a:t>/ Control Class </a:t>
+                      </a:r>
+                      <a:r>
+                        <a:rPr lang="ko-KR" altLang="en-US" sz="1200" b="0" dirty="0">
+                          <a:solidFill>
+                            <a:schemeClr val="tx1"/>
+                          </a:solidFill>
+                          <a:latin typeface="맑은 고딕" pitchFamily="50" charset="-127"/>
+                          <a:ea typeface="맑은 고딕" pitchFamily="50" charset="-127"/>
+                        </a:rPr>
+                        <a:t>작성</a:t>
+                      </a:r>
                     </a:p>
                   </a:txBody>
                   <a:tcPr anchor="ctr">
@@ -3305,13 +4716,16 @@
                     <a:lstStyle/>
                     <a:p>
                       <a:pPr algn="ctr" latinLnBrk="1"/>
-                      <a:endParaRPr lang="ko-KR" altLang="en-US" sz="1200" b="0" dirty="0">
-                        <a:solidFill>
-                          <a:schemeClr val="tx1"/>
-                        </a:solidFill>
-                        <a:latin typeface="맑은 고딕" pitchFamily="50" charset="-127"/>
-                        <a:ea typeface="맑은 고딕" pitchFamily="50" charset="-127"/>
-                      </a:endParaRPr>
+                      <a:r>
+                        <a:rPr lang="ko-KR" altLang="en-US" sz="1200" b="0" dirty="0">
+                          <a:solidFill>
+                            <a:schemeClr val="tx1"/>
+                          </a:solidFill>
+                          <a:latin typeface="맑은 고딕" pitchFamily="50" charset="-127"/>
+                          <a:ea typeface="맑은 고딕" pitchFamily="50" charset="-127"/>
+                        </a:rPr>
+                        <a:t>박정민</a:t>
+                      </a:r>
                     </a:p>
                   </a:txBody>
                   <a:tcPr anchor="ctr">
@@ -3320,6 +4734,11 @@
                     </a:solidFill>
                   </a:tcPr>
                 </a:tc>
+                <a:extLst>
+                  <a:ext uri="{0D108BD9-81ED-4DB2-BD59-A6C34878D82A}">
+                    <a16:rowId xmlns:a16="http://schemas.microsoft.com/office/drawing/2014/main" val="10001"/>
+                  </a:ext>
+                </a:extLst>
               </a:tr>
               <a:tr h="370840">
                 <a:tc>
@@ -3328,6 +4747,16 @@
                     <a:lstStyle/>
                     <a:p>
                       <a:pPr algn="ctr" latinLnBrk="1"/>
+                      <a:r>
+                        <a:rPr lang="en-US" altLang="ko-KR" sz="1200" b="0" dirty="0">
+                          <a:solidFill>
+                            <a:schemeClr val="tx1"/>
+                          </a:solidFill>
+                          <a:latin typeface="맑은 고딕" pitchFamily="50" charset="-127"/>
+                          <a:ea typeface="맑은 고딕" pitchFamily="50" charset="-127"/>
+                        </a:rPr>
+                        <a:t>2017.0519</a:t>
+                      </a:r>
                       <a:endParaRPr lang="ko-KR" altLang="en-US" sz="1200" b="0" dirty="0">
                         <a:solidFill>
                           <a:schemeClr val="tx1"/>
@@ -3349,6 +4778,16 @@
                     <a:lstStyle/>
                     <a:p>
                       <a:pPr algn="ctr" latinLnBrk="1"/>
+                      <a:r>
+                        <a:rPr lang="en-US" altLang="ko-KR" sz="1200" b="0" dirty="0">
+                          <a:solidFill>
+                            <a:schemeClr val="tx1"/>
+                          </a:solidFill>
+                          <a:latin typeface="맑은 고딕" pitchFamily="50" charset="-127"/>
+                          <a:ea typeface="맑은 고딕" pitchFamily="50" charset="-127"/>
+                        </a:rPr>
+                        <a:t>V1.0.0</a:t>
+                      </a:r>
                       <a:endParaRPr lang="ko-KR" altLang="en-US" sz="1200" b="0" dirty="0">
                         <a:solidFill>
                           <a:schemeClr val="tx1"/>
@@ -3370,13 +4809,26 @@
                     <a:lstStyle/>
                     <a:p>
                       <a:pPr latinLnBrk="1"/>
-                      <a:endParaRPr lang="ko-KR" altLang="en-US" sz="1200" b="0">
-                        <a:solidFill>
-                          <a:schemeClr val="tx1"/>
-                        </a:solidFill>
-                        <a:latin typeface="맑은 고딕" pitchFamily="50" charset="-127"/>
-                        <a:ea typeface="맑은 고딕" pitchFamily="50" charset="-127"/>
-                      </a:endParaRPr>
+                      <a:r>
+                        <a:rPr lang="en-US" altLang="ko-KR" sz="1200" b="0" dirty="0">
+                          <a:solidFill>
+                            <a:schemeClr val="tx1"/>
+                          </a:solidFill>
+                          <a:latin typeface="맑은 고딕" pitchFamily="50" charset="-127"/>
+                          <a:ea typeface="맑은 고딕" pitchFamily="50" charset="-127"/>
+                        </a:rPr>
+                        <a:t>Boundary Class </a:t>
+                      </a:r>
+                      <a:r>
+                        <a:rPr lang="ko-KR" altLang="en-US" sz="1200" b="0" dirty="0">
+                          <a:solidFill>
+                            <a:schemeClr val="tx1"/>
+                          </a:solidFill>
+                          <a:latin typeface="맑은 고딕" pitchFamily="50" charset="-127"/>
+                          <a:ea typeface="맑은 고딕" pitchFamily="50" charset="-127"/>
+                        </a:rPr>
+                        <a:t>작성</a:t>
+                      </a:r>
                     </a:p>
                   </a:txBody>
                   <a:tcPr anchor="ctr">
@@ -3391,6 +4843,16 @@
                     <a:lstStyle/>
                     <a:p>
                       <a:pPr algn="ctr" latinLnBrk="1"/>
+                      <a:r>
+                        <a:rPr lang="ko-KR" altLang="en-US" sz="1200" b="0" dirty="0" err="1">
+                          <a:solidFill>
+                            <a:schemeClr val="tx1"/>
+                          </a:solidFill>
+                          <a:latin typeface="맑은 고딕" pitchFamily="50" charset="-127"/>
+                          <a:ea typeface="맑은 고딕" pitchFamily="50" charset="-127"/>
+                        </a:rPr>
+                        <a:t>나소영</a:t>
+                      </a:r>
                       <a:endParaRPr lang="ko-KR" altLang="en-US" sz="1200" b="0" dirty="0">
                         <a:solidFill>
                           <a:schemeClr val="tx1"/>
@@ -3406,6 +4868,11 @@
                     </a:solidFill>
                   </a:tcPr>
                 </a:tc>
+                <a:extLst>
+                  <a:ext uri="{0D108BD9-81ED-4DB2-BD59-A6C34878D82A}">
+                    <a16:rowId xmlns:a16="http://schemas.microsoft.com/office/drawing/2014/main" val="10002"/>
+                  </a:ext>
+                </a:extLst>
               </a:tr>
               <a:tr h="370840">
                 <a:tc>
@@ -3456,7 +4923,7 @@
                     <a:lstStyle/>
                     <a:p>
                       <a:pPr latinLnBrk="1"/>
-                      <a:endParaRPr lang="ko-KR" altLang="en-US" sz="1200" b="0">
+                      <a:endParaRPr lang="ko-KR" altLang="en-US" sz="1200" b="0" dirty="0">
                         <a:solidFill>
                           <a:schemeClr val="tx1"/>
                         </a:solidFill>
@@ -3492,6 +4959,11 @@
                     </a:solidFill>
                   </a:tcPr>
                 </a:tc>
+                <a:extLst>
+                  <a:ext uri="{0D108BD9-81ED-4DB2-BD59-A6C34878D82A}">
+                    <a16:rowId xmlns:a16="http://schemas.microsoft.com/office/drawing/2014/main" val="10003"/>
+                  </a:ext>
+                </a:extLst>
               </a:tr>
               <a:tr h="370840">
                 <a:tc>
@@ -3578,6 +5050,11 @@
                     </a:solidFill>
                   </a:tcPr>
                 </a:tc>
+                <a:extLst>
+                  <a:ext uri="{0D108BD9-81ED-4DB2-BD59-A6C34878D82A}">
+                    <a16:rowId xmlns:a16="http://schemas.microsoft.com/office/drawing/2014/main" val="10004"/>
+                  </a:ext>
+                </a:extLst>
               </a:tr>
               <a:tr h="370840">
                 <a:tc>
@@ -3664,6 +5141,11 @@
                     </a:solidFill>
                   </a:tcPr>
                 </a:tc>
+                <a:extLst>
+                  <a:ext uri="{0D108BD9-81ED-4DB2-BD59-A6C34878D82A}">
+                    <a16:rowId xmlns:a16="http://schemas.microsoft.com/office/drawing/2014/main" val="10005"/>
+                  </a:ext>
+                </a:extLst>
               </a:tr>
               <a:tr h="370840">
                 <a:tc>
@@ -3750,6 +5232,11 @@
                     </a:solidFill>
                   </a:tcPr>
                 </a:tc>
+                <a:extLst>
+                  <a:ext uri="{0D108BD9-81ED-4DB2-BD59-A6C34878D82A}">
+                    <a16:rowId xmlns:a16="http://schemas.microsoft.com/office/drawing/2014/main" val="10006"/>
+                  </a:ext>
+                </a:extLst>
               </a:tr>
               <a:tr h="370840">
                 <a:tc>
@@ -3836,6 +5323,11 @@
                     </a:solidFill>
                   </a:tcPr>
                 </a:tc>
+                <a:extLst>
+                  <a:ext uri="{0D108BD9-81ED-4DB2-BD59-A6C34878D82A}">
+                    <a16:rowId xmlns:a16="http://schemas.microsoft.com/office/drawing/2014/main" val="10007"/>
+                  </a:ext>
+                </a:extLst>
               </a:tr>
             </a:tbl>
           </a:graphicData>
@@ -3883,7 +5375,7 @@
           <a:p>
             <a:pPr algn="r"/>
             <a:r>
-              <a:rPr lang="ko-KR" altLang="en-US" dirty="0" smtClean="0"/>
+              <a:rPr lang="ko-KR" altLang="en-US" dirty="0"/>
               <a:t>팀 명</a:t>
             </a:r>
             <a:endParaRPr lang="en-US" altLang="ko-KR" dirty="0"/>
@@ -3913,15 +5405,15 @@
           <a:lstStyle/>
           <a:p>
             <a:r>
-              <a:rPr lang="en-US" altLang="ko-KR" dirty="0" smtClean="0"/>
+              <a:rPr lang="en-US" altLang="ko-KR" dirty="0"/>
               <a:t>&lt;</a:t>
             </a:r>
             <a:r>
-              <a:rPr lang="ko-KR" altLang="en-US" dirty="0" smtClean="0"/>
+              <a:rPr lang="ko-KR" altLang="en-US" dirty="0"/>
               <a:t>예시</a:t>
             </a:r>
             <a:r>
-              <a:rPr lang="en-US" altLang="ko-KR" dirty="0" smtClean="0"/>
+              <a:rPr lang="en-US" altLang="ko-KR" dirty="0"/>
               <a:t>&gt;</a:t>
             </a:r>
             <a:endParaRPr lang="ko-KR" altLang="en-US" dirty="0"/>
@@ -3962,6 +5454,1609 @@
         </p:spPr>
       </p:pic>
     </p:spTree>
+  </p:cSld>
+  <p:clrMapOvr>
+    <a:masterClrMapping/>
+  </p:clrMapOvr>
+</p:sld>
+</file>
+
+<file path=ppt/slides/slide4.xml><?xml version="1.0" encoding="utf-8"?>
+<p:sld xmlns:a="http://schemas.openxmlformats.org/drawingml/2006/main" xmlns:r="http://schemas.openxmlformats.org/officeDocument/2006/relationships" xmlns:p="http://schemas.openxmlformats.org/presentationml/2006/main">
+  <p:cSld>
+    <p:spTree>
+      <p:nvGrpSpPr>
+        <p:cNvPr id="1" name=""/>
+        <p:cNvGrpSpPr/>
+        <p:nvPr/>
+      </p:nvGrpSpPr>
+      <p:grpSpPr>
+        <a:xfrm>
+          <a:off x="0" y="0"/>
+          <a:ext cx="0" cy="0"/>
+          <a:chOff x="0" y="0"/>
+          <a:chExt cx="0" cy="0"/>
+        </a:xfrm>
+      </p:grpSpPr>
+      <p:sp>
+        <p:nvSpPr>
+          <p:cNvPr id="2" name="제목 1"/>
+          <p:cNvSpPr>
+            <a:spLocks noGrp="1"/>
+          </p:cNvSpPr>
+          <p:nvPr>
+            <p:ph type="ctrTitle"/>
+          </p:nvPr>
+        </p:nvSpPr>
+        <p:spPr/>
+        <p:txBody>
+          <a:bodyPr/>
+          <a:lstStyle/>
+          <a:p>
+            <a:pPr algn="ctr"/>
+            <a:r>
+              <a:rPr lang="en-US" altLang="ko-KR" sz="4500" dirty="0"/>
+              <a:t>Entity Class</a:t>
+            </a:r>
+            <a:endParaRPr lang="ko-KR" altLang="en-US" sz="4500" dirty="0"/>
+          </a:p>
+        </p:txBody>
+      </p:sp>
+    </p:spTree>
+    <p:extLst>
+      <p:ext uri="{BB962C8B-B14F-4D97-AF65-F5344CB8AC3E}">
+        <p14:creationId xmlns:p14="http://schemas.microsoft.com/office/powerpoint/2010/main" val="699439387"/>
+      </p:ext>
+    </p:extLst>
+  </p:cSld>
+  <p:clrMapOvr>
+    <a:masterClrMapping/>
+  </p:clrMapOvr>
+</p:sld>
+</file>
+
+<file path=ppt/slides/slide5.xml><?xml version="1.0" encoding="utf-8"?>
+<p:sld xmlns:a="http://schemas.openxmlformats.org/drawingml/2006/main" xmlns:r="http://schemas.openxmlformats.org/officeDocument/2006/relationships" xmlns:p="http://schemas.openxmlformats.org/presentationml/2006/main">
+  <p:cSld>
+    <p:spTree>
+      <p:nvGrpSpPr>
+        <p:cNvPr id="1" name=""/>
+        <p:cNvGrpSpPr/>
+        <p:nvPr/>
+      </p:nvGrpSpPr>
+      <p:grpSpPr>
+        <a:xfrm>
+          <a:off x="0" y="0"/>
+          <a:ext cx="0" cy="0"/>
+          <a:chOff x="0" y="0"/>
+          <a:chExt cx="0" cy="0"/>
+        </a:xfrm>
+      </p:grpSpPr>
+      <p:sp>
+        <p:nvSpPr>
+          <p:cNvPr id="2" name="제목 1"/>
+          <p:cNvSpPr>
+            <a:spLocks noGrp="1"/>
+          </p:cNvSpPr>
+          <p:nvPr>
+            <p:ph type="title"/>
+          </p:nvPr>
+        </p:nvSpPr>
+        <p:spPr>
+          <a:xfrm>
+            <a:off x="352425" y="220211"/>
+            <a:ext cx="8327552" cy="625950"/>
+          </a:xfrm>
+        </p:spPr>
+        <p:txBody>
+          <a:bodyPr/>
+          <a:lstStyle/>
+          <a:p>
+            <a:r>
+              <a:rPr lang="en-US" altLang="ko-KR" sz="2500" dirty="0"/>
+              <a:t>Entity Class</a:t>
+            </a:r>
+            <a:endParaRPr lang="ko-KR" altLang="en-US" sz="2500" dirty="0"/>
+          </a:p>
+        </p:txBody>
+      </p:sp>
+      <p:sp>
+        <p:nvSpPr>
+          <p:cNvPr id="4" name="바닥글 개체 틀 3"/>
+          <p:cNvSpPr>
+            <a:spLocks noGrp="1"/>
+          </p:cNvSpPr>
+          <p:nvPr>
+            <p:ph type="ftr" sz="quarter" idx="3"/>
+          </p:nvPr>
+        </p:nvSpPr>
+        <p:spPr/>
+        <p:txBody>
+          <a:bodyPr/>
+          <a:lstStyle/>
+          <a:p>
+            <a:pPr algn="r"/>
+            <a:r>
+              <a:rPr lang="ko-KR" altLang="en-US"/>
+              <a:t>팀 명</a:t>
+            </a:r>
+            <a:endParaRPr lang="en-US" altLang="ko-KR" dirty="0"/>
+          </a:p>
+        </p:txBody>
+      </p:sp>
+      <p:graphicFrame>
+        <p:nvGraphicFramePr>
+          <p:cNvPr id="5" name="표 4"/>
+          <p:cNvGraphicFramePr>
+            <a:graphicFrameLocks noGrp="1"/>
+          </p:cNvGraphicFramePr>
+          <p:nvPr/>
+        </p:nvGraphicFramePr>
+        <p:xfrm>
+          <a:off x="352426" y="1228296"/>
+          <a:ext cx="3960268" cy="4967787"/>
+        </p:xfrm>
+        <a:graphic>
+          <a:graphicData uri="http://schemas.openxmlformats.org/drawingml/2006/table">
+            <a:tbl>
+              <a:tblPr firstRow="1" bandRow="1">
+                <a:tableStyleId>{17292A2E-F333-43FB-9621-5CBBE7FDCDCB}</a:tableStyleId>
+              </a:tblPr>
+              <a:tblGrid>
+                <a:gridCol w="3960268">
+                  <a:extLst>
+                    <a:ext uri="{9D8B030D-6E8A-4147-A177-3AD203B41FA5}">
+                      <a16:colId xmlns:a16="http://schemas.microsoft.com/office/drawing/2014/main" val="20000"/>
+                    </a:ext>
+                  </a:extLst>
+                </a:gridCol>
+              </a:tblGrid>
+              <a:tr h="875279">
+                <a:tc>
+                  <a:txBody>
+                    <a:bodyPr/>
+                    <a:lstStyle/>
+                    <a:p>
+                      <a:pPr algn="l" latinLnBrk="1"/>
+                      <a:r>
+                        <a:rPr lang="en-US" altLang="ko-KR" sz="4000" dirty="0"/>
+                        <a:t>Student</a:t>
+                      </a:r>
+                      <a:endParaRPr lang="ko-KR" altLang="en-US" sz="4000" dirty="0"/>
+                    </a:p>
+                  </a:txBody>
+                  <a:tcPr/>
+                </a:tc>
+                <a:extLst>
+                  <a:ext uri="{0D108BD9-81ED-4DB2-BD59-A6C34878D82A}">
+                    <a16:rowId xmlns:a16="http://schemas.microsoft.com/office/drawing/2014/main" val="10000"/>
+                  </a:ext>
+                </a:extLst>
+              </a:tr>
+              <a:tr h="4092508">
+                <a:tc>
+                  <a:txBody>
+                    <a:bodyPr/>
+                    <a:lstStyle/>
+                    <a:p>
+                      <a:pPr algn="l" latinLnBrk="1"/>
+                      <a:r>
+                        <a:rPr lang="en-US" altLang="ko-KR" sz="2500" dirty="0"/>
+                        <a:t>-</a:t>
+                      </a:r>
+                      <a:r>
+                        <a:rPr lang="en-US" altLang="ko-KR" sz="2500" dirty="0" err="1"/>
+                        <a:t>studentNum</a:t>
+                      </a:r>
+                      <a:r>
+                        <a:rPr lang="en-US" altLang="ko-KR" sz="2500" baseline="0" dirty="0"/>
+                        <a:t> : </a:t>
+                      </a:r>
+                      <a:r>
+                        <a:rPr lang="en-US" altLang="ko-KR" sz="2500" baseline="0" dirty="0" err="1"/>
+                        <a:t>int</a:t>
+                      </a:r>
+                      <a:endParaRPr lang="en-US" altLang="ko-KR" sz="2500" baseline="0" dirty="0"/>
+                    </a:p>
+                    <a:p>
+                      <a:pPr latinLnBrk="1"/>
+                      <a:r>
+                        <a:rPr lang="en-US" altLang="ko-KR" sz="2500" baseline="0" dirty="0"/>
+                        <a:t>-</a:t>
+                      </a:r>
+                      <a:r>
+                        <a:rPr lang="en-US" altLang="ko-KR" sz="2500" baseline="0" dirty="0" err="1"/>
+                        <a:t>studentName</a:t>
+                      </a:r>
+                      <a:r>
+                        <a:rPr lang="en-US" altLang="ko-KR" sz="2500" baseline="0" dirty="0"/>
+                        <a:t> : String</a:t>
+                      </a:r>
+                    </a:p>
+                    <a:p>
+                      <a:pPr latinLnBrk="1"/>
+                      <a:r>
+                        <a:rPr lang="en-US" altLang="ko-KR" sz="2500" baseline="0" dirty="0"/>
+                        <a:t>-password : String</a:t>
+                      </a:r>
+                      <a:endParaRPr lang="ko-KR" altLang="en-US" sz="2500" dirty="0"/>
+                    </a:p>
+                  </a:txBody>
+                  <a:tcPr/>
+                </a:tc>
+                <a:extLst>
+                  <a:ext uri="{0D108BD9-81ED-4DB2-BD59-A6C34878D82A}">
+                    <a16:rowId xmlns:a16="http://schemas.microsoft.com/office/drawing/2014/main" val="10001"/>
+                  </a:ext>
+                </a:extLst>
+              </a:tr>
+            </a:tbl>
+          </a:graphicData>
+        </a:graphic>
+      </p:graphicFrame>
+      <p:graphicFrame>
+        <p:nvGraphicFramePr>
+          <p:cNvPr id="8" name="표 7"/>
+          <p:cNvGraphicFramePr>
+            <a:graphicFrameLocks noGrp="1"/>
+          </p:cNvGraphicFramePr>
+          <p:nvPr/>
+        </p:nvGraphicFramePr>
+        <p:xfrm>
+          <a:off x="4749421" y="1228297"/>
+          <a:ext cx="3930556" cy="4967786"/>
+        </p:xfrm>
+        <a:graphic>
+          <a:graphicData uri="http://schemas.openxmlformats.org/drawingml/2006/table">
+            <a:tbl>
+              <a:tblPr firstRow="1" bandRow="1">
+                <a:tableStyleId>{17292A2E-F333-43FB-9621-5CBBE7FDCDCB}</a:tableStyleId>
+              </a:tblPr>
+              <a:tblGrid>
+                <a:gridCol w="3930556">
+                  <a:extLst>
+                    <a:ext uri="{9D8B030D-6E8A-4147-A177-3AD203B41FA5}">
+                      <a16:colId xmlns:a16="http://schemas.microsoft.com/office/drawing/2014/main" val="20000"/>
+                    </a:ext>
+                  </a:extLst>
+                </a:gridCol>
+              </a:tblGrid>
+              <a:tr h="875279">
+                <a:tc>
+                  <a:txBody>
+                    <a:bodyPr/>
+                    <a:lstStyle/>
+                    <a:p>
+                      <a:pPr algn="l" latinLnBrk="1"/>
+                      <a:r>
+                        <a:rPr lang="en-US" altLang="ko-KR" sz="4000" dirty="0"/>
+                        <a:t>Course</a:t>
+                      </a:r>
+                      <a:endParaRPr lang="ko-KR" altLang="en-US" sz="4000" dirty="0"/>
+                    </a:p>
+                  </a:txBody>
+                  <a:tcPr/>
+                </a:tc>
+                <a:extLst>
+                  <a:ext uri="{0D108BD9-81ED-4DB2-BD59-A6C34878D82A}">
+                    <a16:rowId xmlns:a16="http://schemas.microsoft.com/office/drawing/2014/main" val="10000"/>
+                  </a:ext>
+                </a:extLst>
+              </a:tr>
+              <a:tr h="4092507">
+                <a:tc>
+                  <a:txBody>
+                    <a:bodyPr/>
+                    <a:lstStyle/>
+                    <a:p>
+                      <a:pPr algn="l" latinLnBrk="1"/>
+                      <a:r>
+                        <a:rPr lang="en-US" altLang="ko-KR" sz="2500" dirty="0"/>
+                        <a:t>-</a:t>
+                      </a:r>
+                      <a:r>
+                        <a:rPr lang="en-US" altLang="ko-KR" sz="2500" dirty="0" err="1"/>
+                        <a:t>courseName</a:t>
+                      </a:r>
+                      <a:r>
+                        <a:rPr lang="en-US" altLang="ko-KR" sz="2500" dirty="0"/>
+                        <a:t> : String</a:t>
+                      </a:r>
+                    </a:p>
+                    <a:p>
+                      <a:pPr algn="l" latinLnBrk="1"/>
+                      <a:r>
+                        <a:rPr lang="en-US" altLang="ko-KR" sz="2500" dirty="0"/>
+                        <a:t>-professor : String</a:t>
+                      </a:r>
+                    </a:p>
+                    <a:p>
+                      <a:pPr algn="l" latinLnBrk="1"/>
+                      <a:r>
+                        <a:rPr lang="en-US" altLang="ko-KR" sz="2500" dirty="0"/>
+                        <a:t>-</a:t>
+                      </a:r>
+                      <a:r>
+                        <a:rPr lang="en-US" altLang="ko-KR" sz="2500" dirty="0" err="1"/>
+                        <a:t>courseDay</a:t>
+                      </a:r>
+                      <a:r>
+                        <a:rPr lang="en-US" altLang="ko-KR" sz="2500" dirty="0"/>
+                        <a:t> : </a:t>
+                      </a:r>
+                      <a:r>
+                        <a:rPr lang="en-US" altLang="ko-KR" sz="2500" dirty="0" err="1"/>
+                        <a:t>int</a:t>
+                      </a:r>
+                      <a:endParaRPr lang="en-US" altLang="ko-KR" sz="2500" dirty="0"/>
+                    </a:p>
+                    <a:p>
+                      <a:pPr algn="l" latinLnBrk="1"/>
+                      <a:r>
+                        <a:rPr lang="en-US" altLang="ko-KR" sz="2500" dirty="0"/>
+                        <a:t>-</a:t>
+                      </a:r>
+                      <a:r>
+                        <a:rPr lang="en-US" altLang="ko-KR" sz="2500" dirty="0" err="1"/>
+                        <a:t>courseTime</a:t>
+                      </a:r>
+                      <a:r>
+                        <a:rPr lang="en-US" altLang="ko-KR" sz="2500" dirty="0"/>
+                        <a:t> : </a:t>
+                      </a:r>
+                      <a:r>
+                        <a:rPr lang="en-US" altLang="ko-KR" sz="2500" dirty="0" err="1"/>
+                        <a:t>int</a:t>
+                      </a:r>
+                      <a:endParaRPr lang="en-US" altLang="ko-KR" sz="2500" dirty="0"/>
+                    </a:p>
+                    <a:p>
+                      <a:pPr algn="l" latinLnBrk="1"/>
+                      <a:r>
+                        <a:rPr lang="en-US" altLang="ko-KR" sz="2500" dirty="0"/>
+                        <a:t>-</a:t>
+                      </a:r>
+                      <a:r>
+                        <a:rPr lang="en-US" altLang="ko-KR" sz="2500" dirty="0" err="1"/>
+                        <a:t>courseYear</a:t>
+                      </a:r>
+                      <a:r>
+                        <a:rPr lang="en-US" altLang="ko-KR" sz="2500" dirty="0"/>
+                        <a:t> : </a:t>
+                      </a:r>
+                      <a:r>
+                        <a:rPr lang="en-US" altLang="ko-KR" sz="2500" dirty="0" err="1"/>
+                        <a:t>int</a:t>
+                      </a:r>
+                      <a:endParaRPr lang="en-US" altLang="ko-KR" sz="2500" dirty="0"/>
+                    </a:p>
+                    <a:p>
+                      <a:pPr algn="l" latinLnBrk="1"/>
+                      <a:r>
+                        <a:rPr lang="en-US" altLang="ko-KR" sz="2500" dirty="0"/>
+                        <a:t>-</a:t>
+                      </a:r>
+                      <a:r>
+                        <a:rPr lang="en-US" altLang="ko-KR" sz="2500" dirty="0" err="1"/>
+                        <a:t>courseSemester</a:t>
+                      </a:r>
+                      <a:r>
+                        <a:rPr lang="en-US" altLang="ko-KR" sz="2500" dirty="0"/>
+                        <a:t> : </a:t>
+                      </a:r>
+                      <a:r>
+                        <a:rPr lang="en-US" altLang="ko-KR" sz="2500" dirty="0" err="1"/>
+                        <a:t>int</a:t>
+                      </a:r>
+                      <a:endParaRPr lang="ko-KR" altLang="en-US" sz="2500" dirty="0"/>
+                    </a:p>
+                  </a:txBody>
+                  <a:tcPr/>
+                </a:tc>
+                <a:extLst>
+                  <a:ext uri="{0D108BD9-81ED-4DB2-BD59-A6C34878D82A}">
+                    <a16:rowId xmlns:a16="http://schemas.microsoft.com/office/drawing/2014/main" val="10001"/>
+                  </a:ext>
+                </a:extLst>
+              </a:tr>
+            </a:tbl>
+          </a:graphicData>
+        </a:graphic>
+      </p:graphicFrame>
+    </p:spTree>
+    <p:extLst>
+      <p:ext uri="{BB962C8B-B14F-4D97-AF65-F5344CB8AC3E}">
+        <p14:creationId xmlns:p14="http://schemas.microsoft.com/office/powerpoint/2010/main" val="2925167121"/>
+      </p:ext>
+    </p:extLst>
+  </p:cSld>
+  <p:clrMapOvr>
+    <a:masterClrMapping/>
+  </p:clrMapOvr>
+</p:sld>
+</file>
+
+<file path=ppt/slides/slide6.xml><?xml version="1.0" encoding="utf-8"?>
+<p:sld xmlns:a="http://schemas.openxmlformats.org/drawingml/2006/main" xmlns:r="http://schemas.openxmlformats.org/officeDocument/2006/relationships" xmlns:p="http://schemas.openxmlformats.org/presentationml/2006/main">
+  <p:cSld>
+    <p:spTree>
+      <p:nvGrpSpPr>
+        <p:cNvPr id="1" name=""/>
+        <p:cNvGrpSpPr/>
+        <p:nvPr/>
+      </p:nvGrpSpPr>
+      <p:grpSpPr>
+        <a:xfrm>
+          <a:off x="0" y="0"/>
+          <a:ext cx="0" cy="0"/>
+          <a:chOff x="0" y="0"/>
+          <a:chExt cx="0" cy="0"/>
+        </a:xfrm>
+      </p:grpSpPr>
+      <p:sp>
+        <p:nvSpPr>
+          <p:cNvPr id="4" name="바닥글 개체 틀 3"/>
+          <p:cNvSpPr>
+            <a:spLocks noGrp="1"/>
+          </p:cNvSpPr>
+          <p:nvPr>
+            <p:ph type="ftr" sz="quarter" idx="3"/>
+          </p:nvPr>
+        </p:nvSpPr>
+        <p:spPr/>
+        <p:txBody>
+          <a:bodyPr/>
+          <a:lstStyle/>
+          <a:p>
+            <a:pPr algn="r"/>
+            <a:r>
+              <a:rPr lang="ko-KR" altLang="en-US"/>
+              <a:t>팀 명</a:t>
+            </a:r>
+            <a:endParaRPr lang="en-US" altLang="ko-KR" dirty="0"/>
+          </a:p>
+        </p:txBody>
+      </p:sp>
+      <p:graphicFrame>
+        <p:nvGraphicFramePr>
+          <p:cNvPr id="5" name="표 4"/>
+          <p:cNvGraphicFramePr>
+            <a:graphicFrameLocks noGrp="1"/>
+          </p:cNvGraphicFramePr>
+          <p:nvPr/>
+        </p:nvGraphicFramePr>
+        <p:xfrm>
+          <a:off x="352426" y="1228296"/>
+          <a:ext cx="3960268" cy="4967787"/>
+        </p:xfrm>
+        <a:graphic>
+          <a:graphicData uri="http://schemas.openxmlformats.org/drawingml/2006/table">
+            <a:tbl>
+              <a:tblPr firstRow="1" bandRow="1">
+                <a:tableStyleId>{17292A2E-F333-43FB-9621-5CBBE7FDCDCB}</a:tableStyleId>
+              </a:tblPr>
+              <a:tblGrid>
+                <a:gridCol w="3960268">
+                  <a:extLst>
+                    <a:ext uri="{9D8B030D-6E8A-4147-A177-3AD203B41FA5}">
+                      <a16:colId xmlns:a16="http://schemas.microsoft.com/office/drawing/2014/main" val="20000"/>
+                    </a:ext>
+                  </a:extLst>
+                </a:gridCol>
+              </a:tblGrid>
+              <a:tr h="875279">
+                <a:tc>
+                  <a:txBody>
+                    <a:bodyPr/>
+                    <a:lstStyle/>
+                    <a:p>
+                      <a:pPr algn="l" latinLnBrk="1"/>
+                      <a:r>
+                        <a:rPr lang="en-US" altLang="ko-KR" sz="4000" dirty="0" err="1"/>
+                        <a:t>CourseList</a:t>
+                      </a:r>
+                      <a:endParaRPr lang="ko-KR" altLang="en-US" sz="4000" dirty="0"/>
+                    </a:p>
+                  </a:txBody>
+                  <a:tcPr/>
+                </a:tc>
+                <a:extLst>
+                  <a:ext uri="{0D108BD9-81ED-4DB2-BD59-A6C34878D82A}">
+                    <a16:rowId xmlns:a16="http://schemas.microsoft.com/office/drawing/2014/main" val="10000"/>
+                  </a:ext>
+                </a:extLst>
+              </a:tr>
+              <a:tr h="4092508">
+                <a:tc>
+                  <a:txBody>
+                    <a:bodyPr/>
+                    <a:lstStyle/>
+                    <a:p>
+                      <a:pPr algn="l" latinLnBrk="1"/>
+                      <a:r>
+                        <a:rPr lang="en-US" altLang="ko-KR" sz="2500" dirty="0" err="1"/>
+                        <a:t>courseArray</a:t>
+                      </a:r>
+                      <a:r>
+                        <a:rPr lang="en-US" altLang="ko-KR" sz="2500" baseline="0" dirty="0"/>
+                        <a:t> : Course[]</a:t>
+                      </a:r>
+                      <a:endParaRPr lang="ko-KR" altLang="en-US" sz="2500" dirty="0"/>
+                    </a:p>
+                  </a:txBody>
+                  <a:tcPr/>
+                </a:tc>
+                <a:extLst>
+                  <a:ext uri="{0D108BD9-81ED-4DB2-BD59-A6C34878D82A}">
+                    <a16:rowId xmlns:a16="http://schemas.microsoft.com/office/drawing/2014/main" val="10001"/>
+                  </a:ext>
+                </a:extLst>
+              </a:tr>
+            </a:tbl>
+          </a:graphicData>
+        </a:graphic>
+      </p:graphicFrame>
+      <p:graphicFrame>
+        <p:nvGraphicFramePr>
+          <p:cNvPr id="8" name="표 7"/>
+          <p:cNvGraphicFramePr>
+            <a:graphicFrameLocks noGrp="1"/>
+          </p:cNvGraphicFramePr>
+          <p:nvPr/>
+        </p:nvGraphicFramePr>
+        <p:xfrm>
+          <a:off x="4749421" y="1228297"/>
+          <a:ext cx="3930556" cy="4967786"/>
+        </p:xfrm>
+        <a:graphic>
+          <a:graphicData uri="http://schemas.openxmlformats.org/drawingml/2006/table">
+            <a:tbl>
+              <a:tblPr firstRow="1" bandRow="1">
+                <a:tableStyleId>{17292A2E-F333-43FB-9621-5CBBE7FDCDCB}</a:tableStyleId>
+              </a:tblPr>
+              <a:tblGrid>
+                <a:gridCol w="3930556">
+                  <a:extLst>
+                    <a:ext uri="{9D8B030D-6E8A-4147-A177-3AD203B41FA5}">
+                      <a16:colId xmlns:a16="http://schemas.microsoft.com/office/drawing/2014/main" val="20000"/>
+                    </a:ext>
+                  </a:extLst>
+                </a:gridCol>
+              </a:tblGrid>
+              <a:tr h="875279">
+                <a:tc>
+                  <a:txBody>
+                    <a:bodyPr/>
+                    <a:lstStyle/>
+                    <a:p>
+                      <a:pPr algn="l" latinLnBrk="1"/>
+                      <a:r>
+                        <a:rPr lang="en-US" altLang="ko-KR" sz="4000" dirty="0" err="1"/>
+                        <a:t>Todo</a:t>
+                      </a:r>
+                      <a:endParaRPr lang="ko-KR" altLang="en-US" sz="4000" dirty="0"/>
+                    </a:p>
+                  </a:txBody>
+                  <a:tcPr/>
+                </a:tc>
+                <a:extLst>
+                  <a:ext uri="{0D108BD9-81ED-4DB2-BD59-A6C34878D82A}">
+                    <a16:rowId xmlns:a16="http://schemas.microsoft.com/office/drawing/2014/main" val="10000"/>
+                  </a:ext>
+                </a:extLst>
+              </a:tr>
+              <a:tr h="4092507">
+                <a:tc>
+                  <a:txBody>
+                    <a:bodyPr/>
+                    <a:lstStyle/>
+                    <a:p>
+                      <a:pPr algn="l" latinLnBrk="1"/>
+                      <a:r>
+                        <a:rPr lang="en-US" altLang="ko-KR" sz="2500" dirty="0"/>
+                        <a:t>task</a:t>
+                      </a:r>
+                      <a:r>
+                        <a:rPr lang="en-US" altLang="ko-KR" sz="2500" baseline="0" dirty="0"/>
+                        <a:t> : String</a:t>
+                      </a:r>
+                    </a:p>
+                    <a:p>
+                      <a:pPr algn="l" latinLnBrk="1"/>
+                      <a:r>
+                        <a:rPr lang="en-US" altLang="ko-KR" sz="2500" baseline="0" dirty="0" err="1"/>
+                        <a:t>endtime</a:t>
+                      </a:r>
+                      <a:r>
+                        <a:rPr lang="en-US" altLang="ko-KR" sz="2500" baseline="0" dirty="0"/>
+                        <a:t> : </a:t>
+                      </a:r>
+                      <a:r>
+                        <a:rPr lang="en-US" altLang="ko-KR" sz="2500" baseline="0" dirty="0" err="1"/>
+                        <a:t>int</a:t>
+                      </a:r>
+                      <a:endParaRPr lang="en-US" altLang="ko-KR" sz="2500" baseline="0" dirty="0"/>
+                    </a:p>
+                    <a:p>
+                      <a:pPr algn="l" latinLnBrk="1"/>
+                      <a:r>
+                        <a:rPr lang="en-US" altLang="ko-KR" sz="2500" baseline="0" dirty="0" err="1"/>
+                        <a:t>readEndTime</a:t>
+                      </a:r>
+                      <a:r>
+                        <a:rPr lang="en-US" altLang="ko-KR" sz="2500" baseline="0" dirty="0"/>
+                        <a:t> : </a:t>
+                      </a:r>
+                      <a:r>
+                        <a:rPr lang="en-US" altLang="ko-KR" sz="2500" baseline="0" dirty="0" err="1"/>
+                        <a:t>int</a:t>
+                      </a:r>
+                      <a:endParaRPr lang="en-US" altLang="ko-KR" sz="2500" baseline="0" dirty="0"/>
+                    </a:p>
+                    <a:p>
+                      <a:pPr algn="l" latinLnBrk="1"/>
+                      <a:r>
+                        <a:rPr lang="en-US" altLang="ko-KR" sz="2500" baseline="0" dirty="0"/>
+                        <a:t>Important : String</a:t>
+                      </a:r>
+                    </a:p>
+                    <a:p>
+                      <a:pPr algn="l" latinLnBrk="1"/>
+                      <a:r>
+                        <a:rPr lang="en-US" altLang="ko-KR" sz="2500" baseline="0" dirty="0"/>
+                        <a:t>complete : String</a:t>
+                      </a:r>
+                    </a:p>
+                    <a:p>
+                      <a:pPr algn="l" latinLnBrk="1"/>
+                      <a:r>
+                        <a:rPr lang="en-US" altLang="ko-KR" sz="2500" baseline="0" dirty="0"/>
+                        <a:t>alarm : String</a:t>
+                      </a:r>
+                      <a:endParaRPr lang="ko-KR" altLang="en-US" sz="2500" dirty="0"/>
+                    </a:p>
+                  </a:txBody>
+                  <a:tcPr/>
+                </a:tc>
+                <a:extLst>
+                  <a:ext uri="{0D108BD9-81ED-4DB2-BD59-A6C34878D82A}">
+                    <a16:rowId xmlns:a16="http://schemas.microsoft.com/office/drawing/2014/main" val="10001"/>
+                  </a:ext>
+                </a:extLst>
+              </a:tr>
+            </a:tbl>
+          </a:graphicData>
+        </a:graphic>
+      </p:graphicFrame>
+      <p:sp>
+        <p:nvSpPr>
+          <p:cNvPr id="7" name="제목 1"/>
+          <p:cNvSpPr>
+            <a:spLocks noGrp="1"/>
+          </p:cNvSpPr>
+          <p:nvPr>
+            <p:ph type="title"/>
+          </p:nvPr>
+        </p:nvSpPr>
+        <p:spPr>
+          <a:xfrm>
+            <a:off x="352425" y="220211"/>
+            <a:ext cx="8327552" cy="625950"/>
+          </a:xfrm>
+        </p:spPr>
+        <p:txBody>
+          <a:bodyPr/>
+          <a:lstStyle/>
+          <a:p>
+            <a:r>
+              <a:rPr lang="en-US" altLang="ko-KR" sz="2500" dirty="0"/>
+              <a:t>Entity Class</a:t>
+            </a:r>
+            <a:endParaRPr lang="ko-KR" altLang="en-US" sz="2500" dirty="0"/>
+          </a:p>
+        </p:txBody>
+      </p:sp>
+    </p:spTree>
+    <p:extLst>
+      <p:ext uri="{BB962C8B-B14F-4D97-AF65-F5344CB8AC3E}">
+        <p14:creationId xmlns:p14="http://schemas.microsoft.com/office/powerpoint/2010/main" val="271517441"/>
+      </p:ext>
+    </p:extLst>
+  </p:cSld>
+  <p:clrMapOvr>
+    <a:masterClrMapping/>
+  </p:clrMapOvr>
+</p:sld>
+</file>
+
+<file path=ppt/slides/slide7.xml><?xml version="1.0" encoding="utf-8"?>
+<p:sld xmlns:a="http://schemas.openxmlformats.org/drawingml/2006/main" xmlns:r="http://schemas.openxmlformats.org/officeDocument/2006/relationships" xmlns:p="http://schemas.openxmlformats.org/presentationml/2006/main">
+  <p:cSld>
+    <p:spTree>
+      <p:nvGrpSpPr>
+        <p:cNvPr id="1" name=""/>
+        <p:cNvGrpSpPr/>
+        <p:nvPr/>
+      </p:nvGrpSpPr>
+      <p:grpSpPr>
+        <a:xfrm>
+          <a:off x="0" y="0"/>
+          <a:ext cx="0" cy="0"/>
+          <a:chOff x="0" y="0"/>
+          <a:chExt cx="0" cy="0"/>
+        </a:xfrm>
+      </p:grpSpPr>
+      <p:sp>
+        <p:nvSpPr>
+          <p:cNvPr id="4" name="바닥글 개체 틀 3"/>
+          <p:cNvSpPr>
+            <a:spLocks noGrp="1"/>
+          </p:cNvSpPr>
+          <p:nvPr>
+            <p:ph type="ftr" sz="quarter" idx="3"/>
+          </p:nvPr>
+        </p:nvSpPr>
+        <p:spPr/>
+        <p:txBody>
+          <a:bodyPr/>
+          <a:lstStyle/>
+          <a:p>
+            <a:pPr algn="r"/>
+            <a:r>
+              <a:rPr lang="ko-KR" altLang="en-US"/>
+              <a:t>팀 명</a:t>
+            </a:r>
+            <a:endParaRPr lang="en-US" altLang="ko-KR" dirty="0"/>
+          </a:p>
+        </p:txBody>
+      </p:sp>
+      <p:graphicFrame>
+        <p:nvGraphicFramePr>
+          <p:cNvPr id="5" name="표 4"/>
+          <p:cNvGraphicFramePr>
+            <a:graphicFrameLocks noGrp="1"/>
+          </p:cNvGraphicFramePr>
+          <p:nvPr/>
+        </p:nvGraphicFramePr>
+        <p:xfrm>
+          <a:off x="352426" y="1228296"/>
+          <a:ext cx="3960268" cy="4967787"/>
+        </p:xfrm>
+        <a:graphic>
+          <a:graphicData uri="http://schemas.openxmlformats.org/drawingml/2006/table">
+            <a:tbl>
+              <a:tblPr firstRow="1" bandRow="1">
+                <a:tableStyleId>{17292A2E-F333-43FB-9621-5CBBE7FDCDCB}</a:tableStyleId>
+              </a:tblPr>
+              <a:tblGrid>
+                <a:gridCol w="3960268">
+                  <a:extLst>
+                    <a:ext uri="{9D8B030D-6E8A-4147-A177-3AD203B41FA5}">
+                      <a16:colId xmlns:a16="http://schemas.microsoft.com/office/drawing/2014/main" val="20000"/>
+                    </a:ext>
+                  </a:extLst>
+                </a:gridCol>
+              </a:tblGrid>
+              <a:tr h="875279">
+                <a:tc>
+                  <a:txBody>
+                    <a:bodyPr/>
+                    <a:lstStyle/>
+                    <a:p>
+                      <a:pPr algn="l" latinLnBrk="1"/>
+                      <a:r>
+                        <a:rPr lang="en-US" altLang="ko-KR" sz="4000" dirty="0" err="1"/>
+                        <a:t>TodoList</a:t>
+                      </a:r>
+                      <a:endParaRPr lang="ko-KR" altLang="en-US" sz="4000" dirty="0"/>
+                    </a:p>
+                  </a:txBody>
+                  <a:tcPr/>
+                </a:tc>
+                <a:extLst>
+                  <a:ext uri="{0D108BD9-81ED-4DB2-BD59-A6C34878D82A}">
+                    <a16:rowId xmlns:a16="http://schemas.microsoft.com/office/drawing/2014/main" val="10000"/>
+                  </a:ext>
+                </a:extLst>
+              </a:tr>
+              <a:tr h="4092508">
+                <a:tc>
+                  <a:txBody>
+                    <a:bodyPr/>
+                    <a:lstStyle/>
+                    <a:p>
+                      <a:pPr algn="l" latinLnBrk="1"/>
+                      <a:r>
+                        <a:rPr lang="en-US" altLang="ko-KR" sz="2500" dirty="0" err="1"/>
+                        <a:t>todoArray</a:t>
+                      </a:r>
+                      <a:r>
+                        <a:rPr lang="en-US" altLang="ko-KR" sz="2500" baseline="0" dirty="0"/>
+                        <a:t> : </a:t>
+                      </a:r>
+                      <a:r>
+                        <a:rPr lang="en-US" altLang="ko-KR" sz="2500" baseline="0" dirty="0" err="1"/>
+                        <a:t>Todo</a:t>
+                      </a:r>
+                      <a:r>
+                        <a:rPr lang="en-US" altLang="ko-KR" sz="2500" baseline="0" dirty="0"/>
+                        <a:t>[]</a:t>
+                      </a:r>
+                      <a:endParaRPr lang="ko-KR" altLang="en-US" sz="2500" dirty="0"/>
+                    </a:p>
+                  </a:txBody>
+                  <a:tcPr/>
+                </a:tc>
+                <a:extLst>
+                  <a:ext uri="{0D108BD9-81ED-4DB2-BD59-A6C34878D82A}">
+                    <a16:rowId xmlns:a16="http://schemas.microsoft.com/office/drawing/2014/main" val="10001"/>
+                  </a:ext>
+                </a:extLst>
+              </a:tr>
+            </a:tbl>
+          </a:graphicData>
+        </a:graphic>
+      </p:graphicFrame>
+      <p:sp>
+        <p:nvSpPr>
+          <p:cNvPr id="7" name="제목 1"/>
+          <p:cNvSpPr>
+            <a:spLocks noGrp="1"/>
+          </p:cNvSpPr>
+          <p:nvPr>
+            <p:ph type="title"/>
+          </p:nvPr>
+        </p:nvSpPr>
+        <p:spPr>
+          <a:xfrm>
+            <a:off x="352425" y="220211"/>
+            <a:ext cx="8327552" cy="625950"/>
+          </a:xfrm>
+        </p:spPr>
+        <p:txBody>
+          <a:bodyPr/>
+          <a:lstStyle/>
+          <a:p>
+            <a:r>
+              <a:rPr lang="en-US" altLang="ko-KR" sz="2500" dirty="0"/>
+              <a:t>Entity Class</a:t>
+            </a:r>
+            <a:endParaRPr lang="ko-KR" altLang="en-US" sz="2500" dirty="0"/>
+          </a:p>
+        </p:txBody>
+      </p:sp>
+    </p:spTree>
+    <p:extLst>
+      <p:ext uri="{BB962C8B-B14F-4D97-AF65-F5344CB8AC3E}">
+        <p14:creationId xmlns:p14="http://schemas.microsoft.com/office/powerpoint/2010/main" val="2182007234"/>
+      </p:ext>
+    </p:extLst>
+  </p:cSld>
+  <p:clrMapOvr>
+    <a:masterClrMapping/>
+  </p:clrMapOvr>
+</p:sld>
+</file>
+
+<file path=ppt/slides/slide8.xml><?xml version="1.0" encoding="utf-8"?>
+<p:sld xmlns:a="http://schemas.openxmlformats.org/drawingml/2006/main" xmlns:r="http://schemas.openxmlformats.org/officeDocument/2006/relationships" xmlns:p="http://schemas.openxmlformats.org/presentationml/2006/main">
+  <p:cSld>
+    <p:spTree>
+      <p:nvGrpSpPr>
+        <p:cNvPr id="1" name=""/>
+        <p:cNvGrpSpPr/>
+        <p:nvPr/>
+      </p:nvGrpSpPr>
+      <p:grpSpPr>
+        <a:xfrm>
+          <a:off x="0" y="0"/>
+          <a:ext cx="0" cy="0"/>
+          <a:chOff x="0" y="0"/>
+          <a:chExt cx="0" cy="0"/>
+        </a:xfrm>
+      </p:grpSpPr>
+      <p:sp>
+        <p:nvSpPr>
+          <p:cNvPr id="2" name="제목 1"/>
+          <p:cNvSpPr>
+            <a:spLocks noGrp="1"/>
+          </p:cNvSpPr>
+          <p:nvPr>
+            <p:ph type="ctrTitle"/>
+          </p:nvPr>
+        </p:nvSpPr>
+        <p:spPr/>
+        <p:txBody>
+          <a:bodyPr/>
+          <a:lstStyle/>
+          <a:p>
+            <a:pPr algn="ctr"/>
+            <a:r>
+              <a:rPr lang="en-US" altLang="ko-KR" sz="4500" dirty="0"/>
+              <a:t>Boundary Class</a:t>
+            </a:r>
+            <a:endParaRPr lang="ko-KR" altLang="en-US" sz="4500" dirty="0"/>
+          </a:p>
+        </p:txBody>
+      </p:sp>
+    </p:spTree>
+    <p:extLst>
+      <p:ext uri="{BB962C8B-B14F-4D97-AF65-F5344CB8AC3E}">
+        <p14:creationId xmlns:p14="http://schemas.microsoft.com/office/powerpoint/2010/main" val="2301147020"/>
+      </p:ext>
+    </p:extLst>
+  </p:cSld>
+  <p:clrMapOvr>
+    <a:masterClrMapping/>
+  </p:clrMapOvr>
+</p:sld>
+</file>
+
+<file path=ppt/slides/slide9.xml><?xml version="1.0" encoding="utf-8"?>
+<p:sld xmlns:a="http://schemas.openxmlformats.org/drawingml/2006/main" xmlns:r="http://schemas.openxmlformats.org/officeDocument/2006/relationships" xmlns:p="http://schemas.openxmlformats.org/presentationml/2006/main">
+  <p:cSld>
+    <p:spTree>
+      <p:nvGrpSpPr>
+        <p:cNvPr id="1" name=""/>
+        <p:cNvGrpSpPr/>
+        <p:nvPr/>
+      </p:nvGrpSpPr>
+      <p:grpSpPr>
+        <a:xfrm>
+          <a:off x="0" y="0"/>
+          <a:ext cx="0" cy="0"/>
+          <a:chOff x="0" y="0"/>
+          <a:chExt cx="0" cy="0"/>
+        </a:xfrm>
+      </p:grpSpPr>
+      <p:sp>
+        <p:nvSpPr>
+          <p:cNvPr id="2" name="제목 1"/>
+          <p:cNvSpPr>
+            <a:spLocks noGrp="1"/>
+          </p:cNvSpPr>
+          <p:nvPr>
+            <p:ph type="title"/>
+          </p:nvPr>
+        </p:nvSpPr>
+        <p:spPr>
+          <a:xfrm>
+            <a:off x="352425" y="220211"/>
+            <a:ext cx="8327552" cy="625950"/>
+          </a:xfrm>
+        </p:spPr>
+        <p:txBody>
+          <a:bodyPr/>
+          <a:lstStyle/>
+          <a:p>
+            <a:r>
+              <a:rPr lang="en-US" altLang="ko-KR" sz="2500" dirty="0"/>
+              <a:t>Boundary Class</a:t>
+            </a:r>
+            <a:endParaRPr lang="ko-KR" altLang="en-US" sz="2500" dirty="0"/>
+          </a:p>
+        </p:txBody>
+      </p:sp>
+      <p:sp>
+        <p:nvSpPr>
+          <p:cNvPr id="4" name="바닥글 개체 틀 3"/>
+          <p:cNvSpPr>
+            <a:spLocks noGrp="1"/>
+          </p:cNvSpPr>
+          <p:nvPr>
+            <p:ph type="ftr" sz="quarter" idx="3"/>
+          </p:nvPr>
+        </p:nvSpPr>
+        <p:spPr/>
+        <p:txBody>
+          <a:bodyPr/>
+          <a:lstStyle/>
+          <a:p>
+            <a:pPr algn="r"/>
+            <a:r>
+              <a:rPr lang="ko-KR" altLang="en-US"/>
+              <a:t>팀 명</a:t>
+            </a:r>
+            <a:endParaRPr lang="en-US" altLang="ko-KR" dirty="0"/>
+          </a:p>
+        </p:txBody>
+      </p:sp>
+      <p:graphicFrame>
+        <p:nvGraphicFramePr>
+          <p:cNvPr id="6" name="표 5"/>
+          <p:cNvGraphicFramePr>
+            <a:graphicFrameLocks noGrp="1"/>
+          </p:cNvGraphicFramePr>
+          <p:nvPr>
+            <p:extLst/>
+          </p:nvPr>
+        </p:nvGraphicFramePr>
+        <p:xfrm>
+          <a:off x="355600" y="1229360"/>
+          <a:ext cx="4175760" cy="4698913"/>
+        </p:xfrm>
+        <a:graphic>
+          <a:graphicData uri="http://schemas.openxmlformats.org/drawingml/2006/table">
+            <a:tbl>
+              <a:tblPr firstRow="1" bandRow="1">
+                <a:tableStyleId>{7E9639D4-E3E2-4D34-9284-5A2195B3D0D7}</a:tableStyleId>
+              </a:tblPr>
+              <a:tblGrid>
+                <a:gridCol w="4175760">
+                  <a:extLst>
+                    <a:ext uri="{9D8B030D-6E8A-4147-A177-3AD203B41FA5}">
+                      <a16:colId xmlns:a16="http://schemas.microsoft.com/office/drawing/2014/main" val="3774239926"/>
+                    </a:ext>
+                  </a:extLst>
+                </a:gridCol>
+              </a:tblGrid>
+              <a:tr h="370946">
+                <a:tc>
+                  <a:txBody>
+                    <a:bodyPr/>
+                    <a:lstStyle/>
+                    <a:p>
+                      <a:pPr latinLnBrk="1"/>
+                      <a:r>
+                        <a:rPr lang="en-US" altLang="ko-KR" dirty="0"/>
+                        <a:t>Main UI</a:t>
+                      </a:r>
+                      <a:endParaRPr lang="ko-KR" altLang="en-US" dirty="0"/>
+                    </a:p>
+                  </a:txBody>
+                  <a:tcPr/>
+                </a:tc>
+                <a:extLst>
+                  <a:ext uri="{0D108BD9-81ED-4DB2-BD59-A6C34878D82A}">
+                    <a16:rowId xmlns:a16="http://schemas.microsoft.com/office/drawing/2014/main" val="302007300"/>
+                  </a:ext>
+                </a:extLst>
+              </a:tr>
+              <a:tr h="2490776">
+                <a:tc>
+                  <a:txBody>
+                    <a:bodyPr/>
+                    <a:lstStyle/>
+                    <a:p>
+                      <a:pPr latinLnBrk="1"/>
+                      <a:r>
+                        <a:rPr lang="en-US" altLang="ko-KR" dirty="0"/>
+                        <a:t>-</a:t>
+                      </a:r>
+                      <a:r>
+                        <a:rPr lang="en-US" altLang="ko-KR" dirty="0" err="1"/>
+                        <a:t>logoutButton</a:t>
+                      </a:r>
+                      <a:r>
+                        <a:rPr lang="en-US" altLang="ko-KR" dirty="0"/>
+                        <a:t> : Button</a:t>
+                      </a:r>
+                    </a:p>
+                    <a:p>
+                      <a:pPr latinLnBrk="1"/>
+                      <a:r>
+                        <a:rPr lang="en-US" altLang="ko-KR" dirty="0"/>
+                        <a:t>-</a:t>
+                      </a:r>
+                      <a:r>
+                        <a:rPr lang="en-US" altLang="ko-KR" dirty="0" err="1"/>
+                        <a:t>regButton</a:t>
+                      </a:r>
+                      <a:r>
+                        <a:rPr lang="en-US" altLang="ko-KR" dirty="0"/>
+                        <a:t> : Button</a:t>
+                      </a:r>
+                    </a:p>
+                    <a:p>
+                      <a:pPr latinLnBrk="1"/>
+                      <a:r>
+                        <a:rPr lang="en-US" altLang="ko-KR" dirty="0"/>
+                        <a:t>-</a:t>
+                      </a:r>
+                      <a:r>
+                        <a:rPr lang="en-US" altLang="ko-KR" dirty="0" err="1"/>
+                        <a:t>cancelButton</a:t>
+                      </a:r>
+                      <a:r>
+                        <a:rPr lang="en-US" altLang="ko-KR" dirty="0"/>
+                        <a:t> : Button</a:t>
+                      </a:r>
+                    </a:p>
+                    <a:p>
+                      <a:pPr latinLnBrk="1"/>
+                      <a:r>
+                        <a:rPr lang="en-US" altLang="ko-KR" dirty="0"/>
+                        <a:t>-</a:t>
+                      </a:r>
+                      <a:r>
+                        <a:rPr lang="en-US" altLang="ko-KR" dirty="0" err="1"/>
+                        <a:t>timeButton</a:t>
+                      </a:r>
+                      <a:r>
+                        <a:rPr lang="en-US" altLang="ko-KR" dirty="0"/>
+                        <a:t> : Button</a:t>
+                      </a:r>
+                    </a:p>
+                    <a:p>
+                      <a:pPr latinLnBrk="1"/>
+                      <a:r>
+                        <a:rPr lang="en-US" altLang="ko-KR" dirty="0"/>
+                        <a:t>-</a:t>
+                      </a:r>
+                      <a:r>
+                        <a:rPr lang="en-US" altLang="ko-KR" dirty="0" err="1"/>
+                        <a:t>showCourseButton</a:t>
+                      </a:r>
+                      <a:r>
+                        <a:rPr lang="en-US" altLang="ko-KR" dirty="0"/>
+                        <a:t> : Button</a:t>
+                      </a:r>
+                    </a:p>
+                    <a:p>
+                      <a:pPr latinLnBrk="1"/>
+                      <a:r>
+                        <a:rPr lang="en-US" altLang="ko-KR" dirty="0"/>
+                        <a:t>-</a:t>
+                      </a:r>
+                      <a:r>
+                        <a:rPr lang="en-US" altLang="ko-KR" dirty="0" err="1"/>
+                        <a:t>courseTable</a:t>
+                      </a:r>
+                      <a:r>
+                        <a:rPr lang="en-US" altLang="ko-KR" dirty="0"/>
+                        <a:t> : Table</a:t>
+                      </a:r>
+                    </a:p>
+                    <a:p>
+                      <a:pPr latinLnBrk="1"/>
+                      <a:r>
+                        <a:rPr lang="en-US" altLang="ko-KR" dirty="0"/>
+                        <a:t>-</a:t>
+                      </a:r>
+                      <a:r>
+                        <a:rPr lang="en-US" altLang="ko-KR" dirty="0" err="1"/>
+                        <a:t>regTable</a:t>
+                      </a:r>
+                      <a:r>
+                        <a:rPr lang="en-US" altLang="ko-KR" dirty="0"/>
+                        <a:t> : Table</a:t>
+                      </a:r>
+                    </a:p>
+                    <a:p>
+                      <a:pPr latinLnBrk="1"/>
+                      <a:r>
+                        <a:rPr lang="en-US" altLang="ko-KR" dirty="0"/>
+                        <a:t>-</a:t>
+                      </a:r>
+                      <a:r>
+                        <a:rPr lang="en-US" altLang="ko-KR" dirty="0" err="1"/>
+                        <a:t>loginSystem</a:t>
+                      </a:r>
+                      <a:r>
+                        <a:rPr lang="en-US" altLang="ko-KR" dirty="0"/>
+                        <a:t> : </a:t>
+                      </a:r>
+                      <a:r>
+                        <a:rPr lang="en-US" altLang="ko-KR" dirty="0" err="1"/>
+                        <a:t>LoginSystem</a:t>
+                      </a:r>
+                      <a:endParaRPr lang="en-US" altLang="ko-KR" dirty="0"/>
+                    </a:p>
+                    <a:p>
+                      <a:pPr latinLnBrk="1"/>
+                      <a:r>
+                        <a:rPr lang="en-US" altLang="ko-KR" dirty="0"/>
+                        <a:t>-</a:t>
+                      </a:r>
+                      <a:r>
+                        <a:rPr lang="en-US" altLang="ko-KR" dirty="0" err="1"/>
+                        <a:t>courseContents</a:t>
+                      </a:r>
+                      <a:r>
+                        <a:rPr lang="en-US" altLang="ko-KR" dirty="0"/>
+                        <a:t> : </a:t>
+                      </a:r>
+                      <a:r>
+                        <a:rPr lang="en-US" altLang="ko-KR" dirty="0" err="1"/>
+                        <a:t>ShowCourseSystem</a:t>
+                      </a:r>
+                      <a:endParaRPr lang="ko-KR" altLang="en-US" dirty="0"/>
+                    </a:p>
+                  </a:txBody>
+                  <a:tcPr/>
+                </a:tc>
+                <a:extLst>
+                  <a:ext uri="{0D108BD9-81ED-4DB2-BD59-A6C34878D82A}">
+                    <a16:rowId xmlns:a16="http://schemas.microsoft.com/office/drawing/2014/main" val="1087690364"/>
+                  </a:ext>
+                </a:extLst>
+              </a:tr>
+              <a:tr h="1767647">
+                <a:tc>
+                  <a:txBody>
+                    <a:bodyPr/>
+                    <a:lstStyle/>
+                    <a:p>
+                      <a:pPr latinLnBrk="1"/>
+                      <a:r>
+                        <a:rPr lang="en-US" altLang="ko-KR" dirty="0"/>
+                        <a:t>+</a:t>
+                      </a:r>
+                      <a:r>
+                        <a:rPr lang="en-US" altLang="ko-KR" dirty="0" err="1"/>
+                        <a:t>MainUI</a:t>
+                      </a:r>
+                      <a:r>
+                        <a:rPr lang="en-US" altLang="ko-KR" dirty="0"/>
+                        <a:t>(</a:t>
+                      </a:r>
+                      <a:r>
+                        <a:rPr lang="en-US" altLang="ko-KR" dirty="0" err="1"/>
+                        <a:t>loginSystem</a:t>
+                      </a:r>
+                      <a:r>
+                        <a:rPr lang="en-US" altLang="ko-KR" dirty="0"/>
+                        <a:t> : </a:t>
+                      </a:r>
+                      <a:r>
+                        <a:rPr lang="en-US" altLang="ko-KR" dirty="0" err="1"/>
+                        <a:t>LoginSystem</a:t>
+                      </a:r>
+                      <a:r>
+                        <a:rPr lang="en-US" altLang="ko-KR" dirty="0"/>
+                        <a:t>)</a:t>
+                      </a:r>
+                    </a:p>
+                    <a:p>
+                      <a:pPr latinLnBrk="1"/>
+                      <a:r>
+                        <a:rPr lang="en-US" altLang="ko-KR" dirty="0"/>
+                        <a:t>+</a:t>
+                      </a:r>
+                      <a:r>
+                        <a:rPr lang="en-US" altLang="ko-KR" dirty="0" err="1"/>
+                        <a:t>showMainUI</a:t>
+                      </a:r>
+                      <a:r>
+                        <a:rPr lang="en-US" altLang="ko-KR" dirty="0"/>
+                        <a:t>(</a:t>
+                      </a:r>
+                      <a:r>
+                        <a:rPr lang="en-US" altLang="ko-KR" dirty="0" err="1"/>
+                        <a:t>studentName</a:t>
+                      </a:r>
+                      <a:r>
+                        <a:rPr lang="en-US" altLang="ko-KR" dirty="0"/>
+                        <a:t> : String)</a:t>
+                      </a:r>
+                    </a:p>
+                    <a:p>
+                      <a:pPr latinLnBrk="1"/>
+                      <a:r>
+                        <a:rPr lang="en-US" altLang="ko-KR" dirty="0"/>
+                        <a:t>+</a:t>
+                      </a:r>
+                      <a:r>
+                        <a:rPr lang="en-US" altLang="ko-KR" dirty="0" err="1"/>
+                        <a:t>showTimeUI</a:t>
+                      </a:r>
+                      <a:r>
+                        <a:rPr lang="en-US" altLang="ko-KR" dirty="0"/>
+                        <a:t>()</a:t>
+                      </a:r>
+                    </a:p>
+                    <a:p>
+                      <a:pPr latinLnBrk="1"/>
+                      <a:r>
+                        <a:rPr lang="en-US" altLang="ko-KR" dirty="0"/>
+                        <a:t>+</a:t>
+                      </a:r>
+                      <a:r>
+                        <a:rPr lang="en-US" altLang="ko-KR" dirty="0" err="1"/>
+                        <a:t>actionPerformed</a:t>
+                      </a:r>
+                      <a:r>
+                        <a:rPr lang="en-US" altLang="ko-KR" dirty="0"/>
+                        <a:t>(e : </a:t>
+                      </a:r>
+                      <a:r>
+                        <a:rPr lang="en-US" altLang="ko-KR" dirty="0" err="1"/>
+                        <a:t>ActionEvent</a:t>
+                      </a:r>
+                      <a:r>
+                        <a:rPr lang="en-US" altLang="ko-KR" dirty="0"/>
+                        <a:t>)</a:t>
+                      </a:r>
+                    </a:p>
+                    <a:p>
+                      <a:pPr latinLnBrk="1"/>
+                      <a:endParaRPr lang="ko-KR" altLang="en-US" dirty="0"/>
+                    </a:p>
+                  </a:txBody>
+                  <a:tcPr/>
+                </a:tc>
+                <a:extLst>
+                  <a:ext uri="{0D108BD9-81ED-4DB2-BD59-A6C34878D82A}">
+                    <a16:rowId xmlns:a16="http://schemas.microsoft.com/office/drawing/2014/main" val="1597738046"/>
+                  </a:ext>
+                </a:extLst>
+              </a:tr>
+            </a:tbl>
+          </a:graphicData>
+        </a:graphic>
+      </p:graphicFrame>
+      <p:graphicFrame>
+        <p:nvGraphicFramePr>
+          <p:cNvPr id="7" name="표 6"/>
+          <p:cNvGraphicFramePr>
+            <a:graphicFrameLocks noGrp="1"/>
+          </p:cNvGraphicFramePr>
+          <p:nvPr>
+            <p:extLst/>
+          </p:nvPr>
+        </p:nvGraphicFramePr>
+        <p:xfrm>
+          <a:off x="4754101" y="1229360"/>
+          <a:ext cx="3749040" cy="4698912"/>
+        </p:xfrm>
+        <a:graphic>
+          <a:graphicData uri="http://schemas.openxmlformats.org/drawingml/2006/table">
+            <a:tbl>
+              <a:tblPr firstRow="1" bandRow="1">
+                <a:tableStyleId>{7E9639D4-E3E2-4D34-9284-5A2195B3D0D7}</a:tableStyleId>
+              </a:tblPr>
+              <a:tblGrid>
+                <a:gridCol w="3749040">
+                  <a:extLst>
+                    <a:ext uri="{9D8B030D-6E8A-4147-A177-3AD203B41FA5}">
+                      <a16:colId xmlns:a16="http://schemas.microsoft.com/office/drawing/2014/main" val="3774239926"/>
+                    </a:ext>
+                  </a:extLst>
+                </a:gridCol>
+              </a:tblGrid>
+              <a:tr h="388296">
+                <a:tc>
+                  <a:txBody>
+                    <a:bodyPr/>
+                    <a:lstStyle/>
+                    <a:p>
+                      <a:pPr latinLnBrk="1"/>
+                      <a:r>
+                        <a:rPr lang="en-US" altLang="ko-KR" dirty="0"/>
+                        <a:t>login UI</a:t>
+                      </a:r>
+                      <a:endParaRPr lang="ko-KR" altLang="en-US" dirty="0"/>
+                    </a:p>
+                  </a:txBody>
+                  <a:tcPr/>
+                </a:tc>
+                <a:extLst>
+                  <a:ext uri="{0D108BD9-81ED-4DB2-BD59-A6C34878D82A}">
+                    <a16:rowId xmlns:a16="http://schemas.microsoft.com/office/drawing/2014/main" val="302007300"/>
+                  </a:ext>
+                </a:extLst>
+              </a:tr>
+              <a:tr h="2486938">
+                <a:tc>
+                  <a:txBody>
+                    <a:bodyPr/>
+                    <a:lstStyle/>
+                    <a:p>
+                      <a:pPr latinLnBrk="1"/>
+                      <a:r>
+                        <a:rPr lang="en-US" altLang="ko-KR" dirty="0"/>
+                        <a:t>-</a:t>
+                      </a:r>
+                      <a:r>
+                        <a:rPr lang="en-US" altLang="ko-KR" dirty="0" err="1"/>
+                        <a:t>loginButton</a:t>
+                      </a:r>
+                      <a:r>
+                        <a:rPr lang="en-US" altLang="ko-KR" dirty="0"/>
+                        <a:t> : Button</a:t>
+                      </a:r>
+                    </a:p>
+                    <a:p>
+                      <a:pPr latinLnBrk="1"/>
+                      <a:r>
+                        <a:rPr lang="en-US" altLang="ko-KR" dirty="0"/>
+                        <a:t>-</a:t>
+                      </a:r>
+                      <a:r>
+                        <a:rPr lang="en-US" altLang="ko-KR" dirty="0" err="1"/>
+                        <a:t>idTextField</a:t>
+                      </a:r>
+                      <a:r>
+                        <a:rPr lang="en-US" altLang="ko-KR" dirty="0"/>
+                        <a:t> : </a:t>
+                      </a:r>
+                      <a:r>
+                        <a:rPr lang="en-US" altLang="ko-KR" dirty="0" err="1"/>
+                        <a:t>TextField</a:t>
+                      </a:r>
+                      <a:endParaRPr lang="en-US" altLang="ko-KR" dirty="0"/>
+                    </a:p>
+                    <a:p>
+                      <a:pPr latinLnBrk="1"/>
+                      <a:r>
+                        <a:rPr lang="en-US" altLang="ko-KR" dirty="0"/>
+                        <a:t>-</a:t>
+                      </a:r>
+                      <a:r>
+                        <a:rPr lang="en-US" altLang="ko-KR" dirty="0" err="1"/>
+                        <a:t>passwordTextField</a:t>
+                      </a:r>
+                      <a:r>
+                        <a:rPr lang="en-US" altLang="ko-KR" dirty="0"/>
+                        <a:t> : </a:t>
+                      </a:r>
+                      <a:r>
+                        <a:rPr lang="en-US" altLang="ko-KR" dirty="0" err="1"/>
+                        <a:t>TextField</a:t>
+                      </a:r>
+                      <a:endParaRPr lang="en-US" altLang="ko-KR" dirty="0"/>
+                    </a:p>
+                    <a:p>
+                      <a:pPr latinLnBrk="1"/>
+                      <a:r>
+                        <a:rPr lang="en-US" altLang="ko-KR" dirty="0"/>
+                        <a:t>-</a:t>
+                      </a:r>
+                      <a:r>
+                        <a:rPr lang="en-US" altLang="ko-KR" dirty="0" err="1"/>
+                        <a:t>loginSystem</a:t>
+                      </a:r>
+                      <a:r>
+                        <a:rPr lang="en-US" altLang="ko-KR" dirty="0"/>
+                        <a:t> : </a:t>
+                      </a:r>
+                      <a:r>
+                        <a:rPr lang="en-US" altLang="ko-KR" dirty="0" err="1"/>
+                        <a:t>LoginSystem</a:t>
+                      </a:r>
+                      <a:endParaRPr lang="ko-KR" altLang="en-US" dirty="0"/>
+                    </a:p>
+                  </a:txBody>
+                  <a:tcPr/>
+                </a:tc>
+                <a:extLst>
+                  <a:ext uri="{0D108BD9-81ED-4DB2-BD59-A6C34878D82A}">
+                    <a16:rowId xmlns:a16="http://schemas.microsoft.com/office/drawing/2014/main" val="1087690364"/>
+                  </a:ext>
+                </a:extLst>
+              </a:tr>
+              <a:tr h="1823678">
+                <a:tc>
+                  <a:txBody>
+                    <a:bodyPr/>
+                    <a:lstStyle/>
+                    <a:p>
+                      <a:pPr latinLnBrk="1"/>
+                      <a:r>
+                        <a:rPr lang="en-US" altLang="ko-KR" dirty="0"/>
+                        <a:t>+</a:t>
+                      </a:r>
+                      <a:r>
+                        <a:rPr lang="en-US" altLang="ko-KR" dirty="0" err="1"/>
+                        <a:t>LoginUI</a:t>
+                      </a:r>
+                      <a:endParaRPr lang="en-US" altLang="ko-KR" dirty="0"/>
+                    </a:p>
+                    <a:p>
+                      <a:pPr latinLnBrk="1"/>
+                      <a:r>
+                        <a:rPr lang="en-US" altLang="ko-KR" dirty="0"/>
+                        <a:t>+</a:t>
+                      </a:r>
+                      <a:r>
+                        <a:rPr lang="en-US" altLang="ko-KR" dirty="0" err="1"/>
+                        <a:t>showLoginUI</a:t>
+                      </a:r>
+                      <a:r>
+                        <a:rPr lang="en-US" altLang="ko-KR" dirty="0"/>
+                        <a:t>()</a:t>
+                      </a:r>
+                    </a:p>
+                    <a:p>
+                      <a:pPr latinLnBrk="1"/>
+                      <a:r>
+                        <a:rPr lang="en-US" altLang="ko-KR" dirty="0"/>
+                        <a:t>+</a:t>
+                      </a:r>
+                      <a:r>
+                        <a:rPr lang="en-US" altLang="ko-KR" dirty="0" err="1"/>
+                        <a:t>failLogin</a:t>
+                      </a:r>
+                      <a:r>
+                        <a:rPr lang="en-US" altLang="ko-KR" dirty="0"/>
+                        <a:t>()</a:t>
+                      </a:r>
+                    </a:p>
+                    <a:p>
+                      <a:pPr latinLnBrk="1"/>
+                      <a:r>
+                        <a:rPr lang="en-US" altLang="ko-KR" dirty="0"/>
+                        <a:t>+</a:t>
+                      </a:r>
+                      <a:r>
+                        <a:rPr lang="en-US" altLang="ko-KR" dirty="0" err="1"/>
+                        <a:t>setLoginSystem</a:t>
+                      </a:r>
+                      <a:r>
+                        <a:rPr lang="en-US" altLang="ko-KR" dirty="0"/>
+                        <a:t>(s : </a:t>
+                      </a:r>
+                      <a:r>
+                        <a:rPr lang="en-US" altLang="ko-KR" dirty="0" err="1"/>
+                        <a:t>LoginSystem</a:t>
+                      </a:r>
+                      <a:r>
+                        <a:rPr lang="en-US" altLang="ko-KR" dirty="0"/>
+                        <a:t>)</a:t>
+                      </a:r>
+                    </a:p>
+                    <a:p>
+                      <a:pPr latinLnBrk="1"/>
+                      <a:r>
+                        <a:rPr lang="en-US" altLang="ko-KR" dirty="0"/>
+                        <a:t>+</a:t>
+                      </a:r>
+                      <a:r>
+                        <a:rPr lang="en-US" altLang="ko-KR" dirty="0" err="1"/>
+                        <a:t>getLoginSystem</a:t>
+                      </a:r>
+                      <a:r>
+                        <a:rPr lang="en-US" altLang="ko-KR" dirty="0"/>
+                        <a:t> : </a:t>
+                      </a:r>
+                      <a:r>
+                        <a:rPr lang="en-US" altLang="ko-KR" dirty="0" err="1"/>
+                        <a:t>LoginSystem</a:t>
+                      </a:r>
+                      <a:endParaRPr lang="en-US" altLang="ko-KR" dirty="0"/>
+                    </a:p>
+                    <a:p>
+                      <a:pPr latinLnBrk="1"/>
+                      <a:r>
+                        <a:rPr lang="en-US" altLang="ko-KR" dirty="0"/>
+                        <a:t>+</a:t>
+                      </a:r>
+                      <a:r>
+                        <a:rPr lang="en-US" altLang="ko-KR" dirty="0" err="1"/>
+                        <a:t>actionPerformed</a:t>
+                      </a:r>
+                      <a:r>
+                        <a:rPr lang="en-US" altLang="ko-KR" dirty="0"/>
+                        <a:t>(e : </a:t>
+                      </a:r>
+                      <a:r>
+                        <a:rPr lang="en-US" altLang="ko-KR" dirty="0" err="1"/>
+                        <a:t>ActionEvent</a:t>
+                      </a:r>
+                      <a:r>
+                        <a:rPr lang="en-US" altLang="ko-KR" dirty="0"/>
+                        <a:t>)</a:t>
+                      </a:r>
+                    </a:p>
+                  </a:txBody>
+                  <a:tcPr/>
+                </a:tc>
+                <a:extLst>
+                  <a:ext uri="{0D108BD9-81ED-4DB2-BD59-A6C34878D82A}">
+                    <a16:rowId xmlns:a16="http://schemas.microsoft.com/office/drawing/2014/main" val="1597738046"/>
+                  </a:ext>
+                </a:extLst>
+              </a:tr>
+            </a:tbl>
+          </a:graphicData>
+        </a:graphic>
+      </p:graphicFrame>
+    </p:spTree>
+    <p:extLst>
+      <p:ext uri="{BB962C8B-B14F-4D97-AF65-F5344CB8AC3E}">
+        <p14:creationId xmlns:p14="http://schemas.microsoft.com/office/powerpoint/2010/main" val="3282364"/>
+      </p:ext>
+    </p:extLst>
   </p:cSld>
   <p:clrMapOvr>
     <a:masterClrMapping/>

</xml_diff>

<commit_message>
#866 새기능 신규 높음 2017.05.22 클래스 디자인 - Control Class 수정
</commit_message>
<xml_diff>
--- a/doc/3_ 설계서/Class Design.pptx
+++ b/doc/3_ 설계서/Class Design.pptx
@@ -5,10 +5,10 @@
     <p:sldMasterId id="2147483655" r:id="rId1"/>
   </p:sldMasterIdLst>
   <p:notesMasterIdLst>
-    <p:notesMasterId r:id="rId16"/>
+    <p:notesMasterId r:id="rId17"/>
   </p:notesMasterIdLst>
   <p:handoutMasterIdLst>
-    <p:handoutMasterId r:id="rId17"/>
+    <p:handoutMasterId r:id="rId18"/>
   </p:handoutMasterIdLst>
   <p:sldIdLst>
     <p:sldId id="256" r:id="rId2"/>
@@ -22,9 +22,10 @@
     <p:sldId id="264" r:id="rId10"/>
     <p:sldId id="265" r:id="rId11"/>
     <p:sldId id="266" r:id="rId12"/>
-    <p:sldId id="267" r:id="rId13"/>
-    <p:sldId id="268" r:id="rId14"/>
-    <p:sldId id="269" r:id="rId15"/>
+    <p:sldId id="268" r:id="rId13"/>
+    <p:sldId id="269" r:id="rId14"/>
+    <p:sldId id="267" r:id="rId15"/>
+    <p:sldId id="270" r:id="rId16"/>
   </p:sldIdLst>
   <p:sldSz cx="9144000" cy="6858000" type="screen4x3"/>
   <p:notesSz cx="6797675" cy="9928225"/>
@@ -3532,7 +3533,13 @@
           <p:cNvGraphicFramePr>
             <a:graphicFrameLocks noGrp="1"/>
           </p:cNvGraphicFramePr>
-          <p:nvPr/>
+          <p:nvPr>
+            <p:extLst>
+              <p:ext uri="{D42A27DB-BD31-4B8C-83A1-F6EECF244321}">
+                <p14:modId xmlns:p14="http://schemas.microsoft.com/office/powerpoint/2010/main" val="1688253516"/>
+              </p:ext>
+            </p:extLst>
+          </p:nvPr>
         </p:nvGraphicFramePr>
         <p:xfrm>
           <a:off x="352425" y="1228296"/>
@@ -3561,11 +3568,7 @@
                     <a:p>
                       <a:r>
                         <a:rPr lang="en-US" altLang="ko-KR" sz="4000" dirty="0" err="1"/>
-                        <a:t>Show</a:t>
-                      </a:r>
-                      <a:r>
-                        <a:rPr lang="en-US" altLang="ko-KR" sz="4000" baseline="0" dirty="0" err="1"/>
-                        <a:t>CourseSystem</a:t>
+                        <a:t>CourseManageSystem</a:t>
                       </a:r>
                       <a:endParaRPr lang="ko-KR" altLang="en-US" sz="4000" dirty="0"/>
                     </a:p>
@@ -3617,13 +3620,146 @@
                     <a:bodyPr/>
                     <a:lstStyle/>
                     <a:p>
+                      <a:pPr marL="0" marR="0" indent="0" algn="l" defTabSz="914400" rtl="0" eaLnBrk="1" fontAlgn="auto" latinLnBrk="1" hangingPunct="1">
+                        <a:lnSpc>
+                          <a:spcPct val="100000"/>
+                        </a:lnSpc>
+                        <a:spcBef>
+                          <a:spcPts val="0"/>
+                        </a:spcBef>
+                        <a:spcAft>
+                          <a:spcPts val="0"/>
+                        </a:spcAft>
+                        <a:buClrTx/>
+                        <a:buSzTx/>
+                        <a:buFontTx/>
+                        <a:buNone/>
+                        <a:tabLst/>
+                        <a:defRPr/>
+                      </a:pPr>
                       <a:r>
                         <a:rPr lang="en-US" altLang="ko-KR" baseline="0" dirty="0"/>
                         <a:t>+</a:t>
                       </a:r>
                       <a:r>
+                        <a:rPr lang="en-US" altLang="ko-KR" sz="1800" dirty="0" err="1"/>
+                        <a:t>CourseManageSystem</a:t>
+                      </a:r>
+                      <a:r>
+                        <a:rPr lang="en-US" altLang="ko-KR" sz="1800" dirty="0"/>
+                        <a:t>()</a:t>
+                      </a:r>
+                      <a:endParaRPr lang="ko-KR" altLang="en-US" sz="1800" dirty="0"/>
+                    </a:p>
+                    <a:p>
+                      <a:r>
+                        <a:rPr lang="en-US" altLang="ko-KR" baseline="0" dirty="0"/>
+                        <a:t>+</a:t>
+                      </a:r>
+                      <a:r>
                         <a:rPr lang="en-US" altLang="ko-KR" baseline="0" dirty="0" err="1"/>
-                        <a:t>ShowCourseSystem</a:t>
+                        <a:t>AddCourseSystem</a:t>
+                      </a:r>
+                      <a:r>
+                        <a:rPr lang="en-US" altLang="ko-KR" baseline="0" dirty="0"/>
+                        <a:t>()</a:t>
+                      </a:r>
+                    </a:p>
+                    <a:p>
+                      <a:pPr marL="0" marR="0" indent="0" algn="l" defTabSz="914400" rtl="0" eaLnBrk="1" fontAlgn="auto" latinLnBrk="1" hangingPunct="1">
+                        <a:lnSpc>
+                          <a:spcPct val="100000"/>
+                        </a:lnSpc>
+                        <a:spcBef>
+                          <a:spcPts val="0"/>
+                        </a:spcBef>
+                        <a:spcAft>
+                          <a:spcPts val="0"/>
+                        </a:spcAft>
+                        <a:buClrTx/>
+                        <a:buSzTx/>
+                        <a:buFontTx/>
+                        <a:buNone/>
+                        <a:tabLst/>
+                        <a:defRPr/>
+                      </a:pPr>
+                      <a:r>
+                        <a:rPr lang="en-US" altLang="ko-KR" baseline="0" dirty="0"/>
+                        <a:t>+</a:t>
+                      </a:r>
+                      <a:r>
+                        <a:rPr lang="en-US" altLang="ko-KR" sz="1800" dirty="0" err="1"/>
+                        <a:t>Edit</a:t>
+                      </a:r>
+                      <a:r>
+                        <a:rPr lang="en-US" altLang="ko-KR" baseline="0" dirty="0" err="1"/>
+                        <a:t>CourseSystem</a:t>
+                      </a:r>
+                      <a:r>
+                        <a:rPr lang="en-US" altLang="ko-KR" baseline="0" dirty="0"/>
+                        <a:t>()</a:t>
+                      </a:r>
+                    </a:p>
+                    <a:p>
+                      <a:pPr marL="0" marR="0" indent="0" algn="l" defTabSz="914400" rtl="0" eaLnBrk="1" fontAlgn="auto" latinLnBrk="1" hangingPunct="1">
+                        <a:lnSpc>
+                          <a:spcPct val="100000"/>
+                        </a:lnSpc>
+                        <a:spcBef>
+                          <a:spcPts val="0"/>
+                        </a:spcBef>
+                        <a:spcAft>
+                          <a:spcPts val="0"/>
+                        </a:spcAft>
+                        <a:buClrTx/>
+                        <a:buSzTx/>
+                        <a:buFontTx/>
+                        <a:buNone/>
+                        <a:tabLst/>
+                        <a:defRPr/>
+                      </a:pPr>
+                      <a:r>
+                        <a:rPr lang="en-US" altLang="ko-KR" baseline="0" dirty="0"/>
+                        <a:t>+</a:t>
+                      </a:r>
+                      <a:r>
+                        <a:rPr lang="en-US" altLang="ko-KR" sz="1800" baseline="0" dirty="0" err="1"/>
+                        <a:t>Delete</a:t>
+                      </a:r>
+                      <a:r>
+                        <a:rPr lang="en-US" altLang="ko-KR" baseline="0" dirty="0" err="1"/>
+                        <a:t>CourseSystem</a:t>
+                      </a:r>
+                      <a:r>
+                        <a:rPr lang="en-US" altLang="ko-KR" baseline="0" dirty="0"/>
+                        <a:t>()</a:t>
+                      </a:r>
+                    </a:p>
+                    <a:p>
+                      <a:pPr marL="0" marR="0" indent="0" algn="l" defTabSz="914400" rtl="0" eaLnBrk="1" fontAlgn="auto" latinLnBrk="1" hangingPunct="1">
+                        <a:lnSpc>
+                          <a:spcPct val="100000"/>
+                        </a:lnSpc>
+                        <a:spcBef>
+                          <a:spcPts val="0"/>
+                        </a:spcBef>
+                        <a:spcAft>
+                          <a:spcPts val="0"/>
+                        </a:spcAft>
+                        <a:buClrTx/>
+                        <a:buSzTx/>
+                        <a:buFontTx/>
+                        <a:buNone/>
+                        <a:tabLst/>
+                        <a:defRPr/>
+                      </a:pPr>
+                      <a:r>
+                        <a:rPr lang="en-US" altLang="ko-KR" baseline="0" dirty="0"/>
+                        <a:t>+</a:t>
+                      </a:r>
+                      <a:r>
+                        <a:rPr lang="en-US" altLang="ko-KR" baseline="0" dirty="0" err="1"/>
+                        <a:t>SortCourseSystem</a:t>
                       </a:r>
                       <a:r>
                         <a:rPr lang="en-US" altLang="ko-KR" baseline="0" dirty="0"/>
@@ -3679,7 +3815,7 @@
     </p:spTree>
     <p:extLst>
       <p:ext uri="{BB962C8B-B14F-4D97-AF65-F5344CB8AC3E}">
-        <p14:creationId xmlns:p14="http://schemas.microsoft.com/office/powerpoint/2010/main" val="1712016017"/>
+        <p14:creationId xmlns:p14="http://schemas.microsoft.com/office/powerpoint/2010/main" val="4113967170"/>
       </p:ext>
     </p:extLst>
   </p:cSld>
@@ -3764,7 +3900,13 @@
           <p:cNvGraphicFramePr>
             <a:graphicFrameLocks noGrp="1"/>
           </p:cNvGraphicFramePr>
-          <p:nvPr/>
+          <p:nvPr>
+            <p:extLst>
+              <p:ext uri="{D42A27DB-BD31-4B8C-83A1-F6EECF244321}">
+                <p14:modId xmlns:p14="http://schemas.microsoft.com/office/powerpoint/2010/main" val="238988370"/>
+              </p:ext>
+            </p:extLst>
+          </p:nvPr>
         </p:nvGraphicFramePr>
         <p:xfrm>
           <a:off x="352425" y="1228296"/>
@@ -3793,7 +3935,7 @@
                     <a:p>
                       <a:r>
                         <a:rPr lang="en-US" altLang="ko-KR" sz="4000" dirty="0" err="1"/>
-                        <a:t>CourseManageSystem</a:t>
+                        <a:t>TodoManageSystem</a:t>
                       </a:r>
                       <a:endParaRPr lang="ko-KR" altLang="en-US" sz="4000" dirty="0"/>
                     </a:p>
@@ -3818,7 +3960,7 @@
                       </a:r>
                       <a:r>
                         <a:rPr lang="en-US" altLang="ko-KR" dirty="0" err="1"/>
-                        <a:t>CourseList</a:t>
+                        <a:t>TodoList</a:t>
                       </a:r>
                       <a:r>
                         <a:rPr lang="en-US" altLang="ko-KR" baseline="0" dirty="0"/>
@@ -3826,7 +3968,7 @@
                       </a:r>
                       <a:r>
                         <a:rPr lang="en-US" altLang="ko-KR" baseline="0" dirty="0" err="1"/>
-                        <a:t>CourseList</a:t>
+                        <a:t>TodoList</a:t>
                       </a:r>
                       <a:endParaRPr lang="ko-KR" altLang="en-US" dirty="0"/>
                     </a:p>
@@ -3867,14 +4009,17 @@
                         <a:t>+</a:t>
                       </a:r>
                       <a:r>
+                        <a:rPr lang="en-US" altLang="ko-KR" sz="1800" baseline="0" dirty="0" err="1"/>
+                        <a:t>Todo</a:t>
+                      </a:r>
+                      <a:r>
                         <a:rPr lang="en-US" altLang="ko-KR" sz="1800" dirty="0" err="1"/>
-                        <a:t>CourseManageSystem</a:t>
-                      </a:r>
-                      <a:r>
-                        <a:rPr lang="en-US" altLang="ko-KR" sz="1800" dirty="0"/>
+                        <a:t>ManageSystem</a:t>
+                      </a:r>
+                      <a:r>
+                        <a:rPr lang="en-US" altLang="ko-KR" baseline="0" dirty="0"/>
                         <a:t>()</a:t>
                       </a:r>
-                      <a:endParaRPr lang="ko-KR" altLang="en-US" sz="1800" dirty="0"/>
                     </a:p>
                     <a:p>
                       <a:r>
@@ -3883,7 +4028,7 @@
                       </a:r>
                       <a:r>
                         <a:rPr lang="en-US" altLang="ko-KR" baseline="0" dirty="0" err="1"/>
-                        <a:t>AddCourseSystem</a:t>
+                        <a:t>AddTodoSystem</a:t>
                       </a:r>
                       <a:r>
                         <a:rPr lang="en-US" altLang="ko-KR" baseline="0" dirty="0"/>
@@ -3917,8 +4062,12 @@
                         <a:t>Edit</a:t>
                       </a:r>
                       <a:r>
+                        <a:rPr lang="en-US" altLang="ko-KR" sz="1800" baseline="0" dirty="0" err="1"/>
+                        <a:t>Todo</a:t>
+                      </a:r>
+                      <a:r>
                         <a:rPr lang="en-US" altLang="ko-KR" baseline="0" dirty="0" err="1"/>
-                        <a:t>CourseSystem</a:t>
+                        <a:t>System</a:t>
                       </a:r>
                       <a:r>
                         <a:rPr lang="en-US" altLang="ko-KR" baseline="0" dirty="0"/>
@@ -3953,7 +4102,7 @@
                       </a:r>
                       <a:r>
                         <a:rPr lang="en-US" altLang="ko-KR" baseline="0" dirty="0" err="1"/>
-                        <a:t>CourseSystem</a:t>
+                        <a:t>TodoSystem</a:t>
                       </a:r>
                       <a:r>
                         <a:rPr lang="en-US" altLang="ko-KR" baseline="0" dirty="0"/>
@@ -3961,13 +4110,44 @@
                       </a:r>
                     </a:p>
                     <a:p>
+                      <a:pPr marL="0" marR="0" indent="0" algn="l" defTabSz="914400" rtl="0" eaLnBrk="1" fontAlgn="auto" latinLnBrk="1" hangingPunct="1">
+                        <a:lnSpc>
+                          <a:spcPct val="100000"/>
+                        </a:lnSpc>
+                        <a:spcBef>
+                          <a:spcPts val="0"/>
+                        </a:spcBef>
+                        <a:spcAft>
+                          <a:spcPts val="0"/>
+                        </a:spcAft>
+                        <a:buClrTx/>
+                        <a:buSzTx/>
+                        <a:buFontTx/>
+                        <a:buNone/>
+                        <a:tabLst/>
+                        <a:defRPr/>
+                      </a:pPr>
+                      <a:r>
+                        <a:rPr lang="en-US" altLang="ko-KR" baseline="0" dirty="0"/>
+                        <a:t>+</a:t>
+                      </a:r>
+                      <a:r>
+                        <a:rPr lang="en-US" altLang="ko-KR" baseline="0" dirty="0" err="1"/>
+                        <a:t>SortTodoSystem</a:t>
+                      </a:r>
+                      <a:r>
+                        <a:rPr lang="en-US" altLang="ko-KR" baseline="0" dirty="0"/>
+                        <a:t>()</a:t>
+                      </a:r>
+                    </a:p>
+                    <a:p>
                       <a:r>
                         <a:rPr lang="en-US" altLang="ko-KR" baseline="0" dirty="0"/>
                         <a:t>+ </a:t>
                       </a:r>
                       <a:r>
                         <a:rPr lang="en-US" altLang="ko-KR" baseline="0" dirty="0" err="1"/>
-                        <a:t>getCourseContesnts</a:t>
+                        <a:t>getTodoContesnts</a:t>
                       </a:r>
                       <a:r>
                         <a:rPr lang="en-US" altLang="ko-KR" baseline="0" dirty="0"/>
@@ -3981,7 +4161,7 @@
                       </a:r>
                       <a:r>
                         <a:rPr lang="en-US" altLang="ko-KR" baseline="0" dirty="0" err="1"/>
-                        <a:t>getCourseList</a:t>
+                        <a:t>getTodoList</a:t>
                       </a:r>
                       <a:r>
                         <a:rPr lang="en-US" altLang="ko-KR" baseline="0" dirty="0"/>
@@ -3989,7 +4169,7 @@
                       </a:r>
                       <a:r>
                         <a:rPr lang="en-US" altLang="ko-KR" baseline="0" dirty="0" err="1"/>
-                        <a:t>CourseList</a:t>
+                        <a:t>TodoList</a:t>
                       </a:r>
                       <a:endParaRPr lang="en-US" altLang="ko-KR" baseline="0" dirty="0"/>
                     </a:p>
@@ -4009,7 +4189,7 @@
     </p:spTree>
     <p:extLst>
       <p:ext uri="{BB962C8B-B14F-4D97-AF65-F5344CB8AC3E}">
-        <p14:creationId xmlns:p14="http://schemas.microsoft.com/office/powerpoint/2010/main" val="4113967170"/>
+        <p14:creationId xmlns:p14="http://schemas.microsoft.com/office/powerpoint/2010/main" val="3856391460"/>
       </p:ext>
     </p:extLst>
   </p:cSld>
@@ -4094,7 +4274,13 @@
           <p:cNvGraphicFramePr>
             <a:graphicFrameLocks noGrp="1"/>
           </p:cNvGraphicFramePr>
-          <p:nvPr/>
+          <p:nvPr>
+            <p:extLst>
+              <p:ext uri="{D42A27DB-BD31-4B8C-83A1-F6EECF244321}">
+                <p14:modId xmlns:p14="http://schemas.microsoft.com/office/powerpoint/2010/main" val="3035344715"/>
+              </p:ext>
+            </p:extLst>
+          </p:nvPr>
         </p:nvGraphicFramePr>
         <p:xfrm>
           <a:off x="352425" y="1228296"/>
@@ -4123,7 +4309,11 @@
                     <a:p>
                       <a:r>
                         <a:rPr lang="en-US" altLang="ko-KR" sz="4000" dirty="0" err="1"/>
-                        <a:t>TaskManageSystem</a:t>
+                        <a:t>Show</a:t>
+                      </a:r>
+                      <a:r>
+                        <a:rPr lang="en-US" altLang="ko-KR" sz="4000" baseline="0" dirty="0" err="1"/>
+                        <a:t>TodoSystem</a:t>
                       </a:r>
                       <a:endParaRPr lang="ko-KR" altLang="en-US" sz="4000" dirty="0"/>
                     </a:p>
@@ -4148,7 +4338,7 @@
                       </a:r>
                       <a:r>
                         <a:rPr lang="en-US" altLang="ko-KR" dirty="0" err="1"/>
-                        <a:t>CourseList</a:t>
+                        <a:t>TodoList</a:t>
                       </a:r>
                       <a:r>
                         <a:rPr lang="en-US" altLang="ko-KR" baseline="0" dirty="0"/>
@@ -4156,7 +4346,7 @@
                       </a:r>
                       <a:r>
                         <a:rPr lang="en-US" altLang="ko-KR" baseline="0" dirty="0" err="1"/>
-                        <a:t>CourseList</a:t>
+                        <a:t>TodoList</a:t>
                       </a:r>
                       <a:endParaRPr lang="ko-KR" altLang="en-US" dirty="0"/>
                     </a:p>
@@ -4175,30 +4365,13 @@
                     <a:bodyPr/>
                     <a:lstStyle/>
                     <a:p>
-                      <a:pPr marL="0" marR="0" indent="0" algn="l" defTabSz="914400" rtl="0" eaLnBrk="1" fontAlgn="auto" latinLnBrk="1" hangingPunct="1">
-                        <a:lnSpc>
-                          <a:spcPct val="100000"/>
-                        </a:lnSpc>
-                        <a:spcBef>
-                          <a:spcPts val="0"/>
-                        </a:spcBef>
-                        <a:spcAft>
-                          <a:spcPts val="0"/>
-                        </a:spcAft>
-                        <a:buClrTx/>
-                        <a:buSzTx/>
-                        <a:buFontTx/>
-                        <a:buNone/>
-                        <a:tabLst/>
-                        <a:defRPr/>
-                      </a:pPr>
                       <a:r>
                         <a:rPr lang="en-US" altLang="ko-KR" baseline="0" dirty="0"/>
                         <a:t>+</a:t>
                       </a:r>
                       <a:r>
-                        <a:rPr lang="en-US" altLang="ko-KR" sz="1800" dirty="0" err="1"/>
-                        <a:t>TaskManageSystem</a:t>
+                        <a:rPr lang="en-US" altLang="ko-KR" baseline="0" dirty="0" err="1"/>
+                        <a:t>ShowTodoSystem</a:t>
                       </a:r>
                       <a:r>
                         <a:rPr lang="en-US" altLang="ko-KR" baseline="0" dirty="0"/>
@@ -4212,105 +4385,21 @@
                       </a:r>
                       <a:r>
                         <a:rPr lang="en-US" altLang="ko-KR" baseline="0" dirty="0" err="1"/>
-                        <a:t>AddTaskSystem</a:t>
+                        <a:t>getTodoContesnts</a:t>
                       </a:r>
                       <a:r>
                         <a:rPr lang="en-US" altLang="ko-KR" baseline="0" dirty="0"/>
-                        <a:t>()</a:t>
-                      </a:r>
-                    </a:p>
-                    <a:p>
-                      <a:pPr marL="0" marR="0" indent="0" algn="l" defTabSz="914400" rtl="0" eaLnBrk="1" fontAlgn="auto" latinLnBrk="1" hangingPunct="1">
-                        <a:lnSpc>
-                          <a:spcPct val="100000"/>
-                        </a:lnSpc>
-                        <a:spcBef>
-                          <a:spcPts val="0"/>
-                        </a:spcBef>
-                        <a:spcAft>
-                          <a:spcPts val="0"/>
-                        </a:spcAft>
-                        <a:buClrTx/>
-                        <a:buSzTx/>
-                        <a:buFontTx/>
-                        <a:buNone/>
-                        <a:tabLst/>
-                        <a:defRPr/>
-                      </a:pPr>
+                        <a:t>() : String[][]</a:t>
+                      </a:r>
+                    </a:p>
+                    <a:p>
                       <a:r>
                         <a:rPr lang="en-US" altLang="ko-KR" baseline="0" dirty="0"/>
                         <a:t>+</a:t>
                       </a:r>
                       <a:r>
-                        <a:rPr lang="en-US" altLang="ko-KR" sz="1800" dirty="0" err="1"/>
-                        <a:t>Edit</a:t>
-                      </a:r>
-                      <a:r>
                         <a:rPr lang="en-US" altLang="ko-KR" baseline="0" dirty="0" err="1"/>
-                        <a:t>TaskSystem</a:t>
-                      </a:r>
-                      <a:r>
-                        <a:rPr lang="en-US" altLang="ko-KR" baseline="0" dirty="0"/>
-                        <a:t>()</a:t>
-                      </a:r>
-                    </a:p>
-                    <a:p>
-                      <a:pPr marL="0" marR="0" indent="0" algn="l" defTabSz="914400" rtl="0" eaLnBrk="1" fontAlgn="auto" latinLnBrk="1" hangingPunct="1">
-                        <a:lnSpc>
-                          <a:spcPct val="100000"/>
-                        </a:lnSpc>
-                        <a:spcBef>
-                          <a:spcPts val="0"/>
-                        </a:spcBef>
-                        <a:spcAft>
-                          <a:spcPts val="0"/>
-                        </a:spcAft>
-                        <a:buClrTx/>
-                        <a:buSzTx/>
-                        <a:buFontTx/>
-                        <a:buNone/>
-                        <a:tabLst/>
-                        <a:defRPr/>
-                      </a:pPr>
-                      <a:r>
-                        <a:rPr lang="en-US" altLang="ko-KR" baseline="0" dirty="0"/>
-                        <a:t>+</a:t>
-                      </a:r>
-                      <a:r>
-                        <a:rPr lang="en-US" altLang="ko-KR" sz="1800" baseline="0" dirty="0" err="1"/>
-                        <a:t>Delete</a:t>
-                      </a:r>
-                      <a:r>
-                        <a:rPr lang="en-US" altLang="ko-KR" baseline="0" dirty="0" err="1"/>
-                        <a:t>TaskSystem</a:t>
-                      </a:r>
-                      <a:r>
-                        <a:rPr lang="en-US" altLang="ko-KR" baseline="0" dirty="0"/>
-                        <a:t>()</a:t>
-                      </a:r>
-                    </a:p>
-                    <a:p>
-                      <a:r>
-                        <a:rPr lang="en-US" altLang="ko-KR" baseline="0" dirty="0"/>
-                        <a:t>+ </a:t>
-                      </a:r>
-                      <a:r>
-                        <a:rPr lang="en-US" altLang="ko-KR" baseline="0" dirty="0" err="1"/>
-                        <a:t>getTaskContesnts</a:t>
-                      </a:r>
-                      <a:r>
-                        <a:rPr lang="en-US" altLang="ko-KR" baseline="0" dirty="0"/>
-                        <a:t>() : String[][]</a:t>
-                      </a:r>
-                    </a:p>
-                    <a:p>
-                      <a:r>
-                        <a:rPr lang="en-US" altLang="ko-KR" baseline="0" dirty="0"/>
-                        <a:t>+ </a:t>
-                      </a:r>
-                      <a:r>
-                        <a:rPr lang="en-US" altLang="ko-KR" baseline="0" dirty="0" err="1"/>
-                        <a:t>getTaskList</a:t>
+                        <a:t>getTodoList</a:t>
                       </a:r>
                       <a:r>
                         <a:rPr lang="en-US" altLang="ko-KR" baseline="0" dirty="0"/>
@@ -4318,7 +4407,7 @@
                       </a:r>
                       <a:r>
                         <a:rPr lang="en-US" altLang="ko-KR" baseline="0" dirty="0" err="1"/>
-                        <a:t>TaskList</a:t>
+                        <a:t>TodoList</a:t>
                       </a:r>
                       <a:endParaRPr lang="en-US" altLang="ko-KR" baseline="0" dirty="0"/>
                     </a:p>
@@ -4338,7 +4427,244 @@
     </p:spTree>
     <p:extLst>
       <p:ext uri="{BB962C8B-B14F-4D97-AF65-F5344CB8AC3E}">
-        <p14:creationId xmlns:p14="http://schemas.microsoft.com/office/powerpoint/2010/main" val="3856391460"/>
+        <p14:creationId xmlns:p14="http://schemas.microsoft.com/office/powerpoint/2010/main" val="1712016017"/>
+      </p:ext>
+    </p:extLst>
+  </p:cSld>
+  <p:clrMapOvr>
+    <a:masterClrMapping/>
+  </p:clrMapOvr>
+</p:sld>
+</file>
+
+<file path=ppt/slides/slide15.xml><?xml version="1.0" encoding="utf-8"?>
+<p:sld xmlns:a="http://schemas.openxmlformats.org/drawingml/2006/main" xmlns:r="http://schemas.openxmlformats.org/officeDocument/2006/relationships" xmlns:p="http://schemas.openxmlformats.org/presentationml/2006/main">
+  <p:cSld>
+    <p:spTree>
+      <p:nvGrpSpPr>
+        <p:cNvPr id="1" name=""/>
+        <p:cNvGrpSpPr/>
+        <p:nvPr/>
+      </p:nvGrpSpPr>
+      <p:grpSpPr>
+        <a:xfrm>
+          <a:off x="0" y="0"/>
+          <a:ext cx="0" cy="0"/>
+          <a:chOff x="0" y="0"/>
+          <a:chExt cx="0" cy="0"/>
+        </a:xfrm>
+      </p:grpSpPr>
+      <p:sp>
+        <p:nvSpPr>
+          <p:cNvPr id="2" name="제목 1"/>
+          <p:cNvSpPr>
+            <a:spLocks noGrp="1"/>
+          </p:cNvSpPr>
+          <p:nvPr>
+            <p:ph type="title"/>
+          </p:nvPr>
+        </p:nvSpPr>
+        <p:spPr>
+          <a:xfrm>
+            <a:off x="352425" y="220211"/>
+            <a:ext cx="8327552" cy="625950"/>
+          </a:xfrm>
+        </p:spPr>
+        <p:txBody>
+          <a:bodyPr/>
+          <a:lstStyle/>
+          <a:p>
+            <a:r>
+              <a:rPr lang="en-US" altLang="ko-KR" sz="2500" dirty="0"/>
+              <a:t>Control Class</a:t>
+            </a:r>
+            <a:endParaRPr lang="ko-KR" altLang="en-US" sz="2500" dirty="0"/>
+          </a:p>
+        </p:txBody>
+      </p:sp>
+      <p:sp>
+        <p:nvSpPr>
+          <p:cNvPr id="4" name="바닥글 개체 틀 3"/>
+          <p:cNvSpPr>
+            <a:spLocks noGrp="1"/>
+          </p:cNvSpPr>
+          <p:nvPr>
+            <p:ph type="ftr" sz="quarter" idx="3"/>
+          </p:nvPr>
+        </p:nvSpPr>
+        <p:spPr/>
+        <p:txBody>
+          <a:bodyPr/>
+          <a:lstStyle/>
+          <a:p>
+            <a:pPr algn="r"/>
+            <a:r>
+              <a:rPr lang="ko-KR" altLang="en-US"/>
+              <a:t>팀 명</a:t>
+            </a:r>
+            <a:endParaRPr lang="en-US" altLang="ko-KR" dirty="0"/>
+          </a:p>
+        </p:txBody>
+      </p:sp>
+      <p:graphicFrame>
+        <p:nvGraphicFramePr>
+          <p:cNvPr id="5" name="표 4"/>
+          <p:cNvGraphicFramePr>
+            <a:graphicFrameLocks noGrp="1"/>
+          </p:cNvGraphicFramePr>
+          <p:nvPr>
+            <p:extLst>
+              <p:ext uri="{D42A27DB-BD31-4B8C-83A1-F6EECF244321}">
+                <p14:modId xmlns:p14="http://schemas.microsoft.com/office/powerpoint/2010/main" val="2843696219"/>
+              </p:ext>
+            </p:extLst>
+          </p:nvPr>
+        </p:nvGraphicFramePr>
+        <p:xfrm>
+          <a:off x="352425" y="1228296"/>
+          <a:ext cx="8327551" cy="4967787"/>
+        </p:xfrm>
+        <a:graphic>
+          <a:graphicData uri="http://schemas.openxmlformats.org/drawingml/2006/table">
+            <a:tbl>
+              <a:tblPr firstRow="1" bandRow="1">
+                <a:tableStyleId>{17292A2E-F333-43FB-9621-5CBBE7FDCDCB}</a:tableStyleId>
+              </a:tblPr>
+              <a:tblGrid>
+                <a:gridCol w="8327551">
+                  <a:extLst>
+                    <a:ext uri="{9D8B030D-6E8A-4147-A177-3AD203B41FA5}">
+                      <a16:colId xmlns:a16="http://schemas.microsoft.com/office/drawing/2014/main" val="20000"/>
+                    </a:ext>
+                  </a:extLst>
+                </a:gridCol>
+              </a:tblGrid>
+              <a:tr h="875279">
+                <a:tc>
+                  <a:txBody>
+                    <a:bodyPr/>
+                    <a:lstStyle/>
+                    <a:p>
+                      <a:r>
+                        <a:rPr lang="en-US" altLang="ko-KR" sz="4000" baseline="0" dirty="0" err="1"/>
+                        <a:t>SearchTodoSystem</a:t>
+                      </a:r>
+                      <a:endParaRPr lang="ko-KR" altLang="en-US" sz="4000" dirty="0"/>
+                    </a:p>
+                  </a:txBody>
+                  <a:tcPr/>
+                </a:tc>
+                <a:extLst>
+                  <a:ext uri="{0D108BD9-81ED-4DB2-BD59-A6C34878D82A}">
+                    <a16:rowId xmlns:a16="http://schemas.microsoft.com/office/drawing/2014/main" val="10000"/>
+                  </a:ext>
+                </a:extLst>
+              </a:tr>
+              <a:tr h="2046254">
+                <a:tc>
+                  <a:txBody>
+                    <a:bodyPr/>
+                    <a:lstStyle/>
+                    <a:p>
+                      <a:r>
+                        <a:rPr lang="en-US" altLang="ko-KR" dirty="0"/>
+                        <a:t>- </a:t>
+                      </a:r>
+                      <a:r>
+                        <a:rPr lang="en-US" altLang="ko-KR" dirty="0" err="1"/>
+                        <a:t>TodoList</a:t>
+                      </a:r>
+                      <a:r>
+                        <a:rPr lang="en-US" altLang="ko-KR" baseline="0" dirty="0"/>
+                        <a:t> : </a:t>
+                      </a:r>
+                      <a:r>
+                        <a:rPr lang="en-US" altLang="ko-KR" baseline="0" dirty="0" err="1"/>
+                        <a:t>TodoList</a:t>
+                      </a:r>
+                      <a:endParaRPr lang="ko-KR" altLang="en-US" dirty="0"/>
+                    </a:p>
+                  </a:txBody>
+                  <a:tcPr/>
+                </a:tc>
+                <a:extLst>
+                  <a:ext uri="{0D108BD9-81ED-4DB2-BD59-A6C34878D82A}">
+                    <a16:rowId xmlns:a16="http://schemas.microsoft.com/office/drawing/2014/main" val="10001"/>
+                  </a:ext>
+                </a:extLst>
+              </a:tr>
+              <a:tr h="2046254">
+                <a:tc>
+                  <a:txBody>
+                    <a:bodyPr/>
+                    <a:lstStyle/>
+                    <a:p>
+                      <a:r>
+                        <a:rPr lang="en-US" altLang="ko-KR" baseline="0" dirty="0"/>
+                        <a:t>+</a:t>
+                      </a:r>
+                      <a:r>
+                        <a:rPr lang="en-US" altLang="ko-KR" baseline="0" dirty="0" err="1"/>
+                        <a:t>SearchTodoSystem</a:t>
+                      </a:r>
+                      <a:r>
+                        <a:rPr lang="en-US" altLang="ko-KR" baseline="0" dirty="0"/>
+                        <a:t>()</a:t>
+                      </a:r>
+                    </a:p>
+                    <a:p>
+                      <a:r>
+                        <a:rPr lang="en-US" altLang="ko-KR" baseline="0" dirty="0"/>
+                        <a:t>+</a:t>
+                      </a:r>
+                      <a:r>
+                        <a:rPr lang="en-US" altLang="ko-KR" baseline="0" dirty="0" err="1"/>
+                        <a:t>getTodoContesnts</a:t>
+                      </a:r>
+                      <a:r>
+                        <a:rPr lang="en-US" altLang="ko-KR" baseline="0" dirty="0"/>
+                        <a:t>() : String[][]</a:t>
+                      </a:r>
+                    </a:p>
+                    <a:p>
+                      <a:r>
+                        <a:rPr lang="en-US" altLang="ko-KR" baseline="0" dirty="0"/>
+                        <a:t>+</a:t>
+                      </a:r>
+                      <a:r>
+                        <a:rPr lang="en-US" altLang="ko-KR" baseline="0" dirty="0" err="1"/>
+                        <a:t>getTodoList</a:t>
+                      </a:r>
+                      <a:r>
+                        <a:rPr lang="en-US" altLang="ko-KR" baseline="0" dirty="0"/>
+                        <a:t>() : </a:t>
+                      </a:r>
+                      <a:r>
+                        <a:rPr lang="en-US" altLang="ko-KR" baseline="0" dirty="0" err="1"/>
+                        <a:t>TodoList</a:t>
+                      </a:r>
+                      <a:endParaRPr lang="en-US" altLang="ko-KR" baseline="0" dirty="0"/>
+                    </a:p>
+                    <a:p>
+                      <a:endParaRPr lang="en-US" altLang="ko-KR" baseline="0" dirty="0"/>
+                    </a:p>
+                  </a:txBody>
+                  <a:tcPr/>
+                </a:tc>
+                <a:extLst>
+                  <a:ext uri="{0D108BD9-81ED-4DB2-BD59-A6C34878D82A}">
+                    <a16:rowId xmlns:a16="http://schemas.microsoft.com/office/drawing/2014/main" val="10002"/>
+                  </a:ext>
+                </a:extLst>
+              </a:tr>
+            </a:tbl>
+          </a:graphicData>
+        </a:graphic>
+      </p:graphicFrame>
+    </p:spTree>
+    <p:extLst>
+      <p:ext uri="{BB962C8B-B14F-4D97-AF65-F5344CB8AC3E}">
+        <p14:creationId xmlns:p14="http://schemas.microsoft.com/office/powerpoint/2010/main" val="1121548998"/>
       </p:ext>
     </p:extLst>
   </p:cSld>
@@ -4421,7 +4747,7 @@
             <p:ph idx="1"/>
             <p:extLst>
               <p:ext uri="{D42A27DB-BD31-4B8C-83A1-F6EECF244321}">
-                <p14:modId xmlns:p14="http://schemas.microsoft.com/office/powerpoint/2010/main" val="1702487040"/>
+                <p14:modId xmlns:p14="http://schemas.microsoft.com/office/powerpoint/2010/main" val="1009291166"/>
               </p:ext>
             </p:extLst>
           </p:nvPr>
@@ -4881,6 +5207,16 @@
                     <a:lstStyle/>
                     <a:p>
                       <a:pPr algn="ctr" latinLnBrk="1"/>
+                      <a:r>
+                        <a:rPr lang="en-US" altLang="ko-KR" sz="1200" b="0" dirty="0">
+                          <a:solidFill>
+                            <a:schemeClr val="tx1"/>
+                          </a:solidFill>
+                          <a:latin typeface="맑은 고딕" pitchFamily="50" charset="-127"/>
+                          <a:ea typeface="맑은 고딕" pitchFamily="50" charset="-127"/>
+                        </a:rPr>
+                        <a:t>2017.05.22</a:t>
+                      </a:r>
                       <a:endParaRPr lang="ko-KR" altLang="en-US" sz="1200" b="0" dirty="0">
                         <a:solidFill>
                           <a:schemeClr val="tx1"/>
@@ -4902,6 +5238,16 @@
                     <a:lstStyle/>
                     <a:p>
                       <a:pPr algn="ctr" latinLnBrk="1"/>
+                      <a:r>
+                        <a:rPr lang="en-US" altLang="ko-KR" sz="1200" b="0" dirty="0">
+                          <a:solidFill>
+                            <a:schemeClr val="tx1"/>
+                          </a:solidFill>
+                          <a:latin typeface="맑은 고딕" pitchFamily="50" charset="-127"/>
+                          <a:ea typeface="맑은 고딕" pitchFamily="50" charset="-127"/>
+                        </a:rPr>
+                        <a:t>V1.0.2</a:t>
+                      </a:r>
                       <a:endParaRPr lang="ko-KR" altLang="en-US" sz="1200" b="0" dirty="0">
                         <a:solidFill>
                           <a:schemeClr val="tx1"/>
@@ -4923,13 +5269,26 @@
                     <a:lstStyle/>
                     <a:p>
                       <a:pPr latinLnBrk="1"/>
-                      <a:endParaRPr lang="ko-KR" altLang="en-US" sz="1200" b="0" dirty="0">
-                        <a:solidFill>
-                          <a:schemeClr val="tx1"/>
-                        </a:solidFill>
-                        <a:latin typeface="맑은 고딕" pitchFamily="50" charset="-127"/>
-                        <a:ea typeface="맑은 고딕" pitchFamily="50" charset="-127"/>
-                      </a:endParaRPr>
+                      <a:r>
+                        <a:rPr lang="en-US" altLang="ko-KR" sz="1200" b="0" dirty="0">
+                          <a:solidFill>
+                            <a:schemeClr val="tx1"/>
+                          </a:solidFill>
+                          <a:latin typeface="맑은 고딕" pitchFamily="50" charset="-127"/>
+                          <a:ea typeface="맑은 고딕" pitchFamily="50" charset="-127"/>
+                        </a:rPr>
+                        <a:t>Control Class </a:t>
+                      </a:r>
+                      <a:r>
+                        <a:rPr lang="ko-KR" altLang="en-US" sz="1200" b="0" dirty="0">
+                          <a:solidFill>
+                            <a:schemeClr val="tx1"/>
+                          </a:solidFill>
+                          <a:latin typeface="맑은 고딕" pitchFamily="50" charset="-127"/>
+                          <a:ea typeface="맑은 고딕" pitchFamily="50" charset="-127"/>
+                        </a:rPr>
+                        <a:t>수정</a:t>
+                      </a:r>
                     </a:p>
                   </a:txBody>
                   <a:tcPr anchor="ctr">
@@ -4944,6 +5303,16 @@
                     <a:lstStyle/>
                     <a:p>
                       <a:pPr algn="ctr" latinLnBrk="1"/>
+                      <a:r>
+                        <a:rPr lang="ko-KR" altLang="en-US" sz="1200" b="0" dirty="0" err="1">
+                          <a:solidFill>
+                            <a:schemeClr val="tx1"/>
+                          </a:solidFill>
+                          <a:latin typeface="맑은 고딕" pitchFamily="50" charset="-127"/>
+                          <a:ea typeface="맑은 고딕" pitchFamily="50" charset="-127"/>
+                        </a:rPr>
+                        <a:t>나소영</a:t>
+                      </a:r>
                       <a:endParaRPr lang="ko-KR" altLang="en-US" sz="1200" b="0" dirty="0">
                         <a:solidFill>
                           <a:schemeClr val="tx1"/>

</xml_diff>